<commit_message>
added videos (in endless loop)
</commit_message>
<xml_diff>
--- a/isip_presentation.pptx
+++ b/isip_presentation.pptx
@@ -2,7 +2,7 @@
 <file path=ppt/presentation.xml><?xml version="1.0" encoding="utf-8"?>
 <p:presentation xmlns:a="http://schemas.openxmlformats.org/drawingml/2006/main" xmlns:r="http://schemas.openxmlformats.org/officeDocument/2006/relationships" xmlns:p="http://schemas.openxmlformats.org/presentationml/2006/main" saveSubsetFonts="1" autoCompressPictures="0">
   <p:sldMasterIdLst>
-    <p:sldMasterId id="2147483678" r:id="rId1"/>
+    <p:sldMasterId id="2147483714" r:id="rId1"/>
   </p:sldMasterIdLst>
   <p:notesMasterIdLst>
     <p:notesMasterId r:id="rId11"/>
@@ -205,7 +205,7 @@
           <a:p>
             <a:fld id="{7D31DDB2-3D33-4349-ACAB-04EB8925B64A}" type="datetimeFigureOut">
               <a:rPr lang="en-GB" smtClean="0"/>
-              <a:t>08/05/2018</a:t>
+              <a:t>10/05/2018</a:t>
             </a:fld>
             <a:endParaRPr lang="en-GB"/>
           </a:p>
@@ -1568,7 +1568,7 @@
           <a:p>
             <a:fld id="{6918DB91-F5E1-CB4E-825E-9A43DB17E472}" type="datetimeFigureOut">
               <a:rPr lang="de-DE" smtClean="0"/>
-              <a:t>08.05.18</a:t>
+              <a:t>10.05.18</a:t>
             </a:fld>
             <a:endParaRPr lang="de-DE"/>
           </a:p>
@@ -1774,7 +1774,7 @@
     </p:spTree>
     <p:extLst>
       <p:ext uri="{BB962C8B-B14F-4D97-AF65-F5344CB8AC3E}">
-        <p14:creationId xmlns:p14="http://schemas.microsoft.com/office/powerpoint/2010/main" val="1218676224"/>
+        <p14:creationId xmlns:p14="http://schemas.microsoft.com/office/powerpoint/2010/main" val="3320576907"/>
       </p:ext>
     </p:extLst>
   </p:cSld>
@@ -1898,7 +1898,7 @@
           <a:p>
             <a:fld id="{6918DB91-F5E1-CB4E-825E-9A43DB17E472}" type="datetimeFigureOut">
               <a:rPr lang="de-DE" smtClean="0"/>
-              <a:t>08.05.18</a:t>
+              <a:t>10.05.18</a:t>
             </a:fld>
             <a:endParaRPr lang="de-DE"/>
           </a:p>
@@ -1949,7 +1949,7 @@
     </p:spTree>
     <p:extLst>
       <p:ext uri="{BB962C8B-B14F-4D97-AF65-F5344CB8AC3E}">
-        <p14:creationId xmlns:p14="http://schemas.microsoft.com/office/powerpoint/2010/main" val="3807414001"/>
+        <p14:creationId xmlns:p14="http://schemas.microsoft.com/office/powerpoint/2010/main" val="894491974"/>
       </p:ext>
     </p:extLst>
   </p:cSld>
@@ -2078,7 +2078,7 @@
           <a:p>
             <a:fld id="{6918DB91-F5E1-CB4E-825E-9A43DB17E472}" type="datetimeFigureOut">
               <a:rPr lang="de-DE" smtClean="0"/>
-              <a:t>08.05.18</a:t>
+              <a:t>10.05.18</a:t>
             </a:fld>
             <a:endParaRPr lang="de-DE"/>
           </a:p>
@@ -2129,7 +2129,7 @@
     </p:spTree>
     <p:extLst>
       <p:ext uri="{BB962C8B-B14F-4D97-AF65-F5344CB8AC3E}">
-        <p14:creationId xmlns:p14="http://schemas.microsoft.com/office/powerpoint/2010/main" val="2412234600"/>
+        <p14:creationId xmlns:p14="http://schemas.microsoft.com/office/powerpoint/2010/main" val="2171618970"/>
       </p:ext>
     </p:extLst>
   </p:cSld>
@@ -2248,7 +2248,7 @@
           <a:p>
             <a:fld id="{6918DB91-F5E1-CB4E-825E-9A43DB17E472}" type="datetimeFigureOut">
               <a:rPr lang="de-DE" smtClean="0"/>
-              <a:t>08.05.18</a:t>
+              <a:t>10.05.18</a:t>
             </a:fld>
             <a:endParaRPr lang="de-DE"/>
           </a:p>
@@ -2299,7 +2299,7 @@
     </p:spTree>
     <p:extLst>
       <p:ext uri="{BB962C8B-B14F-4D97-AF65-F5344CB8AC3E}">
-        <p14:creationId xmlns:p14="http://schemas.microsoft.com/office/powerpoint/2010/main" val="361170326"/>
+        <p14:creationId xmlns:p14="http://schemas.microsoft.com/office/powerpoint/2010/main" val="1551601096"/>
       </p:ext>
     </p:extLst>
   </p:cSld>
@@ -2525,7 +2525,7 @@
           <a:p>
             <a:fld id="{6918DB91-F5E1-CB4E-825E-9A43DB17E472}" type="datetimeFigureOut">
               <a:rPr lang="de-DE" smtClean="0"/>
-              <a:t>08.05.18</a:t>
+              <a:t>10.05.18</a:t>
             </a:fld>
             <a:endParaRPr lang="de-DE"/>
           </a:p>
@@ -2658,7 +2658,7 @@
     </p:spTree>
     <p:extLst>
       <p:ext uri="{BB962C8B-B14F-4D97-AF65-F5344CB8AC3E}">
-        <p14:creationId xmlns:p14="http://schemas.microsoft.com/office/powerpoint/2010/main" val="3126923928"/>
+        <p14:creationId xmlns:p14="http://schemas.microsoft.com/office/powerpoint/2010/main" val="999179503"/>
       </p:ext>
     </p:extLst>
   </p:cSld>
@@ -2919,7 +2919,7 @@
           <a:p>
             <a:fld id="{6918DB91-F5E1-CB4E-825E-9A43DB17E472}" type="datetimeFigureOut">
               <a:rPr lang="de-DE" smtClean="0"/>
-              <a:t>08.05.18</a:t>
+              <a:t>10.05.18</a:t>
             </a:fld>
             <a:endParaRPr lang="de-DE"/>
           </a:p>
@@ -2970,7 +2970,7 @@
     </p:spTree>
     <p:extLst>
       <p:ext uri="{BB962C8B-B14F-4D97-AF65-F5344CB8AC3E}">
-        <p14:creationId xmlns:p14="http://schemas.microsoft.com/office/powerpoint/2010/main" val="144715657"/>
+        <p14:creationId xmlns:p14="http://schemas.microsoft.com/office/powerpoint/2010/main" val="2898086949"/>
       </p:ext>
     </p:extLst>
   </p:cSld>
@@ -3396,7 +3396,7 @@
           <a:p>
             <a:fld id="{6918DB91-F5E1-CB4E-825E-9A43DB17E472}" type="datetimeFigureOut">
               <a:rPr lang="de-DE" smtClean="0"/>
-              <a:t>08.05.18</a:t>
+              <a:t>10.05.18</a:t>
             </a:fld>
             <a:endParaRPr lang="de-DE"/>
           </a:p>
@@ -3447,7 +3447,7 @@
     </p:spTree>
     <p:extLst>
       <p:ext uri="{BB962C8B-B14F-4D97-AF65-F5344CB8AC3E}">
-        <p14:creationId xmlns:p14="http://schemas.microsoft.com/office/powerpoint/2010/main" val="2352200156"/>
+        <p14:creationId xmlns:p14="http://schemas.microsoft.com/office/powerpoint/2010/main" val="3998023616"/>
       </p:ext>
     </p:extLst>
   </p:cSld>
@@ -3514,7 +3514,7 @@
           <a:p>
             <a:fld id="{6918DB91-F5E1-CB4E-825E-9A43DB17E472}" type="datetimeFigureOut">
               <a:rPr lang="de-DE" smtClean="0"/>
-              <a:t>08.05.18</a:t>
+              <a:t>10.05.18</a:t>
             </a:fld>
             <a:endParaRPr lang="de-DE"/>
           </a:p>
@@ -3565,7 +3565,7 @@
     </p:spTree>
     <p:extLst>
       <p:ext uri="{BB962C8B-B14F-4D97-AF65-F5344CB8AC3E}">
-        <p14:creationId xmlns:p14="http://schemas.microsoft.com/office/powerpoint/2010/main" val="4068225859"/>
+        <p14:creationId xmlns:p14="http://schemas.microsoft.com/office/powerpoint/2010/main" val="1605986286"/>
       </p:ext>
     </p:extLst>
   </p:cSld>
@@ -3609,7 +3609,7 @@
           <a:p>
             <a:fld id="{6918DB91-F5E1-CB4E-825E-9A43DB17E472}" type="datetimeFigureOut">
               <a:rPr lang="de-DE" smtClean="0"/>
-              <a:t>08.05.18</a:t>
+              <a:t>10.05.18</a:t>
             </a:fld>
             <a:endParaRPr lang="de-DE"/>
           </a:p>
@@ -3660,7 +3660,7 @@
     </p:spTree>
     <p:extLst>
       <p:ext uri="{BB962C8B-B14F-4D97-AF65-F5344CB8AC3E}">
-        <p14:creationId xmlns:p14="http://schemas.microsoft.com/office/powerpoint/2010/main" val="1814624745"/>
+        <p14:creationId xmlns:p14="http://schemas.microsoft.com/office/powerpoint/2010/main" val="4034561382"/>
       </p:ext>
     </p:extLst>
   </p:cSld>
@@ -3955,7 +3955,7 @@
           <a:p>
             <a:fld id="{6918DB91-F5E1-CB4E-825E-9A43DB17E472}" type="datetimeFigureOut">
               <a:rPr lang="de-DE" smtClean="0"/>
-              <a:t>08.05.18</a:t>
+              <a:t>10.05.18</a:t>
             </a:fld>
             <a:endParaRPr lang="de-DE"/>
           </a:p>
@@ -4070,7 +4070,7 @@
     </p:spTree>
     <p:extLst>
       <p:ext uri="{BB962C8B-B14F-4D97-AF65-F5344CB8AC3E}">
-        <p14:creationId xmlns:p14="http://schemas.microsoft.com/office/powerpoint/2010/main" val="2584667267"/>
+        <p14:creationId xmlns:p14="http://schemas.microsoft.com/office/powerpoint/2010/main" val="255844654"/>
       </p:ext>
     </p:extLst>
   </p:cSld>
@@ -4343,7 +4343,7 @@
           <a:p>
             <a:fld id="{6918DB91-F5E1-CB4E-825E-9A43DB17E472}" type="datetimeFigureOut">
               <a:rPr lang="de-DE" smtClean="0"/>
-              <a:t>08.05.18</a:t>
+              <a:t>10.05.18</a:t>
             </a:fld>
             <a:endParaRPr lang="de-DE"/>
           </a:p>
@@ -4458,7 +4458,7 @@
     </p:spTree>
     <p:extLst>
       <p:ext uri="{BB962C8B-B14F-4D97-AF65-F5344CB8AC3E}">
-        <p14:creationId xmlns:p14="http://schemas.microsoft.com/office/powerpoint/2010/main" val="3760431229"/>
+        <p14:creationId xmlns:p14="http://schemas.microsoft.com/office/powerpoint/2010/main" val="3707564411"/>
       </p:ext>
     </p:extLst>
   </p:cSld>
@@ -4621,7 +4621,7 @@
           <a:p>
             <a:fld id="{6918DB91-F5E1-CB4E-825E-9A43DB17E472}" type="datetimeFigureOut">
               <a:rPr lang="de-DE" smtClean="0"/>
-              <a:t>08.05.18</a:t>
+              <a:t>10.05.18</a:t>
             </a:fld>
             <a:endParaRPr lang="de-DE"/>
           </a:p>
@@ -4742,23 +4742,23 @@
     </p:spTree>
     <p:extLst>
       <p:ext uri="{BB962C8B-B14F-4D97-AF65-F5344CB8AC3E}">
-        <p14:creationId xmlns:p14="http://schemas.microsoft.com/office/powerpoint/2010/main" val="1364154022"/>
+        <p14:creationId xmlns:p14="http://schemas.microsoft.com/office/powerpoint/2010/main" val="3148839162"/>
       </p:ext>
     </p:extLst>
   </p:cSld>
   <p:clrMap bg1="lt1" tx1="dk1" bg2="lt2" tx2="dk2" accent1="accent1" accent2="accent2" accent3="accent3" accent4="accent4" accent5="accent5" accent6="accent6" hlink="hlink" folHlink="folHlink"/>
   <p:sldLayoutIdLst>
-    <p:sldLayoutId id="2147483679" r:id="rId1"/>
-    <p:sldLayoutId id="2147483680" r:id="rId2"/>
-    <p:sldLayoutId id="2147483681" r:id="rId3"/>
-    <p:sldLayoutId id="2147483682" r:id="rId4"/>
-    <p:sldLayoutId id="2147483683" r:id="rId5"/>
-    <p:sldLayoutId id="2147483684" r:id="rId6"/>
-    <p:sldLayoutId id="2147483685" r:id="rId7"/>
-    <p:sldLayoutId id="2147483686" r:id="rId8"/>
-    <p:sldLayoutId id="2147483687" r:id="rId9"/>
-    <p:sldLayoutId id="2147483688" r:id="rId10"/>
-    <p:sldLayoutId id="2147483689" r:id="rId11"/>
+    <p:sldLayoutId id="2147483715" r:id="rId1"/>
+    <p:sldLayoutId id="2147483716" r:id="rId2"/>
+    <p:sldLayoutId id="2147483717" r:id="rId3"/>
+    <p:sldLayoutId id="2147483718" r:id="rId4"/>
+    <p:sldLayoutId id="2147483719" r:id="rId5"/>
+    <p:sldLayoutId id="2147483720" r:id="rId6"/>
+    <p:sldLayoutId id="2147483721" r:id="rId7"/>
+    <p:sldLayoutId id="2147483722" r:id="rId8"/>
+    <p:sldLayoutId id="2147483723" r:id="rId9"/>
+    <p:sldLayoutId id="2147483724" r:id="rId10"/>
+    <p:sldLayoutId id="2147483725" r:id="rId11"/>
   </p:sldLayoutIdLst>
   <p:txStyles>
     <p:titleStyle>
@@ -5428,12 +5428,7 @@
             <p:ph type="title"/>
           </p:nvPr>
         </p:nvSpPr>
-        <p:spPr>
-          <a:xfrm>
-            <a:off x="1371600" y="685800"/>
-            <a:ext cx="9601200" cy="1485900"/>
-          </a:xfrm>
-        </p:spPr>
+        <p:spPr/>
         <p:txBody>
           <a:bodyPr/>
           <a:lstStyle/>
@@ -5652,7 +5647,9 @@
         </p:nvSpPr>
         <p:spPr/>
         <p:txBody>
-          <a:bodyPr/>
+          <a:bodyPr>
+            <a:normAutofit/>
+          </a:bodyPr>
           <a:lstStyle/>
           <a:p>
             <a:pPr marL="0" indent="0">
@@ -5860,8 +5857,16 @@
 </file>
 
 <file path=ppt/slides/slide7.xml><?xml version="1.0" encoding="utf-8"?>
-<p:sld xmlns:a="http://schemas.openxmlformats.org/drawingml/2006/main" xmlns:r="http://schemas.openxmlformats.org/officeDocument/2006/relationships" xmlns:p="http://schemas.openxmlformats.org/presentationml/2006/main">
+<p:sld xmlns:a="http://schemas.openxmlformats.org/drawingml/2006/main" xmlns:r="http://schemas.openxmlformats.org/officeDocument/2006/relationships" xmlns:p="http://schemas.openxmlformats.org/presentationml/2006/main" showMasterSp="0">
   <p:cSld>
+    <p:bg>
+      <p:bgPr>
+        <a:solidFill>
+          <a:schemeClr val="tx1"/>
+        </a:solidFill>
+        <a:effectLst/>
+      </p:bgPr>
+    </p:bg>
     <p:spTree>
       <p:nvGrpSpPr>
         <p:cNvPr id="1" name=""/>
@@ -5876,65 +5881,42 @@
           <a:chExt cx="0" cy="0"/>
         </a:xfrm>
       </p:grpSpPr>
-      <p:sp>
-        <p:nvSpPr>
-          <p:cNvPr id="2" name="Titel 1">
+      <p:pic>
+        <p:nvPicPr>
+          <p:cNvPr id="6" name="video_a.mp4">
+            <a:hlinkClick r:id="" action="ppaction://media"/>
             <a:extLst>
               <a:ext uri="{FF2B5EF4-FFF2-40B4-BE49-F238E27FC236}">
-                <a16:creationId xmlns:a16="http://schemas.microsoft.com/office/drawing/2014/main" id="{9B5D2011-62C8-6D4E-B142-0611C9354DDE}"/>
+                <a16:creationId xmlns:a16="http://schemas.microsoft.com/office/drawing/2014/main" id="{84182711-F1CB-FC43-9012-0535C58947BB}"/>
               </a:ext>
             </a:extLst>
           </p:cNvPr>
-          <p:cNvSpPr>
-            <a:spLocks noGrp="1"/>
-          </p:cNvSpPr>
-          <p:nvPr>
-            <p:ph type="title"/>
-          </p:nvPr>
-        </p:nvSpPr>
-        <p:spPr/>
-        <p:txBody>
-          <a:bodyPr/>
-          <a:lstStyle/>
-          <a:p>
-            <a:r>
-              <a:rPr lang="en-GB" dirty="0"/>
-              <a:t>Results</a:t>
-            </a:r>
-          </a:p>
-        </p:txBody>
-      </p:sp>
-      <p:sp>
-        <p:nvSpPr>
-          <p:cNvPr id="3" name="Inhaltsplatzhalter 2">
-            <a:extLst>
-              <a:ext uri="{FF2B5EF4-FFF2-40B4-BE49-F238E27FC236}">
-                <a16:creationId xmlns:a16="http://schemas.microsoft.com/office/drawing/2014/main" id="{4F0B1183-7F7C-414A-9E92-411288295064}"/>
-              </a:ext>
-            </a:extLst>
-          </p:cNvPr>
-          <p:cNvSpPr>
-            <a:spLocks noGrp="1"/>
-          </p:cNvSpPr>
+          <p:cNvPicPr>
+            <a:picLocks noGrp="1" noChangeAspect="1"/>
+          </p:cNvPicPr>
           <p:nvPr>
             <p:ph idx="1"/>
-          </p:nvPr>
-        </p:nvSpPr>
-        <p:spPr/>
-        <p:txBody>
-          <a:bodyPr/>
-          <a:lstStyle/>
-          <a:p>
-            <a:pPr marL="0" indent="0">
-              <a:buNone/>
-            </a:pPr>
-            <a:r>
-              <a:rPr lang="en-GB" dirty="0"/>
-              <a:t>Add video A here</a:t>
-            </a:r>
-          </a:p>
-        </p:txBody>
-      </p:sp>
+            <a:videoFile r:link="rId2"/>
+            <p:extLst>
+              <p:ext uri="{DAA4B4D4-6D71-4841-9C94-3DE7FCFB9230}">
+                <p14:media xmlns:p14="http://schemas.microsoft.com/office/powerpoint/2010/main" r:embed="rId1"/>
+              </p:ext>
+            </p:extLst>
+          </p:nvPr>
+        </p:nvPicPr>
+        <p:blipFill>
+          <a:blip r:embed="rId5"/>
+          <a:stretch>
+            <a:fillRect/>
+          </a:stretch>
+        </p:blipFill>
+        <p:spPr>
+          <a:xfrm>
+            <a:off x="2197100" y="490538"/>
+            <a:ext cx="8115300" cy="6086475"/>
+          </a:xfrm>
+        </p:spPr>
+      </p:pic>
     </p:spTree>
     <p:extLst>
       <p:ext uri="{BB962C8B-B14F-4D97-AF65-F5344CB8AC3E}">
@@ -5945,6 +5927,141 @@
   <p:clrMapOvr>
     <a:masterClrMapping/>
   </p:clrMapOvr>
+  <p:timing>
+    <p:tnLst>
+      <p:par>
+        <p:cTn id="1" dur="indefinite" restart="never" nodeType="tmRoot">
+          <p:childTnLst>
+            <p:seq concurrent="1" nextAc="seek">
+              <p:cTn id="2" dur="indefinite" nodeType="mainSeq">
+                <p:childTnLst>
+                  <p:par>
+                    <p:cTn id="3" fill="hold">
+                      <p:stCondLst>
+                        <p:cond delay="indefinite"/>
+                      </p:stCondLst>
+                      <p:childTnLst>
+                        <p:par>
+                          <p:cTn id="4" fill="hold">
+                            <p:stCondLst>
+                              <p:cond delay="0"/>
+                            </p:stCondLst>
+                            <p:childTnLst>
+                              <p:par>
+                                <p:cTn id="5" presetID="1" presetClass="mediacall" presetSubtype="0" fill="hold" nodeType="clickEffect">
+                                  <p:stCondLst>
+                                    <p:cond delay="0"/>
+                                  </p:stCondLst>
+                                  <p:childTnLst>
+                                    <p:cmd type="call" cmd="playFrom(0.0)">
+                                      <p:cBhvr>
+                                        <p:cTn id="6" dur="19800" fill="hold"/>
+                                        <p:tgtEl>
+                                          <p:spTgt spid="6"/>
+                                        </p:tgtEl>
+                                      </p:cBhvr>
+                                    </p:cmd>
+                                  </p:childTnLst>
+                                </p:cTn>
+                              </p:par>
+                            </p:childTnLst>
+                          </p:cTn>
+                        </p:par>
+                      </p:childTnLst>
+                    </p:cTn>
+                  </p:par>
+                </p:childTnLst>
+              </p:cTn>
+              <p:prevCondLst>
+                <p:cond evt="onPrev" delay="0">
+                  <p:tgtEl>
+                    <p:sldTgt/>
+                  </p:tgtEl>
+                </p:cond>
+              </p:prevCondLst>
+              <p:nextCondLst>
+                <p:cond evt="onNext" delay="0">
+                  <p:tgtEl>
+                    <p:sldTgt/>
+                  </p:tgtEl>
+                </p:cond>
+              </p:nextCondLst>
+            </p:seq>
+            <p:video>
+              <p:cMediaNode vol="80000">
+                <p:cTn id="7" fill="hold" display="0">
+                  <p:stCondLst>
+                    <p:cond delay="indefinite"/>
+                  </p:stCondLst>
+                </p:cTn>
+                <p:tgtEl>
+                  <p:spTgt spid="6"/>
+                </p:tgtEl>
+              </p:cMediaNode>
+            </p:video>
+            <p:seq concurrent="1" nextAc="seek">
+              <p:cTn id="8" restart="whenNotActive" fill="hold" evtFilter="cancelBubble" nodeType="interactiveSeq">
+                <p:stCondLst>
+                  <p:cond evt="onClick" delay="0">
+                    <p:tgtEl>
+                      <p:spTgt spid="6"/>
+                    </p:tgtEl>
+                  </p:cond>
+                </p:stCondLst>
+                <p:endSync evt="end" delay="0">
+                  <p:rtn val="all"/>
+                </p:endSync>
+                <p:childTnLst>
+                  <p:par>
+                    <p:cTn id="9" fill="hold">
+                      <p:stCondLst>
+                        <p:cond delay="0"/>
+                      </p:stCondLst>
+                      <p:childTnLst>
+                        <p:par>
+                          <p:cTn id="10" fill="hold">
+                            <p:stCondLst>
+                              <p:cond delay="0"/>
+                            </p:stCondLst>
+                            <p:childTnLst>
+                              <p:par>
+                                <p:cTn id="11" presetID="2" presetClass="mediacall" presetSubtype="0" fill="hold" nodeType="clickEffect">
+                                  <p:stCondLst>
+                                    <p:cond delay="0"/>
+                                  </p:stCondLst>
+                                  <p:childTnLst>
+                                    <p:cmd type="call" cmd="togglePause">
+                                      <p:cBhvr>
+                                        <p:cTn id="12" dur="1" fill="hold"/>
+                                        <p:tgtEl>
+                                          <p:spTgt spid="6"/>
+                                        </p:tgtEl>
+                                      </p:cBhvr>
+                                    </p:cmd>
+                                  </p:childTnLst>
+                                </p:cTn>
+                              </p:par>
+                            </p:childTnLst>
+                          </p:cTn>
+                        </p:par>
+                      </p:childTnLst>
+                    </p:cTn>
+                  </p:par>
+                </p:childTnLst>
+              </p:cTn>
+              <p:nextCondLst>
+                <p:cond evt="onClick" delay="0">
+                  <p:tgtEl>
+                    <p:spTgt spid="6"/>
+                  </p:tgtEl>
+                </p:cond>
+              </p:nextCondLst>
+            </p:seq>
+          </p:childTnLst>
+        </p:cTn>
+      </p:par>
+    </p:tnLst>
+  </p:timing>
 </p:sld>
 </file>
 
@@ -6048,8 +6165,16 @@
 </file>
 
 <file path=ppt/slides/slide9.xml><?xml version="1.0" encoding="utf-8"?>
-<p:sld xmlns:a="http://schemas.openxmlformats.org/drawingml/2006/main" xmlns:r="http://schemas.openxmlformats.org/officeDocument/2006/relationships" xmlns:p="http://schemas.openxmlformats.org/presentationml/2006/main">
+<p:sld xmlns:a="http://schemas.openxmlformats.org/drawingml/2006/main" xmlns:r="http://schemas.openxmlformats.org/officeDocument/2006/relationships" xmlns:p="http://schemas.openxmlformats.org/presentationml/2006/main" showMasterSp="0">
   <p:cSld>
+    <p:bg>
+      <p:bgPr>
+        <a:solidFill>
+          <a:schemeClr val="tx1"/>
+        </a:solidFill>
+        <a:effectLst/>
+      </p:bgPr>
+    </p:bg>
     <p:spTree>
       <p:nvGrpSpPr>
         <p:cNvPr id="1" name=""/>
@@ -6064,62 +6189,42 @@
           <a:chExt cx="0" cy="0"/>
         </a:xfrm>
       </p:grpSpPr>
-      <p:sp>
-        <p:nvSpPr>
-          <p:cNvPr id="2" name="Titel 1">
+      <p:pic>
+        <p:nvPicPr>
+          <p:cNvPr id="8" name="video_b.mp4">
+            <a:hlinkClick r:id="" action="ppaction://media"/>
             <a:extLst>
               <a:ext uri="{FF2B5EF4-FFF2-40B4-BE49-F238E27FC236}">
-                <a16:creationId xmlns:a16="http://schemas.microsoft.com/office/drawing/2014/main" id="{1BB0456F-B1D8-744F-BC69-945346AAABC1}"/>
+                <a16:creationId xmlns:a16="http://schemas.microsoft.com/office/drawing/2014/main" id="{A4B0CC85-E00C-7D4C-889E-BE19A1C84B7A}"/>
               </a:ext>
             </a:extLst>
           </p:cNvPr>
-          <p:cNvSpPr>
-            <a:spLocks noGrp="1"/>
-          </p:cNvSpPr>
-          <p:nvPr>
-            <p:ph type="title"/>
-          </p:nvPr>
-        </p:nvSpPr>
-        <p:spPr/>
-        <p:txBody>
-          <a:bodyPr/>
-          <a:lstStyle/>
-          <a:p>
-            <a:r>
-              <a:rPr lang="en-GB" dirty="0"/>
-              <a:t>Questions</a:t>
-            </a:r>
-          </a:p>
-        </p:txBody>
-      </p:sp>
-      <p:sp>
-        <p:nvSpPr>
-          <p:cNvPr id="3" name="Inhaltsplatzhalter 2">
-            <a:extLst>
-              <a:ext uri="{FF2B5EF4-FFF2-40B4-BE49-F238E27FC236}">
-                <a16:creationId xmlns:a16="http://schemas.microsoft.com/office/drawing/2014/main" id="{45C60955-55DE-AB46-AA1B-0711A9C2BC9D}"/>
-              </a:ext>
-            </a:extLst>
-          </p:cNvPr>
-          <p:cNvSpPr>
-            <a:spLocks noGrp="1"/>
-          </p:cNvSpPr>
+          <p:cNvPicPr>
+            <a:picLocks noGrp="1" noChangeAspect="1"/>
+          </p:cNvPicPr>
           <p:nvPr>
             <p:ph idx="1"/>
-          </p:nvPr>
-        </p:nvSpPr>
-        <p:spPr/>
-        <p:txBody>
-          <a:bodyPr/>
-          <a:lstStyle/>
-          <a:p>
-            <a:r>
-              <a:rPr lang="en-GB" dirty="0"/>
-              <a:t>Add other videos here</a:t>
-            </a:r>
-          </a:p>
-        </p:txBody>
-      </p:sp>
+            <a:videoFile r:link="rId2"/>
+            <p:extLst>
+              <p:ext uri="{DAA4B4D4-6D71-4841-9C94-3DE7FCFB9230}">
+                <p14:media xmlns:p14="http://schemas.microsoft.com/office/powerpoint/2010/main" r:embed="rId1"/>
+              </p:ext>
+            </p:extLst>
+          </p:nvPr>
+        </p:nvPicPr>
+        <p:blipFill>
+          <a:blip r:embed="rId4"/>
+          <a:stretch>
+            <a:fillRect/>
+          </a:stretch>
+        </p:blipFill>
+        <p:spPr>
+          <a:xfrm>
+            <a:off x="2381250" y="504825"/>
+            <a:ext cx="7948613" cy="5961063"/>
+          </a:xfrm>
+        </p:spPr>
+      </p:pic>
     </p:spTree>
     <p:extLst>
       <p:ext uri="{BB962C8B-B14F-4D97-AF65-F5344CB8AC3E}">
@@ -6130,6 +6235,141 @@
   <p:clrMapOvr>
     <a:masterClrMapping/>
   </p:clrMapOvr>
+  <p:timing>
+    <p:tnLst>
+      <p:par>
+        <p:cTn id="1" dur="indefinite" restart="never" nodeType="tmRoot">
+          <p:childTnLst>
+            <p:seq concurrent="1" nextAc="seek">
+              <p:cTn id="2" dur="indefinite" nodeType="mainSeq">
+                <p:childTnLst>
+                  <p:par>
+                    <p:cTn id="3" fill="hold">
+                      <p:stCondLst>
+                        <p:cond delay="indefinite"/>
+                      </p:stCondLst>
+                      <p:childTnLst>
+                        <p:par>
+                          <p:cTn id="4" fill="hold">
+                            <p:stCondLst>
+                              <p:cond delay="0"/>
+                            </p:stCondLst>
+                            <p:childTnLst>
+                              <p:par>
+                                <p:cTn id="5" presetID="1" presetClass="mediacall" presetSubtype="0" fill="hold" nodeType="clickEffect">
+                                  <p:stCondLst>
+                                    <p:cond delay="0"/>
+                                  </p:stCondLst>
+                                  <p:childTnLst>
+                                    <p:cmd type="call" cmd="playFrom(0.0)">
+                                      <p:cBhvr>
+                                        <p:cTn id="6" dur="19800" fill="hold"/>
+                                        <p:tgtEl>
+                                          <p:spTgt spid="8"/>
+                                        </p:tgtEl>
+                                      </p:cBhvr>
+                                    </p:cmd>
+                                  </p:childTnLst>
+                                </p:cTn>
+                              </p:par>
+                            </p:childTnLst>
+                          </p:cTn>
+                        </p:par>
+                      </p:childTnLst>
+                    </p:cTn>
+                  </p:par>
+                </p:childTnLst>
+              </p:cTn>
+              <p:prevCondLst>
+                <p:cond evt="onPrev" delay="0">
+                  <p:tgtEl>
+                    <p:sldTgt/>
+                  </p:tgtEl>
+                </p:cond>
+              </p:prevCondLst>
+              <p:nextCondLst>
+                <p:cond evt="onNext" delay="0">
+                  <p:tgtEl>
+                    <p:sldTgt/>
+                  </p:tgtEl>
+                </p:cond>
+              </p:nextCondLst>
+            </p:seq>
+            <p:video>
+              <p:cMediaNode vol="0">
+                <p:cTn id="7" repeatCount="indefinite" fill="hold" display="0">
+                  <p:stCondLst>
+                    <p:cond delay="indefinite"/>
+                  </p:stCondLst>
+                </p:cTn>
+                <p:tgtEl>
+                  <p:spTgt spid="8"/>
+                </p:tgtEl>
+              </p:cMediaNode>
+            </p:video>
+            <p:seq concurrent="1" nextAc="seek">
+              <p:cTn id="8" restart="whenNotActive" fill="hold" evtFilter="cancelBubble" nodeType="interactiveSeq">
+                <p:stCondLst>
+                  <p:cond evt="onClick" delay="0">
+                    <p:tgtEl>
+                      <p:spTgt spid="8"/>
+                    </p:tgtEl>
+                  </p:cond>
+                </p:stCondLst>
+                <p:endSync evt="end" delay="0">
+                  <p:rtn val="all"/>
+                </p:endSync>
+                <p:childTnLst>
+                  <p:par>
+                    <p:cTn id="9" fill="hold">
+                      <p:stCondLst>
+                        <p:cond delay="0"/>
+                      </p:stCondLst>
+                      <p:childTnLst>
+                        <p:par>
+                          <p:cTn id="10" fill="hold">
+                            <p:stCondLst>
+                              <p:cond delay="0"/>
+                            </p:stCondLst>
+                            <p:childTnLst>
+                              <p:par>
+                                <p:cTn id="11" presetID="2" presetClass="mediacall" presetSubtype="0" fill="hold" nodeType="clickEffect">
+                                  <p:stCondLst>
+                                    <p:cond delay="0"/>
+                                  </p:stCondLst>
+                                  <p:childTnLst>
+                                    <p:cmd type="call" cmd="togglePause">
+                                      <p:cBhvr>
+                                        <p:cTn id="12" dur="1" fill="hold"/>
+                                        <p:tgtEl>
+                                          <p:spTgt spid="8"/>
+                                        </p:tgtEl>
+                                      </p:cBhvr>
+                                    </p:cmd>
+                                  </p:childTnLst>
+                                </p:cTn>
+                              </p:par>
+                            </p:childTnLst>
+                          </p:cTn>
+                        </p:par>
+                      </p:childTnLst>
+                    </p:cTn>
+                  </p:par>
+                </p:childTnLst>
+              </p:cTn>
+              <p:nextCondLst>
+                <p:cond evt="onClick" delay="0">
+                  <p:tgtEl>
+                    <p:spTgt spid="8"/>
+                  </p:tgtEl>
+                </p:cond>
+              </p:nextCondLst>
+            </p:seq>
+          </p:childTnLst>
+        </p:cTn>
+      </p:par>
+    </p:tnLst>
+  </p:timing>
 </p:sld>
 </file>
 

</xml_diff>

<commit_message>
added the animation slide
</commit_message>
<xml_diff>
--- a/isip_presentation.pptx
+++ b/isip_presentation.pptx
@@ -5,7 +5,7 @@
     <p:sldMasterId id="2147483714" r:id="rId1"/>
   </p:sldMasterIdLst>
   <p:notesMasterIdLst>
-    <p:notesMasterId r:id="rId11"/>
+    <p:notesMasterId r:id="rId12"/>
   </p:notesMasterIdLst>
   <p:sldIdLst>
     <p:sldId id="256" r:id="rId2"/>
@@ -13,10 +13,11 @@
     <p:sldId id="264" r:id="rId4"/>
     <p:sldId id="263" r:id="rId5"/>
     <p:sldId id="259" r:id="rId6"/>
-    <p:sldId id="260" r:id="rId7"/>
-    <p:sldId id="261" r:id="rId8"/>
-    <p:sldId id="262" r:id="rId9"/>
-    <p:sldId id="265" r:id="rId10"/>
+    <p:sldId id="257" r:id="rId7"/>
+    <p:sldId id="260" r:id="rId8"/>
+    <p:sldId id="261" r:id="rId9"/>
+    <p:sldId id="262" r:id="rId10"/>
+    <p:sldId id="265" r:id="rId11"/>
   </p:sldIdLst>
   <p:sldSz cx="12192000" cy="6858000"/>
   <p:notesSz cx="6858000" cy="9144000"/>
@@ -205,7 +206,7 @@
           <a:p>
             <a:fld id="{7D31DDB2-3D33-4349-ACAB-04EB8925B64A}" type="datetimeFigureOut">
               <a:rPr lang="en-GB" smtClean="0"/>
-              <a:t>16/05/2018</a:t>
+              <a:t>22/05/2018</a:t>
             </a:fld>
             <a:endParaRPr lang="en-GB"/>
           </a:p>
@@ -1238,7 +1239,7 @@
       </p:grpSpPr>
       <p:sp>
         <p:nvSpPr>
-          <p:cNvPr id="2" name="Folienbildplatzhalter 1"/>
+          <p:cNvPr id="2" name="Slide Image Placeholder 1"/>
           <p:cNvSpPr>
             <a:spLocks noGrp="1" noRot="1" noChangeAspect="1"/>
           </p:cNvSpPr>
@@ -1250,7 +1251,7 @@
       </p:sp>
       <p:sp>
         <p:nvSpPr>
-          <p:cNvPr id="3" name="Notizenplatzhalter 2"/>
+          <p:cNvPr id="3" name="Notes Placeholder 2"/>
           <p:cNvSpPr>
             <a:spLocks noGrp="1"/>
           </p:cNvSpPr>
@@ -1263,16 +1264,97 @@
           <a:bodyPr/>
           <a:lstStyle/>
           <a:p>
-            <a:r>
-              <a:rPr lang="en-GB" dirty="0"/>
-              <a:t>Grayscale -&gt; less noisy</a:t>
-            </a:r>
-          </a:p>
-        </p:txBody>
-      </p:sp>
-      <p:sp>
-        <p:nvSpPr>
-          <p:cNvPr id="4" name="Foliennummernplatzhalter 3"/>
+            <a:pPr marL="228600" indent="-228600">
+              <a:buAutoNum type="arabicPeriod"/>
+            </a:pPr>
+            <a:r>
+              <a:rPr lang="en-US" dirty="0"/>
+              <a:t>We start with a previously found point (red small dot that was found in step before) and 15 templates</a:t>
+            </a:r>
+          </a:p>
+          <a:p>
+            <a:pPr marL="228600" indent="-228600">
+              <a:buAutoNum type="arabicPeriod"/>
+            </a:pPr>
+            <a:r>
+              <a:rPr lang="en-US" dirty="0"/>
+              <a:t>Put a larger frame around the red dot</a:t>
+            </a:r>
+          </a:p>
+          <a:p>
+            <a:pPr marL="228600" indent="-228600">
+              <a:buAutoNum type="arabicPeriod"/>
+            </a:pPr>
+            <a:r>
+              <a:rPr lang="en-US" dirty="0"/>
+              <a:t>The red point disappears and the tool moves slightly but the green larger frame remains as it was</a:t>
+            </a:r>
+          </a:p>
+          <a:p>
+            <a:pPr marL="228600" indent="-228600">
+              <a:buAutoNum type="arabicPeriod"/>
+            </a:pPr>
+            <a:r>
+              <a:rPr lang="en-US" dirty="0"/>
+              <a:t>The green frame is cut out and flies to the templates</a:t>
+            </a:r>
+          </a:p>
+          <a:p>
+            <a:pPr marL="228600" indent="-228600">
+              <a:buAutoNum type="arabicPeriod"/>
+            </a:pPr>
+            <a:r>
+              <a:rPr lang="en-US" dirty="0"/>
+              <a:t>NCC</a:t>
+            </a:r>
+          </a:p>
+          <a:p>
+            <a:pPr marL="228600" indent="-228600">
+              <a:buAutoNum type="arabicPeriod"/>
+            </a:pPr>
+            <a:r>
+              <a:rPr lang="en-US" dirty="0"/>
+              <a:t>A smaller patch from the frame is chosen as the best and an arrow indicates that this is where the new red dot appears (no green frame needed)</a:t>
+            </a:r>
+          </a:p>
+          <a:p>
+            <a:pPr marL="228600" indent="-228600">
+              <a:buAutoNum type="arabicPeriod"/>
+            </a:pPr>
+            <a:r>
+              <a:rPr lang="en-US" dirty="0"/>
+              <a:t>The smaller template is added to the 15 templates, all move to the left and the last one is removed</a:t>
+            </a:r>
+          </a:p>
+          <a:p>
+            <a:pPr marL="0" indent="0">
+              <a:buNone/>
+            </a:pPr>
+            <a:endParaRPr lang="en-US" dirty="0"/>
+          </a:p>
+          <a:p>
+            <a:pPr marL="228600" indent="-228600">
+              <a:buAutoNum type="arabicPeriod"/>
+            </a:pPr>
+            <a:endParaRPr lang="en-US" dirty="0"/>
+          </a:p>
+          <a:p>
+            <a:pPr marL="228600" indent="-228600">
+              <a:buAutoNum type="arabicPeriod"/>
+            </a:pPr>
+            <a:endParaRPr lang="en-US" dirty="0"/>
+          </a:p>
+          <a:p>
+            <a:pPr marL="228600" indent="-228600">
+              <a:buAutoNum type="arabicPeriod"/>
+            </a:pPr>
+            <a:endParaRPr lang="en-US" dirty="0"/>
+          </a:p>
+        </p:txBody>
+      </p:sp>
+      <p:sp>
+        <p:nvSpPr>
+          <p:cNvPr id="4" name="Slide Number Placeholder 3"/>
           <p:cNvSpPr>
             <a:spLocks noGrp="1"/>
           </p:cNvSpPr>
@@ -1285,18 +1367,18 @@
           <a:bodyPr/>
           <a:lstStyle/>
           <a:p>
-            <a:fld id="{10AAEC32-5D25-9343-A64A-6E65754FBAB3}" type="slidenum">
-              <a:rPr lang="en-GB" smtClean="0"/>
+            <a:fld id="{B4B31D13-2A84-4ACC-A9B0-65DD4557F59E}" type="slidenum">
+              <a:rPr lang="en-US" smtClean="0"/>
               <a:t>6</a:t>
             </a:fld>
-            <a:endParaRPr lang="en-GB"/>
+            <a:endParaRPr lang="en-US"/>
           </a:p>
         </p:txBody>
       </p:sp>
     </p:spTree>
     <p:extLst>
       <p:ext uri="{BB962C8B-B14F-4D97-AF65-F5344CB8AC3E}">
-        <p14:creationId xmlns:p14="http://schemas.microsoft.com/office/powerpoint/2010/main" val="690672708"/>
+        <p14:creationId xmlns:p14="http://schemas.microsoft.com/office/powerpoint/2010/main" val="1681353851"/>
       </p:ext>
     </p:extLst>
   </p:cSld>
@@ -1352,13 +1434,7 @@
           <a:p>
             <a:r>
               <a:rPr lang="en-GB" dirty="0"/>
-              <a:t>Qualities: perfect for A, nearly perfect for B. Very generic, will most probably also work for other image sets. No training images required, uses the information contained in the images itself.</a:t>
-            </a:r>
-          </a:p>
-          <a:p>
-            <a:r>
-              <a:rPr lang="en-GB" dirty="0"/>
-              <a:t>Limitations: First image needs to have a known starting position.</a:t>
+              <a:t>Grayscale -&gt; less noisy</a:t>
             </a:r>
           </a:p>
         </p:txBody>
@@ -1381,6 +1457,99 @@
             <a:fld id="{10AAEC32-5D25-9343-A64A-6E65754FBAB3}" type="slidenum">
               <a:rPr lang="en-GB" smtClean="0"/>
               <a:t>7</a:t>
+            </a:fld>
+            <a:endParaRPr lang="en-GB"/>
+          </a:p>
+        </p:txBody>
+      </p:sp>
+    </p:spTree>
+    <p:extLst>
+      <p:ext uri="{BB962C8B-B14F-4D97-AF65-F5344CB8AC3E}">
+        <p14:creationId xmlns:p14="http://schemas.microsoft.com/office/powerpoint/2010/main" val="690672708"/>
+      </p:ext>
+    </p:extLst>
+  </p:cSld>
+  <p:clrMapOvr>
+    <a:masterClrMapping/>
+  </p:clrMapOvr>
+</p:notes>
+</file>
+
+<file path=ppt/notesSlides/notesSlide7.xml><?xml version="1.0" encoding="utf-8"?>
+<p:notes xmlns:a="http://schemas.openxmlformats.org/drawingml/2006/main" xmlns:r="http://schemas.openxmlformats.org/officeDocument/2006/relationships" xmlns:p="http://schemas.openxmlformats.org/presentationml/2006/main">
+  <p:cSld>
+    <p:spTree>
+      <p:nvGrpSpPr>
+        <p:cNvPr id="1" name=""/>
+        <p:cNvGrpSpPr/>
+        <p:nvPr/>
+      </p:nvGrpSpPr>
+      <p:grpSpPr>
+        <a:xfrm>
+          <a:off x="0" y="0"/>
+          <a:ext cx="0" cy="0"/>
+          <a:chOff x="0" y="0"/>
+          <a:chExt cx="0" cy="0"/>
+        </a:xfrm>
+      </p:grpSpPr>
+      <p:sp>
+        <p:nvSpPr>
+          <p:cNvPr id="2" name="Folienbildplatzhalter 1"/>
+          <p:cNvSpPr>
+            <a:spLocks noGrp="1" noRot="1" noChangeAspect="1"/>
+          </p:cNvSpPr>
+          <p:nvPr>
+            <p:ph type="sldImg"/>
+          </p:nvPr>
+        </p:nvSpPr>
+        <p:spPr/>
+      </p:sp>
+      <p:sp>
+        <p:nvSpPr>
+          <p:cNvPr id="3" name="Notizenplatzhalter 2"/>
+          <p:cNvSpPr>
+            <a:spLocks noGrp="1"/>
+          </p:cNvSpPr>
+          <p:nvPr>
+            <p:ph type="body" idx="1"/>
+          </p:nvPr>
+        </p:nvSpPr>
+        <p:spPr/>
+        <p:txBody>
+          <a:bodyPr/>
+          <a:lstStyle/>
+          <a:p>
+            <a:r>
+              <a:rPr lang="en-GB" dirty="0"/>
+              <a:t>Qualities: perfect for A, nearly perfect for B. Very generic, will most probably also work for other image sets. No training images required, uses the information contained in the images itself.</a:t>
+            </a:r>
+          </a:p>
+          <a:p>
+            <a:r>
+              <a:rPr lang="en-GB" dirty="0"/>
+              <a:t>Limitations: First image needs to have a known starting position.</a:t>
+            </a:r>
+          </a:p>
+        </p:txBody>
+      </p:sp>
+      <p:sp>
+        <p:nvSpPr>
+          <p:cNvPr id="4" name="Foliennummernplatzhalter 3"/>
+          <p:cNvSpPr>
+            <a:spLocks noGrp="1"/>
+          </p:cNvSpPr>
+          <p:nvPr>
+            <p:ph type="sldNum" sz="quarter" idx="10"/>
+          </p:nvPr>
+        </p:nvSpPr>
+        <p:spPr/>
+        <p:txBody>
+          <a:bodyPr/>
+          <a:lstStyle/>
+          <a:p>
+            <a:fld id="{10AAEC32-5D25-9343-A64A-6E65754FBAB3}" type="slidenum">
+              <a:rPr lang="en-GB" smtClean="0"/>
+              <a:t>8</a:t>
             </a:fld>
             <a:endParaRPr lang="en-GB"/>
           </a:p>
@@ -1568,7 +1737,7 @@
           <a:p>
             <a:fld id="{6918DB91-F5E1-CB4E-825E-9A43DB17E472}" type="datetimeFigureOut">
               <a:rPr lang="de-DE" smtClean="0"/>
-              <a:t>16.05.18</a:t>
+              <a:t>22.05.2018</a:t>
             </a:fld>
             <a:endParaRPr lang="de-DE"/>
           </a:p>
@@ -1898,7 +2067,7 @@
           <a:p>
             <a:fld id="{6918DB91-F5E1-CB4E-825E-9A43DB17E472}" type="datetimeFigureOut">
               <a:rPr lang="de-DE" smtClean="0"/>
-              <a:t>16.05.18</a:t>
+              <a:t>22.05.2018</a:t>
             </a:fld>
             <a:endParaRPr lang="de-DE"/>
           </a:p>
@@ -2078,7 +2247,7 @@
           <a:p>
             <a:fld id="{6918DB91-F5E1-CB4E-825E-9A43DB17E472}" type="datetimeFigureOut">
               <a:rPr lang="de-DE" smtClean="0"/>
-              <a:t>16.05.18</a:t>
+              <a:t>22.05.2018</a:t>
             </a:fld>
             <a:endParaRPr lang="de-DE"/>
           </a:p>
@@ -2248,7 +2417,7 @@
           <a:p>
             <a:fld id="{6918DB91-F5E1-CB4E-825E-9A43DB17E472}" type="datetimeFigureOut">
               <a:rPr lang="de-DE" smtClean="0"/>
-              <a:t>16.05.18</a:t>
+              <a:t>22.05.2018</a:t>
             </a:fld>
             <a:endParaRPr lang="de-DE"/>
           </a:p>
@@ -2525,7 +2694,7 @@
           <a:p>
             <a:fld id="{6918DB91-F5E1-CB4E-825E-9A43DB17E472}" type="datetimeFigureOut">
               <a:rPr lang="de-DE" smtClean="0"/>
-              <a:t>16.05.18</a:t>
+              <a:t>22.05.2018</a:t>
             </a:fld>
             <a:endParaRPr lang="de-DE"/>
           </a:p>
@@ -2919,7 +3088,7 @@
           <a:p>
             <a:fld id="{6918DB91-F5E1-CB4E-825E-9A43DB17E472}" type="datetimeFigureOut">
               <a:rPr lang="de-DE" smtClean="0"/>
-              <a:t>16.05.18</a:t>
+              <a:t>22.05.2018</a:t>
             </a:fld>
             <a:endParaRPr lang="de-DE"/>
           </a:p>
@@ -3396,7 +3565,7 @@
           <a:p>
             <a:fld id="{6918DB91-F5E1-CB4E-825E-9A43DB17E472}" type="datetimeFigureOut">
               <a:rPr lang="de-DE" smtClean="0"/>
-              <a:t>16.05.18</a:t>
+              <a:t>22.05.2018</a:t>
             </a:fld>
             <a:endParaRPr lang="de-DE"/>
           </a:p>
@@ -3514,7 +3683,7 @@
           <a:p>
             <a:fld id="{6918DB91-F5E1-CB4E-825E-9A43DB17E472}" type="datetimeFigureOut">
               <a:rPr lang="de-DE" smtClean="0"/>
-              <a:t>16.05.18</a:t>
+              <a:t>22.05.2018</a:t>
             </a:fld>
             <a:endParaRPr lang="de-DE"/>
           </a:p>
@@ -3609,7 +3778,7 @@
           <a:p>
             <a:fld id="{6918DB91-F5E1-CB4E-825E-9A43DB17E472}" type="datetimeFigureOut">
               <a:rPr lang="de-DE" smtClean="0"/>
-              <a:t>16.05.18</a:t>
+              <a:t>22.05.2018</a:t>
             </a:fld>
             <a:endParaRPr lang="de-DE"/>
           </a:p>
@@ -3955,7 +4124,7 @@
           <a:p>
             <a:fld id="{6918DB91-F5E1-CB4E-825E-9A43DB17E472}" type="datetimeFigureOut">
               <a:rPr lang="de-DE" smtClean="0"/>
-              <a:t>16.05.18</a:t>
+              <a:t>22.05.2018</a:t>
             </a:fld>
             <a:endParaRPr lang="de-DE"/>
           </a:p>
@@ -4343,7 +4512,7 @@
           <a:p>
             <a:fld id="{6918DB91-F5E1-CB4E-825E-9A43DB17E472}" type="datetimeFigureOut">
               <a:rPr lang="de-DE" smtClean="0"/>
-              <a:t>16.05.18</a:t>
+              <a:t>22.05.2018</a:t>
             </a:fld>
             <a:endParaRPr lang="de-DE"/>
           </a:p>
@@ -4621,7 +4790,7 @@
           <a:p>
             <a:fld id="{6918DB91-F5E1-CB4E-825E-9A43DB17E472}" type="datetimeFigureOut">
               <a:rPr lang="de-DE" smtClean="0"/>
-              <a:t>16.05.18</a:t>
+              <a:t>22.05.2018</a:t>
             </a:fld>
             <a:endParaRPr lang="de-DE"/>
           </a:p>
@@ -5232,6 +5401,215 @@
 </p:sld>
 </file>
 
+<file path=ppt/slides/slide10.xml><?xml version="1.0" encoding="utf-8"?>
+<p:sld xmlns:a="http://schemas.openxmlformats.org/drawingml/2006/main" xmlns:r="http://schemas.openxmlformats.org/officeDocument/2006/relationships" xmlns:p="http://schemas.openxmlformats.org/presentationml/2006/main" showMasterSp="0">
+  <p:cSld>
+    <p:bg>
+      <p:bgPr>
+        <a:solidFill>
+          <a:schemeClr val="tx1"/>
+        </a:solidFill>
+        <a:effectLst/>
+      </p:bgPr>
+    </p:bg>
+    <p:spTree>
+      <p:nvGrpSpPr>
+        <p:cNvPr id="1" name=""/>
+        <p:cNvGrpSpPr/>
+        <p:nvPr/>
+      </p:nvGrpSpPr>
+      <p:grpSpPr>
+        <a:xfrm>
+          <a:off x="0" y="0"/>
+          <a:ext cx="0" cy="0"/>
+          <a:chOff x="0" y="0"/>
+          <a:chExt cx="0" cy="0"/>
+        </a:xfrm>
+      </p:grpSpPr>
+      <p:pic>
+        <p:nvPicPr>
+          <p:cNvPr id="8" name="video_b.mp4">
+            <a:hlinkClick r:id="" action="ppaction://media"/>
+            <a:extLst>
+              <a:ext uri="{FF2B5EF4-FFF2-40B4-BE49-F238E27FC236}">
+                <a16:creationId xmlns:a16="http://schemas.microsoft.com/office/drawing/2014/main" id="{A4B0CC85-E00C-7D4C-889E-BE19A1C84B7A}"/>
+              </a:ext>
+            </a:extLst>
+          </p:cNvPr>
+          <p:cNvPicPr>
+            <a:picLocks noGrp="1" noChangeAspect="1"/>
+          </p:cNvPicPr>
+          <p:nvPr>
+            <p:ph idx="1"/>
+            <a:videoFile r:link="rId2"/>
+            <p:extLst>
+              <p:ext uri="{DAA4B4D4-6D71-4841-9C94-3DE7FCFB9230}">
+                <p14:media xmlns:p14="http://schemas.microsoft.com/office/powerpoint/2010/main" r:embed="rId1"/>
+              </p:ext>
+            </p:extLst>
+          </p:nvPr>
+        </p:nvPicPr>
+        <p:blipFill>
+          <a:blip r:embed="rId4"/>
+          <a:stretch>
+            <a:fillRect/>
+          </a:stretch>
+        </p:blipFill>
+        <p:spPr>
+          <a:xfrm>
+            <a:off x="2381250" y="504825"/>
+            <a:ext cx="7948613" cy="5961063"/>
+          </a:xfrm>
+        </p:spPr>
+      </p:pic>
+    </p:spTree>
+    <p:extLst>
+      <p:ext uri="{BB962C8B-B14F-4D97-AF65-F5344CB8AC3E}">
+        <p14:creationId xmlns:p14="http://schemas.microsoft.com/office/powerpoint/2010/main" val="2553568828"/>
+      </p:ext>
+    </p:extLst>
+  </p:cSld>
+  <p:clrMapOvr>
+    <a:masterClrMapping/>
+  </p:clrMapOvr>
+  <p:timing>
+    <p:tnLst>
+      <p:par>
+        <p:cTn id="1" dur="indefinite" restart="never" nodeType="tmRoot">
+          <p:childTnLst>
+            <p:seq concurrent="1" nextAc="seek">
+              <p:cTn id="2" dur="indefinite" nodeType="mainSeq">
+                <p:childTnLst>
+                  <p:par>
+                    <p:cTn id="3" fill="hold">
+                      <p:stCondLst>
+                        <p:cond delay="indefinite"/>
+                      </p:stCondLst>
+                      <p:childTnLst>
+                        <p:par>
+                          <p:cTn id="4" fill="hold">
+                            <p:stCondLst>
+                              <p:cond delay="0"/>
+                            </p:stCondLst>
+                            <p:childTnLst>
+                              <p:par>
+                                <p:cTn id="5" presetID="1" presetClass="mediacall" presetSubtype="0" fill="hold" nodeType="clickEffect">
+                                  <p:stCondLst>
+                                    <p:cond delay="0"/>
+                                  </p:stCondLst>
+                                  <p:childTnLst>
+                                    <p:cmd type="call" cmd="playFrom(0.0)">
+                                      <p:cBhvr>
+                                        <p:cTn id="6" dur="19800" fill="hold"/>
+                                        <p:tgtEl>
+                                          <p:spTgt spid="8"/>
+                                        </p:tgtEl>
+                                      </p:cBhvr>
+                                    </p:cmd>
+                                  </p:childTnLst>
+                                </p:cTn>
+                              </p:par>
+                            </p:childTnLst>
+                          </p:cTn>
+                        </p:par>
+                      </p:childTnLst>
+                    </p:cTn>
+                  </p:par>
+                </p:childTnLst>
+              </p:cTn>
+              <p:prevCondLst>
+                <p:cond evt="onPrev" delay="0">
+                  <p:tgtEl>
+                    <p:sldTgt/>
+                  </p:tgtEl>
+                </p:cond>
+              </p:prevCondLst>
+              <p:nextCondLst>
+                <p:cond evt="onNext" delay="0">
+                  <p:tgtEl>
+                    <p:sldTgt/>
+                  </p:tgtEl>
+                </p:cond>
+              </p:nextCondLst>
+            </p:seq>
+            <p:video>
+              <p:cMediaNode vol="0">
+                <p:cTn id="7" repeatCount="indefinite" fill="hold" display="0">
+                  <p:stCondLst>
+                    <p:cond delay="indefinite"/>
+                  </p:stCondLst>
+                </p:cTn>
+                <p:tgtEl>
+                  <p:spTgt spid="8"/>
+                </p:tgtEl>
+              </p:cMediaNode>
+            </p:video>
+            <p:seq concurrent="1" nextAc="seek">
+              <p:cTn id="8" restart="whenNotActive" fill="hold" evtFilter="cancelBubble" nodeType="interactiveSeq">
+                <p:stCondLst>
+                  <p:cond evt="onClick" delay="0">
+                    <p:tgtEl>
+                      <p:spTgt spid="8"/>
+                    </p:tgtEl>
+                  </p:cond>
+                </p:stCondLst>
+                <p:endSync evt="end" delay="0">
+                  <p:rtn val="all"/>
+                </p:endSync>
+                <p:childTnLst>
+                  <p:par>
+                    <p:cTn id="9" fill="hold">
+                      <p:stCondLst>
+                        <p:cond delay="0"/>
+                      </p:stCondLst>
+                      <p:childTnLst>
+                        <p:par>
+                          <p:cTn id="10" fill="hold">
+                            <p:stCondLst>
+                              <p:cond delay="0"/>
+                            </p:stCondLst>
+                            <p:childTnLst>
+                              <p:par>
+                                <p:cTn id="11" presetID="2" presetClass="mediacall" presetSubtype="0" fill="hold" nodeType="clickEffect">
+                                  <p:stCondLst>
+                                    <p:cond delay="0"/>
+                                  </p:stCondLst>
+                                  <p:childTnLst>
+                                    <p:cmd type="call" cmd="togglePause">
+                                      <p:cBhvr>
+                                        <p:cTn id="12" dur="1" fill="hold"/>
+                                        <p:tgtEl>
+                                          <p:spTgt spid="8"/>
+                                        </p:tgtEl>
+                                      </p:cBhvr>
+                                    </p:cmd>
+                                  </p:childTnLst>
+                                </p:cTn>
+                              </p:par>
+                            </p:childTnLst>
+                          </p:cTn>
+                        </p:par>
+                      </p:childTnLst>
+                    </p:cTn>
+                  </p:par>
+                </p:childTnLst>
+              </p:cTn>
+              <p:nextCondLst>
+                <p:cond evt="onClick" delay="0">
+                  <p:tgtEl>
+                    <p:spTgt spid="8"/>
+                  </p:tgtEl>
+                </p:cond>
+              </p:nextCondLst>
+            </p:seq>
+          </p:childTnLst>
+        </p:cTn>
+      </p:par>
+    </p:tnLst>
+  </p:timing>
+</p:sld>
+</file>
+
 <file path=ppt/slides/slide2.xml><?xml version="1.0" encoding="utf-8"?>
 <p:sld xmlns:a="http://schemas.openxmlformats.org/drawingml/2006/main" xmlns:r="http://schemas.openxmlformats.org/officeDocument/2006/relationships" xmlns:p="http://schemas.openxmlformats.org/presentationml/2006/main">
   <p:cSld>
@@ -5779,6 +6157,2444 @@
           <a:chExt cx="0" cy="0"/>
         </a:xfrm>
       </p:grpSpPr>
+      <p:pic>
+        <p:nvPicPr>
+          <p:cNvPr id="89" name="Graphic 88">
+            <a:extLst>
+              <a:ext uri="{FF2B5EF4-FFF2-40B4-BE49-F238E27FC236}">
+                <a16:creationId xmlns:a16="http://schemas.microsoft.com/office/drawing/2014/main" id="{8FE3FBED-BAA8-407A-A719-3BE076D74FB2}"/>
+              </a:ext>
+            </a:extLst>
+          </p:cNvPr>
+          <p:cNvPicPr>
+            <a:picLocks noChangeAspect="1"/>
+          </p:cNvPicPr>
+          <p:nvPr/>
+        </p:nvPicPr>
+        <p:blipFill>
+          <a:blip r:embed="rId3">
+            <a:extLst>
+              <a:ext uri="{96DAC541-7B7A-43D3-8B79-37D633B846F1}">
+                <asvg:svgBlip xmlns:asvg="http://schemas.microsoft.com/office/drawing/2016/SVG/main" r:embed="rId4"/>
+              </a:ext>
+            </a:extLst>
+          </a:blip>
+          <a:stretch>
+            <a:fillRect/>
+          </a:stretch>
+        </p:blipFill>
+        <p:spPr>
+          <a:xfrm>
+            <a:off x="569512" y="1192452"/>
+            <a:ext cx="5470829" cy="4264528"/>
+          </a:xfrm>
+          <a:prstGeom prst="rect">
+            <a:avLst/>
+          </a:prstGeom>
+        </p:spPr>
+      </p:pic>
+      <p:pic>
+        <p:nvPicPr>
+          <p:cNvPr id="32" name="Picture 31">
+            <a:extLst>
+              <a:ext uri="{FF2B5EF4-FFF2-40B4-BE49-F238E27FC236}">
+                <a16:creationId xmlns:a16="http://schemas.microsoft.com/office/drawing/2014/main" id="{B7B041B3-2D81-4132-A441-8489C6D17517}"/>
+              </a:ext>
+            </a:extLst>
+          </p:cNvPr>
+          <p:cNvPicPr>
+            <a:picLocks noChangeAspect="1"/>
+          </p:cNvPicPr>
+          <p:nvPr/>
+        </p:nvPicPr>
+        <p:blipFill>
+          <a:blip r:embed="rId5">
+            <a:extLst>
+              <a:ext uri="{28A0092B-C50C-407E-A947-70E740481C1C}">
+                <a14:useLocalDpi xmlns:a14="http://schemas.microsoft.com/office/drawing/2010/main" val="0"/>
+              </a:ext>
+            </a:extLst>
+          </a:blip>
+          <a:stretch>
+            <a:fillRect/>
+          </a:stretch>
+        </p:blipFill>
+        <p:spPr>
+          <a:xfrm>
+            <a:off x="8554863" y="718882"/>
+            <a:ext cx="584391" cy="481264"/>
+          </a:xfrm>
+          <a:prstGeom prst="rect">
+            <a:avLst/>
+          </a:prstGeom>
+        </p:spPr>
+      </p:pic>
+      <p:pic>
+        <p:nvPicPr>
+          <p:cNvPr id="90" name="Graphic 89">
+            <a:extLst>
+              <a:ext uri="{FF2B5EF4-FFF2-40B4-BE49-F238E27FC236}">
+                <a16:creationId xmlns:a16="http://schemas.microsoft.com/office/drawing/2014/main" id="{2814713C-5AC8-4C07-A75C-2F39B27B42A7}"/>
+              </a:ext>
+            </a:extLst>
+          </p:cNvPr>
+          <p:cNvPicPr>
+            <a:picLocks noChangeAspect="1"/>
+          </p:cNvPicPr>
+          <p:nvPr/>
+        </p:nvPicPr>
+        <p:blipFill>
+          <a:blip r:embed="rId6">
+            <a:extLst>
+              <a:ext uri="{96DAC541-7B7A-43D3-8B79-37D633B846F1}">
+                <asvg:svgBlip xmlns:asvg="http://schemas.microsoft.com/office/drawing/2016/SVG/main" r:embed="rId7"/>
+              </a:ext>
+            </a:extLst>
+          </a:blip>
+          <a:stretch>
+            <a:fillRect/>
+          </a:stretch>
+        </p:blipFill>
+        <p:spPr>
+          <a:xfrm>
+            <a:off x="3136051" y="3190010"/>
+            <a:ext cx="1706978" cy="884525"/>
+          </a:xfrm>
+          <a:prstGeom prst="rect">
+            <a:avLst/>
+          </a:prstGeom>
+        </p:spPr>
+      </p:pic>
+      <p:sp>
+        <p:nvSpPr>
+          <p:cNvPr id="9" name="TextBox 8">
+            <a:extLst>
+              <a:ext uri="{FF2B5EF4-FFF2-40B4-BE49-F238E27FC236}">
+                <a16:creationId xmlns:a16="http://schemas.microsoft.com/office/drawing/2014/main" id="{D98C682A-67E5-4016-93F8-B68A88EBEEE7}"/>
+              </a:ext>
+            </a:extLst>
+          </p:cNvPr>
+          <p:cNvSpPr txBox="1"/>
+          <p:nvPr/>
+        </p:nvSpPr>
+        <p:spPr>
+          <a:xfrm>
+            <a:off x="8417930" y="-51699"/>
+            <a:ext cx="1443793" cy="369332"/>
+          </a:xfrm>
+          <a:prstGeom prst="rect">
+            <a:avLst/>
+          </a:prstGeom>
+          <a:noFill/>
+        </p:spPr>
+        <p:txBody>
+          <a:bodyPr wrap="none" rtlCol="0">
+            <a:spAutoFit/>
+          </a:bodyPr>
+          <a:lstStyle/>
+          <a:p>
+            <a:r>
+              <a:rPr lang="en-US" b="1" dirty="0">
+                <a:solidFill>
+                  <a:srgbClr val="FF0000"/>
+                </a:solidFill>
+              </a:rPr>
+              <a:t>15</a:t>
+            </a:r>
+            <a:r>
+              <a:rPr lang="en-US" b="1" dirty="0"/>
+              <a:t> </a:t>
+            </a:r>
+            <a:r>
+              <a:rPr lang="en-US" b="1" dirty="0">
+                <a:solidFill>
+                  <a:srgbClr val="FF0000"/>
+                </a:solidFill>
+              </a:rPr>
+              <a:t>Templates</a:t>
+            </a:r>
+          </a:p>
+        </p:txBody>
+      </p:sp>
+      <p:pic>
+        <p:nvPicPr>
+          <p:cNvPr id="13" name="Picture 12">
+            <a:extLst>
+              <a:ext uri="{FF2B5EF4-FFF2-40B4-BE49-F238E27FC236}">
+                <a16:creationId xmlns:a16="http://schemas.microsoft.com/office/drawing/2014/main" id="{BB74C976-F9EB-450A-B13B-239D3FD9BBBF}"/>
+              </a:ext>
+            </a:extLst>
+          </p:cNvPr>
+          <p:cNvPicPr>
+            <a:picLocks noChangeAspect="1"/>
+          </p:cNvPicPr>
+          <p:nvPr/>
+        </p:nvPicPr>
+        <p:blipFill>
+          <a:blip r:embed="rId8">
+            <a:extLst>
+              <a:ext uri="{28A0092B-C50C-407E-A947-70E740481C1C}">
+                <a14:useLocalDpi xmlns:a14="http://schemas.microsoft.com/office/drawing/2010/main" val="0"/>
+              </a:ext>
+            </a:extLst>
+          </a:blip>
+          <a:stretch>
+            <a:fillRect/>
+          </a:stretch>
+        </p:blipFill>
+        <p:spPr>
+          <a:xfrm>
+            <a:off x="6954793" y="713757"/>
+            <a:ext cx="584391" cy="481263"/>
+          </a:xfrm>
+          <a:prstGeom prst="rect">
+            <a:avLst/>
+          </a:prstGeom>
+        </p:spPr>
+      </p:pic>
+      <p:pic>
+        <p:nvPicPr>
+          <p:cNvPr id="21" name="Picture 20">
+            <a:extLst>
+              <a:ext uri="{FF2B5EF4-FFF2-40B4-BE49-F238E27FC236}">
+                <a16:creationId xmlns:a16="http://schemas.microsoft.com/office/drawing/2014/main" id="{ED3DDAF6-5286-45D5-AADA-2C92ECB6A37A}"/>
+              </a:ext>
+            </a:extLst>
+          </p:cNvPr>
+          <p:cNvPicPr>
+            <a:picLocks noChangeAspect="1"/>
+          </p:cNvPicPr>
+          <p:nvPr/>
+        </p:nvPicPr>
+        <p:blipFill>
+          <a:blip r:embed="rId9">
+            <a:extLst>
+              <a:ext uri="{28A0092B-C50C-407E-A947-70E740481C1C}">
+                <a14:useLocalDpi xmlns:a14="http://schemas.microsoft.com/office/drawing/2010/main" val="0"/>
+              </a:ext>
+            </a:extLst>
+          </a:blip>
+          <a:stretch>
+            <a:fillRect/>
+          </a:stretch>
+        </p:blipFill>
+        <p:spPr>
+          <a:xfrm>
+            <a:off x="7733315" y="713756"/>
+            <a:ext cx="584391" cy="481263"/>
+          </a:xfrm>
+          <a:prstGeom prst="rect">
+            <a:avLst/>
+          </a:prstGeom>
+        </p:spPr>
+      </p:pic>
+      <p:sp>
+        <p:nvSpPr>
+          <p:cNvPr id="27" name="Right Brace 26">
+            <a:extLst>
+              <a:ext uri="{FF2B5EF4-FFF2-40B4-BE49-F238E27FC236}">
+                <a16:creationId xmlns:a16="http://schemas.microsoft.com/office/drawing/2014/main" id="{074DC059-4187-4716-A0CE-A473F792B622}"/>
+              </a:ext>
+            </a:extLst>
+          </p:cNvPr>
+          <p:cNvSpPr/>
+          <p:nvPr/>
+        </p:nvSpPr>
+        <p:spPr>
+          <a:xfrm rot="16200000">
+            <a:off x="8942039" y="-1935234"/>
+            <a:ext cx="395576" cy="4901675"/>
+          </a:xfrm>
+          <a:prstGeom prst="rightBrace">
+            <a:avLst/>
+          </a:prstGeom>
+          <a:ln>
+            <a:solidFill>
+              <a:schemeClr val="tx1"/>
+            </a:solidFill>
+          </a:ln>
+        </p:spPr>
+        <p:style>
+          <a:lnRef idx="1">
+            <a:schemeClr val="accent1"/>
+          </a:lnRef>
+          <a:fillRef idx="0">
+            <a:schemeClr val="accent1"/>
+          </a:fillRef>
+          <a:effectRef idx="0">
+            <a:schemeClr val="accent1"/>
+          </a:effectRef>
+          <a:fontRef idx="minor">
+            <a:schemeClr val="tx1"/>
+          </a:fontRef>
+        </p:style>
+        <p:txBody>
+          <a:bodyPr rtlCol="0" anchor="ctr"/>
+          <a:lstStyle/>
+          <a:p>
+            <a:pPr algn="ctr"/>
+            <a:endParaRPr lang="en-US">
+              <a:solidFill>
+                <a:srgbClr val="FF0000"/>
+              </a:solidFill>
+            </a:endParaRPr>
+          </a:p>
+        </p:txBody>
+      </p:sp>
+      <p:sp>
+        <p:nvSpPr>
+          <p:cNvPr id="28" name="Oval 27">
+            <a:extLst>
+              <a:ext uri="{FF2B5EF4-FFF2-40B4-BE49-F238E27FC236}">
+                <a16:creationId xmlns:a16="http://schemas.microsoft.com/office/drawing/2014/main" id="{5E47FF42-9708-4214-BD13-4E856F4C8793}"/>
+              </a:ext>
+            </a:extLst>
+          </p:cNvPr>
+          <p:cNvSpPr/>
+          <p:nvPr/>
+        </p:nvSpPr>
+        <p:spPr>
+          <a:xfrm>
+            <a:off x="9398977" y="1116623"/>
+            <a:ext cx="87923" cy="78396"/>
+          </a:xfrm>
+          <a:prstGeom prst="ellipse">
+            <a:avLst/>
+          </a:prstGeom>
+          <a:solidFill>
+            <a:srgbClr val="FF0000"/>
+          </a:solidFill>
+        </p:spPr>
+        <p:style>
+          <a:lnRef idx="2">
+            <a:schemeClr val="accent1">
+              <a:shade val="50000"/>
+            </a:schemeClr>
+          </a:lnRef>
+          <a:fillRef idx="1">
+            <a:schemeClr val="accent1"/>
+          </a:fillRef>
+          <a:effectRef idx="0">
+            <a:schemeClr val="accent1"/>
+          </a:effectRef>
+          <a:fontRef idx="minor">
+            <a:schemeClr val="lt1"/>
+          </a:fontRef>
+        </p:style>
+        <p:txBody>
+          <a:bodyPr rtlCol="0" anchor="ctr"/>
+          <a:lstStyle/>
+          <a:p>
+            <a:pPr algn="ctr"/>
+            <a:endParaRPr lang="en-US"/>
+          </a:p>
+        </p:txBody>
+      </p:sp>
+      <p:sp>
+        <p:nvSpPr>
+          <p:cNvPr id="29" name="Oval 28">
+            <a:extLst>
+              <a:ext uri="{FF2B5EF4-FFF2-40B4-BE49-F238E27FC236}">
+                <a16:creationId xmlns:a16="http://schemas.microsoft.com/office/drawing/2014/main" id="{D4C3AB2D-52AB-4844-AA13-753889943B12}"/>
+              </a:ext>
+            </a:extLst>
+          </p:cNvPr>
+          <p:cNvSpPr/>
+          <p:nvPr/>
+        </p:nvSpPr>
+        <p:spPr>
+          <a:xfrm>
+            <a:off x="9674999" y="1114056"/>
+            <a:ext cx="87923" cy="78396"/>
+          </a:xfrm>
+          <a:prstGeom prst="ellipse">
+            <a:avLst/>
+          </a:prstGeom>
+          <a:solidFill>
+            <a:srgbClr val="FF0000"/>
+          </a:solidFill>
+        </p:spPr>
+        <p:style>
+          <a:lnRef idx="2">
+            <a:schemeClr val="accent1">
+              <a:shade val="50000"/>
+            </a:schemeClr>
+          </a:lnRef>
+          <a:fillRef idx="1">
+            <a:schemeClr val="accent1"/>
+          </a:fillRef>
+          <a:effectRef idx="0">
+            <a:schemeClr val="accent1"/>
+          </a:effectRef>
+          <a:fontRef idx="minor">
+            <a:schemeClr val="lt1"/>
+          </a:fontRef>
+        </p:style>
+        <p:txBody>
+          <a:bodyPr rtlCol="0" anchor="ctr"/>
+          <a:lstStyle/>
+          <a:p>
+            <a:pPr algn="ctr"/>
+            <a:endParaRPr lang="en-US"/>
+          </a:p>
+        </p:txBody>
+      </p:sp>
+      <p:sp>
+        <p:nvSpPr>
+          <p:cNvPr id="30" name="Oval 29">
+            <a:extLst>
+              <a:ext uri="{FF2B5EF4-FFF2-40B4-BE49-F238E27FC236}">
+                <a16:creationId xmlns:a16="http://schemas.microsoft.com/office/drawing/2014/main" id="{77546D8C-1313-4769-BF7D-1099EB1CBFA4}"/>
+              </a:ext>
+            </a:extLst>
+          </p:cNvPr>
+          <p:cNvSpPr/>
+          <p:nvPr/>
+        </p:nvSpPr>
+        <p:spPr>
+          <a:xfrm>
+            <a:off x="9942410" y="1121750"/>
+            <a:ext cx="87923" cy="78396"/>
+          </a:xfrm>
+          <a:prstGeom prst="ellipse">
+            <a:avLst/>
+          </a:prstGeom>
+          <a:solidFill>
+            <a:srgbClr val="FF0000"/>
+          </a:solidFill>
+        </p:spPr>
+        <p:style>
+          <a:lnRef idx="2">
+            <a:schemeClr val="accent1">
+              <a:shade val="50000"/>
+            </a:schemeClr>
+          </a:lnRef>
+          <a:fillRef idx="1">
+            <a:schemeClr val="accent1"/>
+          </a:fillRef>
+          <a:effectRef idx="0">
+            <a:schemeClr val="accent1"/>
+          </a:effectRef>
+          <a:fontRef idx="minor">
+            <a:schemeClr val="lt1"/>
+          </a:fontRef>
+        </p:style>
+        <p:txBody>
+          <a:bodyPr rtlCol="0" anchor="ctr"/>
+          <a:lstStyle/>
+          <a:p>
+            <a:pPr algn="ctr"/>
+            <a:endParaRPr lang="en-US"/>
+          </a:p>
+        </p:txBody>
+      </p:sp>
+      <p:sp>
+        <p:nvSpPr>
+          <p:cNvPr id="55" name="TextBox 54">
+            <a:extLst>
+              <a:ext uri="{FF2B5EF4-FFF2-40B4-BE49-F238E27FC236}">
+                <a16:creationId xmlns:a16="http://schemas.microsoft.com/office/drawing/2014/main" id="{0AC30B54-0529-45D3-A5E0-DC31BFF5680A}"/>
+              </a:ext>
+            </a:extLst>
+          </p:cNvPr>
+          <p:cNvSpPr txBox="1"/>
+          <p:nvPr/>
+        </p:nvSpPr>
+        <p:spPr>
+          <a:xfrm>
+            <a:off x="9908372" y="3831805"/>
+            <a:ext cx="184731" cy="369332"/>
+          </a:xfrm>
+          <a:prstGeom prst="rect">
+            <a:avLst/>
+          </a:prstGeom>
+          <a:noFill/>
+        </p:spPr>
+        <p:txBody>
+          <a:bodyPr wrap="none" rtlCol="0">
+            <a:spAutoFit/>
+          </a:bodyPr>
+          <a:lstStyle/>
+          <a:p>
+            <a:endParaRPr lang="en-US" b="1" i="1" dirty="0"/>
+          </a:p>
+        </p:txBody>
+      </p:sp>
+      <p:pic>
+        <p:nvPicPr>
+          <p:cNvPr id="92" name="Graphic 91">
+            <a:extLst>
+              <a:ext uri="{FF2B5EF4-FFF2-40B4-BE49-F238E27FC236}">
+                <a16:creationId xmlns:a16="http://schemas.microsoft.com/office/drawing/2014/main" id="{66A29DB8-7919-447A-BBF0-6B5E57B5357F}"/>
+              </a:ext>
+            </a:extLst>
+          </p:cNvPr>
+          <p:cNvPicPr>
+            <a:picLocks noChangeAspect="1"/>
+          </p:cNvPicPr>
+          <p:nvPr/>
+        </p:nvPicPr>
+        <p:blipFill>
+          <a:blip r:embed="rId10">
+            <a:extLst>
+              <a:ext uri="{96DAC541-7B7A-43D3-8B79-37D633B846F1}">
+                <asvg:svgBlip xmlns:asvg="http://schemas.microsoft.com/office/drawing/2016/SVG/main" r:embed="rId11"/>
+              </a:ext>
+            </a:extLst>
+          </a:blip>
+          <a:stretch>
+            <a:fillRect/>
+          </a:stretch>
+        </p:blipFill>
+        <p:spPr>
+          <a:xfrm>
+            <a:off x="3598639" y="3512127"/>
+            <a:ext cx="278901" cy="255659"/>
+          </a:xfrm>
+          <a:prstGeom prst="rect">
+            <a:avLst/>
+          </a:prstGeom>
+        </p:spPr>
+      </p:pic>
+      <p:grpSp>
+        <p:nvGrpSpPr>
+          <p:cNvPr id="100" name="Group 99">
+            <a:extLst>
+              <a:ext uri="{FF2B5EF4-FFF2-40B4-BE49-F238E27FC236}">
+                <a16:creationId xmlns:a16="http://schemas.microsoft.com/office/drawing/2014/main" id="{F67D47C9-1F41-402E-BC8E-E57DBBBB807C}"/>
+              </a:ext>
+            </a:extLst>
+          </p:cNvPr>
+          <p:cNvGrpSpPr/>
+          <p:nvPr/>
+        </p:nvGrpSpPr>
+        <p:grpSpPr>
+          <a:xfrm>
+            <a:off x="7437748" y="1330912"/>
+            <a:ext cx="4489322" cy="752929"/>
+            <a:chOff x="7437748" y="1330912"/>
+            <a:chExt cx="4489322" cy="752929"/>
+          </a:xfrm>
+        </p:grpSpPr>
+        <p:cxnSp>
+          <p:nvCxnSpPr>
+            <p:cNvPr id="41" name="Straight Arrow Connector 40">
+              <a:extLst>
+                <a:ext uri="{FF2B5EF4-FFF2-40B4-BE49-F238E27FC236}">
+                  <a16:creationId xmlns:a16="http://schemas.microsoft.com/office/drawing/2014/main" id="{C22F11C1-7592-4B75-A341-0EF9F8FEEE3D}"/>
+                </a:ext>
+              </a:extLst>
+            </p:cNvPr>
+            <p:cNvCxnSpPr/>
+            <p:nvPr/>
+          </p:nvCxnSpPr>
+          <p:spPr>
+            <a:xfrm flipH="1" flipV="1">
+              <a:off x="7437748" y="1338606"/>
+              <a:ext cx="1701506" cy="707010"/>
+            </a:xfrm>
+            <a:prstGeom prst="straightConnector1">
+              <a:avLst/>
+            </a:prstGeom>
+            <a:ln>
+              <a:tailEnd type="triangle"/>
+            </a:ln>
+          </p:spPr>
+          <p:style>
+            <a:lnRef idx="1">
+              <a:schemeClr val="accent1"/>
+            </a:lnRef>
+            <a:fillRef idx="0">
+              <a:schemeClr val="accent1"/>
+            </a:fillRef>
+            <a:effectRef idx="0">
+              <a:schemeClr val="accent1"/>
+            </a:effectRef>
+            <a:fontRef idx="minor">
+              <a:schemeClr val="tx1"/>
+            </a:fontRef>
+          </p:style>
+        </p:cxnSp>
+        <p:grpSp>
+          <p:nvGrpSpPr>
+            <p:cNvPr id="98" name="Group 97">
+              <a:extLst>
+                <a:ext uri="{FF2B5EF4-FFF2-40B4-BE49-F238E27FC236}">
+                  <a16:creationId xmlns:a16="http://schemas.microsoft.com/office/drawing/2014/main" id="{6F96D195-15F3-4CBC-A2C8-564E1E83B459}"/>
+                </a:ext>
+              </a:extLst>
+            </p:cNvPr>
+            <p:cNvGrpSpPr/>
+            <p:nvPr/>
+          </p:nvGrpSpPr>
+          <p:grpSpPr>
+            <a:xfrm>
+              <a:off x="8317706" y="1330912"/>
+              <a:ext cx="3609364" cy="752929"/>
+              <a:chOff x="8317706" y="1330912"/>
+              <a:chExt cx="3609364" cy="752929"/>
+            </a:xfrm>
+          </p:grpSpPr>
+          <p:cxnSp>
+            <p:nvCxnSpPr>
+              <p:cNvPr id="42" name="Straight Arrow Connector 41">
+                <a:extLst>
+                  <a:ext uri="{FF2B5EF4-FFF2-40B4-BE49-F238E27FC236}">
+                    <a16:creationId xmlns:a16="http://schemas.microsoft.com/office/drawing/2014/main" id="{6859C027-2E08-4F62-99CA-634FE410E244}"/>
+                  </a:ext>
+                </a:extLst>
+              </p:cNvPr>
+              <p:cNvCxnSpPr>
+                <a:cxnSpLocks/>
+              </p:cNvCxnSpPr>
+              <p:nvPr/>
+            </p:nvCxnSpPr>
+            <p:spPr>
+              <a:xfrm flipH="1" flipV="1">
+                <a:off x="8317706" y="1338606"/>
+                <a:ext cx="821548" cy="707011"/>
+              </a:xfrm>
+              <a:prstGeom prst="straightConnector1">
+                <a:avLst/>
+              </a:prstGeom>
+              <a:ln>
+                <a:tailEnd type="triangle"/>
+              </a:ln>
+            </p:spPr>
+            <p:style>
+              <a:lnRef idx="1">
+                <a:schemeClr val="accent1"/>
+              </a:lnRef>
+              <a:fillRef idx="0">
+                <a:schemeClr val="accent1"/>
+              </a:fillRef>
+              <a:effectRef idx="0">
+                <a:schemeClr val="accent1"/>
+              </a:effectRef>
+              <a:fontRef idx="minor">
+                <a:schemeClr val="tx1"/>
+              </a:fontRef>
+            </p:style>
+          </p:cxnSp>
+          <p:cxnSp>
+            <p:nvCxnSpPr>
+              <p:cNvPr id="45" name="Straight Arrow Connector 44">
+                <a:extLst>
+                  <a:ext uri="{FF2B5EF4-FFF2-40B4-BE49-F238E27FC236}">
+                    <a16:creationId xmlns:a16="http://schemas.microsoft.com/office/drawing/2014/main" id="{3BCC1311-881B-44CD-B8B9-361EF6F1F49A}"/>
+                  </a:ext>
+                </a:extLst>
+              </p:cNvPr>
+              <p:cNvCxnSpPr>
+                <a:cxnSpLocks/>
+              </p:cNvCxnSpPr>
+              <p:nvPr/>
+            </p:nvCxnSpPr>
+            <p:spPr>
+              <a:xfrm flipH="1" flipV="1">
+                <a:off x="8946038" y="1333479"/>
+                <a:ext cx="193216" cy="712137"/>
+              </a:xfrm>
+              <a:prstGeom prst="straightConnector1">
+                <a:avLst/>
+              </a:prstGeom>
+              <a:ln>
+                <a:tailEnd type="triangle"/>
+              </a:ln>
+            </p:spPr>
+            <p:style>
+              <a:lnRef idx="1">
+                <a:schemeClr val="accent1"/>
+              </a:lnRef>
+              <a:fillRef idx="0">
+                <a:schemeClr val="accent1"/>
+              </a:fillRef>
+              <a:effectRef idx="0">
+                <a:schemeClr val="accent1"/>
+              </a:effectRef>
+              <a:fontRef idx="minor">
+                <a:schemeClr val="tx1"/>
+              </a:fontRef>
+            </p:style>
+          </p:cxnSp>
+          <p:cxnSp>
+            <p:nvCxnSpPr>
+              <p:cNvPr id="48" name="Straight Arrow Connector 47">
+                <a:extLst>
+                  <a:ext uri="{FF2B5EF4-FFF2-40B4-BE49-F238E27FC236}">
+                    <a16:creationId xmlns:a16="http://schemas.microsoft.com/office/drawing/2014/main" id="{3B2DAA0B-3609-49F6-BBF6-E59146885426}"/>
+                  </a:ext>
+                </a:extLst>
+              </p:cNvPr>
+              <p:cNvCxnSpPr>
+                <a:cxnSpLocks/>
+              </p:cNvCxnSpPr>
+              <p:nvPr/>
+            </p:nvCxnSpPr>
+            <p:spPr>
+              <a:xfrm flipV="1">
+                <a:off x="9139254" y="1330912"/>
+                <a:ext cx="1692144" cy="714705"/>
+              </a:xfrm>
+              <a:prstGeom prst="straightConnector1">
+                <a:avLst/>
+              </a:prstGeom>
+              <a:ln>
+                <a:tailEnd type="triangle"/>
+              </a:ln>
+            </p:spPr>
+            <p:style>
+              <a:lnRef idx="1">
+                <a:schemeClr val="accent1"/>
+              </a:lnRef>
+              <a:fillRef idx="0">
+                <a:schemeClr val="accent1"/>
+              </a:fillRef>
+              <a:effectRef idx="0">
+                <a:schemeClr val="accent1"/>
+              </a:effectRef>
+              <a:fontRef idx="minor">
+                <a:schemeClr val="tx1"/>
+              </a:fontRef>
+            </p:style>
+          </p:cxnSp>
+          <p:cxnSp>
+            <p:nvCxnSpPr>
+              <p:cNvPr id="51" name="Straight Arrow Connector 50">
+                <a:extLst>
+                  <a:ext uri="{FF2B5EF4-FFF2-40B4-BE49-F238E27FC236}">
+                    <a16:creationId xmlns:a16="http://schemas.microsoft.com/office/drawing/2014/main" id="{08DEB9DA-E223-43DF-9F86-C1BBB4A57A97}"/>
+                  </a:ext>
+                </a:extLst>
+              </p:cNvPr>
+              <p:cNvCxnSpPr>
+                <a:cxnSpLocks/>
+              </p:cNvCxnSpPr>
+              <p:nvPr/>
+            </p:nvCxnSpPr>
+            <p:spPr>
+              <a:xfrm flipV="1">
+                <a:off x="9139254" y="1338606"/>
+                <a:ext cx="535745" cy="707010"/>
+              </a:xfrm>
+              <a:prstGeom prst="straightConnector1">
+                <a:avLst/>
+              </a:prstGeom>
+              <a:ln>
+                <a:tailEnd type="triangle"/>
+              </a:ln>
+            </p:spPr>
+            <p:style>
+              <a:lnRef idx="1">
+                <a:schemeClr val="accent1"/>
+              </a:lnRef>
+              <a:fillRef idx="0">
+                <a:schemeClr val="accent1"/>
+              </a:fillRef>
+              <a:effectRef idx="0">
+                <a:schemeClr val="accent1"/>
+              </a:effectRef>
+              <a:fontRef idx="minor">
+                <a:schemeClr val="tx1"/>
+              </a:fontRef>
+            </p:style>
+          </p:cxnSp>
+          <p:sp>
+            <p:nvSpPr>
+              <p:cNvPr id="97" name="Rectangle: Rounded Corners 96">
+                <a:extLst>
+                  <a:ext uri="{FF2B5EF4-FFF2-40B4-BE49-F238E27FC236}">
+                    <a16:creationId xmlns:a16="http://schemas.microsoft.com/office/drawing/2014/main" id="{C612FC3F-0365-4241-BBE0-242AE67FC5FB}"/>
+                  </a:ext>
+                </a:extLst>
+              </p:cNvPr>
+              <p:cNvSpPr/>
+              <p:nvPr/>
+            </p:nvSpPr>
+            <p:spPr>
+              <a:xfrm>
+                <a:off x="10122158" y="1688264"/>
+                <a:ext cx="1804912" cy="395577"/>
+              </a:xfrm>
+              <a:prstGeom prst="roundRect">
+                <a:avLst/>
+              </a:prstGeom>
+              <a:solidFill>
+                <a:schemeClr val="bg2"/>
+              </a:solidFill>
+              <a:ln w="57150"/>
+              <a:scene3d>
+                <a:camera prst="orthographicFront"/>
+                <a:lightRig rig="threePt" dir="t"/>
+              </a:scene3d>
+              <a:sp3d>
+                <a:bevelT/>
+              </a:sp3d>
+            </p:spPr>
+            <p:style>
+              <a:lnRef idx="2">
+                <a:schemeClr val="accent1">
+                  <a:shade val="50000"/>
+                </a:schemeClr>
+              </a:lnRef>
+              <a:fillRef idx="1">
+                <a:schemeClr val="accent1"/>
+              </a:fillRef>
+              <a:effectRef idx="0">
+                <a:schemeClr val="accent1"/>
+              </a:effectRef>
+              <a:fontRef idx="minor">
+                <a:schemeClr val="lt1"/>
+              </a:fontRef>
+            </p:style>
+            <p:txBody>
+              <a:bodyPr rtlCol="0" anchor="ctr"/>
+              <a:lstStyle/>
+              <a:p>
+                <a:pPr algn="ctr"/>
+                <a:r>
+                  <a:rPr lang="en-US" b="1" dirty="0">
+                    <a:solidFill>
+                      <a:schemeClr val="tx1"/>
+                    </a:solidFill>
+                  </a:rPr>
+                  <a:t>NCC</a:t>
+                </a:r>
+                <a:r>
+                  <a:rPr lang="en-US" b="1" dirty="0"/>
+                  <a:t> </a:t>
+                </a:r>
+                <a:r>
+                  <a:rPr lang="en-US" b="1" dirty="0">
+                    <a:solidFill>
+                      <a:schemeClr val="tx1"/>
+                    </a:solidFill>
+                  </a:rPr>
+                  <a:t>Calculation</a:t>
+                </a:r>
+              </a:p>
+            </p:txBody>
+          </p:sp>
+        </p:grpSp>
+      </p:grpSp>
+      <p:cxnSp>
+        <p:nvCxnSpPr>
+          <p:cNvPr id="103" name="Straight Arrow Connector 102">
+            <a:extLst>
+              <a:ext uri="{FF2B5EF4-FFF2-40B4-BE49-F238E27FC236}">
+                <a16:creationId xmlns:a16="http://schemas.microsoft.com/office/drawing/2014/main" id="{9DFD8FE7-518D-45F4-B65A-6C4CC1C4A0B3}"/>
+              </a:ext>
+            </a:extLst>
+          </p:cNvPr>
+          <p:cNvCxnSpPr>
+            <a:cxnSpLocks/>
+          </p:cNvCxnSpPr>
+          <p:nvPr/>
+        </p:nvCxnSpPr>
+        <p:spPr>
+          <a:xfrm flipH="1">
+            <a:off x="3877540" y="2805545"/>
+            <a:ext cx="5261714" cy="623455"/>
+          </a:xfrm>
+          <a:prstGeom prst="straightConnector1">
+            <a:avLst/>
+          </a:prstGeom>
+          <a:ln w="38100">
+            <a:solidFill>
+              <a:srgbClr val="FF0000"/>
+            </a:solidFill>
+            <a:prstDash val="sysDot"/>
+            <a:tailEnd type="triangle"/>
+          </a:ln>
+        </p:spPr>
+        <p:style>
+          <a:lnRef idx="1">
+            <a:schemeClr val="accent1"/>
+          </a:lnRef>
+          <a:fillRef idx="0">
+            <a:schemeClr val="accent1"/>
+          </a:fillRef>
+          <a:effectRef idx="0">
+            <a:schemeClr val="accent1"/>
+          </a:effectRef>
+          <a:fontRef idx="minor">
+            <a:schemeClr val="tx1"/>
+          </a:fontRef>
+        </p:style>
+      </p:cxnSp>
+      <p:pic>
+        <p:nvPicPr>
+          <p:cNvPr id="106" name="Graphic 105">
+            <a:extLst>
+              <a:ext uri="{FF2B5EF4-FFF2-40B4-BE49-F238E27FC236}">
+                <a16:creationId xmlns:a16="http://schemas.microsoft.com/office/drawing/2014/main" id="{38CCC6F5-7AA7-4095-ACDD-FE4CD7EBA601}"/>
+              </a:ext>
+            </a:extLst>
+          </p:cNvPr>
+          <p:cNvPicPr>
+            <a:picLocks noChangeAspect="1"/>
+          </p:cNvPicPr>
+          <p:nvPr/>
+        </p:nvPicPr>
+        <p:blipFill>
+          <a:blip r:embed="rId10">
+            <a:extLst>
+              <a:ext uri="{96DAC541-7B7A-43D3-8B79-37D633B846F1}">
+                <asvg:svgBlip xmlns:asvg="http://schemas.microsoft.com/office/drawing/2016/SVG/main" r:embed="rId12"/>
+              </a:ext>
+            </a:extLst>
+          </a:blip>
+          <a:stretch>
+            <a:fillRect/>
+          </a:stretch>
+        </p:blipFill>
+        <p:spPr>
+          <a:xfrm>
+            <a:off x="3710639" y="3256467"/>
+            <a:ext cx="278901" cy="255659"/>
+          </a:xfrm>
+          <a:prstGeom prst="rect">
+            <a:avLst/>
+          </a:prstGeom>
+        </p:spPr>
+      </p:pic>
+      <p:pic>
+        <p:nvPicPr>
+          <p:cNvPr id="93" name="Graphic 92">
+            <a:extLst>
+              <a:ext uri="{FF2B5EF4-FFF2-40B4-BE49-F238E27FC236}">
+                <a16:creationId xmlns:a16="http://schemas.microsoft.com/office/drawing/2014/main" id="{079C322D-4A44-454C-BD7C-D9F7E50DDB9D}"/>
+              </a:ext>
+            </a:extLst>
+          </p:cNvPr>
+          <p:cNvPicPr>
+            <a:picLocks noChangeAspect="1"/>
+          </p:cNvPicPr>
+          <p:nvPr/>
+        </p:nvPicPr>
+        <p:blipFill>
+          <a:blip r:embed="rId13">
+            <a:extLst>
+              <a:ext uri="{96DAC541-7B7A-43D3-8B79-37D633B846F1}">
+                <asvg:svgBlip xmlns:asvg="http://schemas.microsoft.com/office/drawing/2016/SVG/main" r:embed="rId14"/>
+              </a:ext>
+            </a:extLst>
+          </a:blip>
+          <a:stretch>
+            <a:fillRect/>
+          </a:stretch>
+        </p:blipFill>
+        <p:spPr>
+          <a:xfrm>
+            <a:off x="3020900" y="3123270"/>
+            <a:ext cx="1343428" cy="1077867"/>
+          </a:xfrm>
+          <a:prstGeom prst="rect">
+            <a:avLst/>
+          </a:prstGeom>
+        </p:spPr>
+      </p:pic>
+      <p:pic>
+        <p:nvPicPr>
+          <p:cNvPr id="95" name="Picture 94">
+            <a:extLst>
+              <a:ext uri="{FF2B5EF4-FFF2-40B4-BE49-F238E27FC236}">
+                <a16:creationId xmlns:a16="http://schemas.microsoft.com/office/drawing/2014/main" id="{5B2B5C31-A618-4098-AB74-1F4E6A95C76A}"/>
+              </a:ext>
+            </a:extLst>
+          </p:cNvPr>
+          <p:cNvPicPr>
+            <a:picLocks noChangeAspect="1"/>
+          </p:cNvPicPr>
+          <p:nvPr/>
+        </p:nvPicPr>
+        <p:blipFill>
+          <a:blip r:embed="rId15"/>
+          <a:stretch>
+            <a:fillRect/>
+          </a:stretch>
+        </p:blipFill>
+        <p:spPr>
+          <a:xfrm>
+            <a:off x="3023811" y="3117606"/>
+            <a:ext cx="1337606" cy="1089193"/>
+          </a:xfrm>
+          <a:prstGeom prst="rect">
+            <a:avLst/>
+          </a:prstGeom>
+        </p:spPr>
+      </p:pic>
+      <p:pic>
+        <p:nvPicPr>
+          <p:cNvPr id="25" name="Picture 24">
+            <a:extLst>
+              <a:ext uri="{FF2B5EF4-FFF2-40B4-BE49-F238E27FC236}">
+                <a16:creationId xmlns:a16="http://schemas.microsoft.com/office/drawing/2014/main" id="{2DB57F1C-2C0A-46B4-B298-AAB1799D15BA}"/>
+              </a:ext>
+            </a:extLst>
+          </p:cNvPr>
+          <p:cNvPicPr>
+            <a:picLocks noChangeAspect="1"/>
+          </p:cNvPicPr>
+          <p:nvPr/>
+        </p:nvPicPr>
+        <p:blipFill>
+          <a:blip r:embed="rId16">
+            <a:extLst>
+              <a:ext uri="{28A0092B-C50C-407E-A947-70E740481C1C}">
+                <a14:useLocalDpi xmlns:a14="http://schemas.microsoft.com/office/drawing/2010/main" val="0"/>
+              </a:ext>
+            </a:extLst>
+          </a:blip>
+          <a:stretch>
+            <a:fillRect/>
+          </a:stretch>
+        </p:blipFill>
+        <p:spPr>
+          <a:xfrm>
+            <a:off x="10659290" y="713756"/>
+            <a:ext cx="584390" cy="481263"/>
+          </a:xfrm>
+          <a:prstGeom prst="rect">
+            <a:avLst/>
+          </a:prstGeom>
+        </p:spPr>
+      </p:pic>
+      <p:pic>
+        <p:nvPicPr>
+          <p:cNvPr id="109" name="Graphic 108">
+            <a:extLst>
+              <a:ext uri="{FF2B5EF4-FFF2-40B4-BE49-F238E27FC236}">
+                <a16:creationId xmlns:a16="http://schemas.microsoft.com/office/drawing/2014/main" id="{E3D16D8B-96D4-48A8-B7F0-8250231AD98C}"/>
+              </a:ext>
+            </a:extLst>
+          </p:cNvPr>
+          <p:cNvPicPr>
+            <a:picLocks noChangeAspect="1"/>
+          </p:cNvPicPr>
+          <p:nvPr/>
+        </p:nvPicPr>
+        <p:blipFill>
+          <a:blip r:embed="rId17">
+            <a:extLst>
+              <a:ext uri="{96DAC541-7B7A-43D3-8B79-37D633B846F1}">
+                <asvg:svgBlip xmlns:asvg="http://schemas.microsoft.com/office/drawing/2016/SVG/main" r:embed="rId18"/>
+              </a:ext>
+            </a:extLst>
+          </a:blip>
+          <a:stretch>
+            <a:fillRect/>
+          </a:stretch>
+        </p:blipFill>
+        <p:spPr>
+          <a:xfrm>
+            <a:off x="3551612" y="3119875"/>
+            <a:ext cx="596953" cy="497461"/>
+          </a:xfrm>
+          <a:prstGeom prst="rect">
+            <a:avLst/>
+          </a:prstGeom>
+        </p:spPr>
+      </p:pic>
+      <p:pic>
+        <p:nvPicPr>
+          <p:cNvPr id="110" name="Picture 109">
+            <a:extLst>
+              <a:ext uri="{FF2B5EF4-FFF2-40B4-BE49-F238E27FC236}">
+                <a16:creationId xmlns:a16="http://schemas.microsoft.com/office/drawing/2014/main" id="{6A5F0FC2-12E3-474B-96A6-5CDA15AE552B}"/>
+              </a:ext>
+            </a:extLst>
+          </p:cNvPr>
+          <p:cNvPicPr>
+            <a:picLocks noChangeAspect="1"/>
+          </p:cNvPicPr>
+          <p:nvPr/>
+        </p:nvPicPr>
+        <p:blipFill>
+          <a:blip r:embed="rId19"/>
+          <a:stretch>
+            <a:fillRect/>
+          </a:stretch>
+        </p:blipFill>
+        <p:spPr>
+          <a:xfrm>
+            <a:off x="3548701" y="3127729"/>
+            <a:ext cx="578627" cy="489607"/>
+          </a:xfrm>
+          <a:prstGeom prst="rect">
+            <a:avLst/>
+          </a:prstGeom>
+        </p:spPr>
+      </p:pic>
+    </p:spTree>
+    <p:extLst>
+      <p:ext uri="{BB962C8B-B14F-4D97-AF65-F5344CB8AC3E}">
+        <p14:creationId xmlns:p14="http://schemas.microsoft.com/office/powerpoint/2010/main" val="2880917530"/>
+      </p:ext>
+    </p:extLst>
+  </p:cSld>
+  <p:clrMapOvr>
+    <a:masterClrMapping/>
+  </p:clrMapOvr>
+  <mc:AlternateContent xmlns:mc="http://schemas.openxmlformats.org/markup-compatibility/2006" xmlns:p159="http://schemas.microsoft.com/office/powerpoint/2015/09/main">
+    <mc:Choice Requires="p159">
+      <p:transition xmlns:p14="http://schemas.microsoft.com/office/powerpoint/2010/main" spd="slow" p14:dur="2000">
+        <p159:morph option="byObject"/>
+      </p:transition>
+    </mc:Choice>
+    <mc:Fallback xmlns="">
+      <p:transition spd="slow">
+        <p:fade/>
+      </p:transition>
+    </mc:Fallback>
+  </mc:AlternateContent>
+  <p:timing>
+    <p:tnLst>
+      <p:par>
+        <p:cTn id="1" dur="indefinite" restart="never" nodeType="tmRoot">
+          <p:childTnLst>
+            <p:seq concurrent="1" nextAc="seek">
+              <p:cTn id="2" dur="indefinite" nodeType="mainSeq">
+                <p:childTnLst>
+                  <p:par>
+                    <p:cTn id="3" fill="hold">
+                      <p:stCondLst>
+                        <p:cond delay="indefinite"/>
+                        <p:cond evt="onBegin" delay="0">
+                          <p:tn val="2"/>
+                        </p:cond>
+                      </p:stCondLst>
+                      <p:childTnLst>
+                        <p:par>
+                          <p:cTn id="4" fill="hold">
+                            <p:stCondLst>
+                              <p:cond delay="0"/>
+                            </p:stCondLst>
+                            <p:childTnLst>
+                              <p:par>
+                                <p:cTn id="5" presetID="1" presetClass="entr" presetSubtype="0" fill="hold" grpId="0" nodeType="withEffect">
+                                  <p:stCondLst>
+                                    <p:cond delay="0"/>
+                                  </p:stCondLst>
+                                  <p:childTnLst>
+                                    <p:set>
+                                      <p:cBhvr>
+                                        <p:cTn id="6" dur="1" fill="hold">
+                                          <p:stCondLst>
+                                            <p:cond delay="0"/>
+                                          </p:stCondLst>
+                                        </p:cTn>
+                                        <p:tgtEl>
+                                          <p:spTgt spid="9"/>
+                                        </p:tgtEl>
+                                        <p:attrNameLst>
+                                          <p:attrName>style.visibility</p:attrName>
+                                        </p:attrNameLst>
+                                      </p:cBhvr>
+                                      <p:to>
+                                        <p:strVal val="visible"/>
+                                      </p:to>
+                                    </p:set>
+                                  </p:childTnLst>
+                                </p:cTn>
+                              </p:par>
+                              <p:par>
+                                <p:cTn id="7" presetID="1" presetClass="entr" presetSubtype="0" fill="hold" grpId="0" nodeType="withEffect">
+                                  <p:stCondLst>
+                                    <p:cond delay="0"/>
+                                  </p:stCondLst>
+                                  <p:childTnLst>
+                                    <p:set>
+                                      <p:cBhvr>
+                                        <p:cTn id="8" dur="1" fill="hold">
+                                          <p:stCondLst>
+                                            <p:cond delay="0"/>
+                                          </p:stCondLst>
+                                        </p:cTn>
+                                        <p:tgtEl>
+                                          <p:spTgt spid="27"/>
+                                        </p:tgtEl>
+                                        <p:attrNameLst>
+                                          <p:attrName>style.visibility</p:attrName>
+                                        </p:attrNameLst>
+                                      </p:cBhvr>
+                                      <p:to>
+                                        <p:strVal val="visible"/>
+                                      </p:to>
+                                    </p:set>
+                                  </p:childTnLst>
+                                </p:cTn>
+                              </p:par>
+                              <p:par>
+                                <p:cTn id="9" presetID="1" presetClass="entr" presetSubtype="0" fill="hold" nodeType="withEffect">
+                                  <p:stCondLst>
+                                    <p:cond delay="0"/>
+                                  </p:stCondLst>
+                                  <p:childTnLst>
+                                    <p:set>
+                                      <p:cBhvr>
+                                        <p:cTn id="10" dur="1" fill="hold">
+                                          <p:stCondLst>
+                                            <p:cond delay="0"/>
+                                          </p:stCondLst>
+                                        </p:cTn>
+                                        <p:tgtEl>
+                                          <p:spTgt spid="13"/>
+                                        </p:tgtEl>
+                                        <p:attrNameLst>
+                                          <p:attrName>style.visibility</p:attrName>
+                                        </p:attrNameLst>
+                                      </p:cBhvr>
+                                      <p:to>
+                                        <p:strVal val="visible"/>
+                                      </p:to>
+                                    </p:set>
+                                  </p:childTnLst>
+                                </p:cTn>
+                              </p:par>
+                              <p:par>
+                                <p:cTn id="11" presetID="1" presetClass="entr" presetSubtype="0" fill="hold" nodeType="withEffect">
+                                  <p:stCondLst>
+                                    <p:cond delay="0"/>
+                                  </p:stCondLst>
+                                  <p:childTnLst>
+                                    <p:set>
+                                      <p:cBhvr>
+                                        <p:cTn id="12" dur="1" fill="hold">
+                                          <p:stCondLst>
+                                            <p:cond delay="0"/>
+                                          </p:stCondLst>
+                                        </p:cTn>
+                                        <p:tgtEl>
+                                          <p:spTgt spid="21"/>
+                                        </p:tgtEl>
+                                        <p:attrNameLst>
+                                          <p:attrName>style.visibility</p:attrName>
+                                        </p:attrNameLst>
+                                      </p:cBhvr>
+                                      <p:to>
+                                        <p:strVal val="visible"/>
+                                      </p:to>
+                                    </p:set>
+                                  </p:childTnLst>
+                                </p:cTn>
+                              </p:par>
+                              <p:par>
+                                <p:cTn id="13" presetID="1" presetClass="entr" presetSubtype="0" fill="hold" nodeType="withEffect">
+                                  <p:stCondLst>
+                                    <p:cond delay="0"/>
+                                  </p:stCondLst>
+                                  <p:childTnLst>
+                                    <p:set>
+                                      <p:cBhvr>
+                                        <p:cTn id="14" dur="1" fill="hold">
+                                          <p:stCondLst>
+                                            <p:cond delay="0"/>
+                                          </p:stCondLst>
+                                        </p:cTn>
+                                        <p:tgtEl>
+                                          <p:spTgt spid="25"/>
+                                        </p:tgtEl>
+                                        <p:attrNameLst>
+                                          <p:attrName>style.visibility</p:attrName>
+                                        </p:attrNameLst>
+                                      </p:cBhvr>
+                                      <p:to>
+                                        <p:strVal val="visible"/>
+                                      </p:to>
+                                    </p:set>
+                                  </p:childTnLst>
+                                </p:cTn>
+                              </p:par>
+                              <p:par>
+                                <p:cTn id="15" presetID="1" presetClass="entr" presetSubtype="0" fill="hold" nodeType="withEffect">
+                                  <p:stCondLst>
+                                    <p:cond delay="0"/>
+                                  </p:stCondLst>
+                                  <p:childTnLst>
+                                    <p:set>
+                                      <p:cBhvr>
+                                        <p:cTn id="16" dur="1" fill="hold">
+                                          <p:stCondLst>
+                                            <p:cond delay="0"/>
+                                          </p:stCondLst>
+                                        </p:cTn>
+                                        <p:tgtEl>
+                                          <p:spTgt spid="32"/>
+                                        </p:tgtEl>
+                                        <p:attrNameLst>
+                                          <p:attrName>style.visibility</p:attrName>
+                                        </p:attrNameLst>
+                                      </p:cBhvr>
+                                      <p:to>
+                                        <p:strVal val="visible"/>
+                                      </p:to>
+                                    </p:set>
+                                  </p:childTnLst>
+                                </p:cTn>
+                              </p:par>
+                              <p:par>
+                                <p:cTn id="17" presetID="1" presetClass="entr" presetSubtype="0" fill="hold" grpId="0" nodeType="withEffect">
+                                  <p:stCondLst>
+                                    <p:cond delay="0"/>
+                                  </p:stCondLst>
+                                  <p:childTnLst>
+                                    <p:set>
+                                      <p:cBhvr>
+                                        <p:cTn id="18" dur="1" fill="hold">
+                                          <p:stCondLst>
+                                            <p:cond delay="0"/>
+                                          </p:stCondLst>
+                                        </p:cTn>
+                                        <p:tgtEl>
+                                          <p:spTgt spid="28"/>
+                                        </p:tgtEl>
+                                        <p:attrNameLst>
+                                          <p:attrName>style.visibility</p:attrName>
+                                        </p:attrNameLst>
+                                      </p:cBhvr>
+                                      <p:to>
+                                        <p:strVal val="visible"/>
+                                      </p:to>
+                                    </p:set>
+                                  </p:childTnLst>
+                                </p:cTn>
+                              </p:par>
+                              <p:par>
+                                <p:cTn id="19" presetID="1" presetClass="entr" presetSubtype="0" fill="hold" grpId="0" nodeType="withEffect">
+                                  <p:stCondLst>
+                                    <p:cond delay="0"/>
+                                  </p:stCondLst>
+                                  <p:childTnLst>
+                                    <p:set>
+                                      <p:cBhvr>
+                                        <p:cTn id="20" dur="1" fill="hold">
+                                          <p:stCondLst>
+                                            <p:cond delay="0"/>
+                                          </p:stCondLst>
+                                        </p:cTn>
+                                        <p:tgtEl>
+                                          <p:spTgt spid="29"/>
+                                        </p:tgtEl>
+                                        <p:attrNameLst>
+                                          <p:attrName>style.visibility</p:attrName>
+                                        </p:attrNameLst>
+                                      </p:cBhvr>
+                                      <p:to>
+                                        <p:strVal val="visible"/>
+                                      </p:to>
+                                    </p:set>
+                                  </p:childTnLst>
+                                </p:cTn>
+                              </p:par>
+                              <p:par>
+                                <p:cTn id="21" presetID="1" presetClass="entr" presetSubtype="0" fill="hold" grpId="0" nodeType="withEffect">
+                                  <p:stCondLst>
+                                    <p:cond delay="0"/>
+                                  </p:stCondLst>
+                                  <p:childTnLst>
+                                    <p:set>
+                                      <p:cBhvr>
+                                        <p:cTn id="22" dur="1" fill="hold">
+                                          <p:stCondLst>
+                                            <p:cond delay="0"/>
+                                          </p:stCondLst>
+                                        </p:cTn>
+                                        <p:tgtEl>
+                                          <p:spTgt spid="30"/>
+                                        </p:tgtEl>
+                                        <p:attrNameLst>
+                                          <p:attrName>style.visibility</p:attrName>
+                                        </p:attrNameLst>
+                                      </p:cBhvr>
+                                      <p:to>
+                                        <p:strVal val="visible"/>
+                                      </p:to>
+                                    </p:set>
+                                  </p:childTnLst>
+                                </p:cTn>
+                              </p:par>
+                            </p:childTnLst>
+                          </p:cTn>
+                        </p:par>
+                        <p:par>
+                          <p:cTn id="23" fill="hold">
+                            <p:stCondLst>
+                              <p:cond delay="0"/>
+                            </p:stCondLst>
+                            <p:childTnLst>
+                              <p:par>
+                                <p:cTn id="24" presetID="1" presetClass="entr" presetSubtype="0" fill="hold" nodeType="afterEffect">
+                                  <p:stCondLst>
+                                    <p:cond delay="0"/>
+                                  </p:stCondLst>
+                                  <p:childTnLst>
+                                    <p:set>
+                                      <p:cBhvr>
+                                        <p:cTn id="25" dur="1" fill="hold">
+                                          <p:stCondLst>
+                                            <p:cond delay="0"/>
+                                          </p:stCondLst>
+                                        </p:cTn>
+                                        <p:tgtEl>
+                                          <p:spTgt spid="90"/>
+                                        </p:tgtEl>
+                                        <p:attrNameLst>
+                                          <p:attrName>style.visibility</p:attrName>
+                                        </p:attrNameLst>
+                                      </p:cBhvr>
+                                      <p:to>
+                                        <p:strVal val="visible"/>
+                                      </p:to>
+                                    </p:set>
+                                  </p:childTnLst>
+                                </p:cTn>
+                              </p:par>
+                              <p:par>
+                                <p:cTn id="26" presetID="1" presetClass="entr" presetSubtype="0" fill="hold" nodeType="withEffect">
+                                  <p:stCondLst>
+                                    <p:cond delay="0"/>
+                                  </p:stCondLst>
+                                  <p:childTnLst>
+                                    <p:set>
+                                      <p:cBhvr>
+                                        <p:cTn id="27" dur="1" fill="hold">
+                                          <p:stCondLst>
+                                            <p:cond delay="0"/>
+                                          </p:stCondLst>
+                                        </p:cTn>
+                                        <p:tgtEl>
+                                          <p:spTgt spid="89"/>
+                                        </p:tgtEl>
+                                        <p:attrNameLst>
+                                          <p:attrName>style.visibility</p:attrName>
+                                        </p:attrNameLst>
+                                      </p:cBhvr>
+                                      <p:to>
+                                        <p:strVal val="visible"/>
+                                      </p:to>
+                                    </p:set>
+                                  </p:childTnLst>
+                                </p:cTn>
+                              </p:par>
+                            </p:childTnLst>
+                          </p:cTn>
+                        </p:par>
+                        <p:par>
+                          <p:cTn id="28" fill="hold">
+                            <p:stCondLst>
+                              <p:cond delay="0"/>
+                            </p:stCondLst>
+                            <p:childTnLst>
+                              <p:par>
+                                <p:cTn id="29" presetID="10" presetClass="entr" presetSubtype="0" fill="hold" nodeType="afterEffect">
+                                  <p:stCondLst>
+                                    <p:cond delay="0"/>
+                                  </p:stCondLst>
+                                  <p:childTnLst>
+                                    <p:set>
+                                      <p:cBhvr>
+                                        <p:cTn id="30" dur="1" fill="hold">
+                                          <p:stCondLst>
+                                            <p:cond delay="0"/>
+                                          </p:stCondLst>
+                                        </p:cTn>
+                                        <p:tgtEl>
+                                          <p:spTgt spid="92"/>
+                                        </p:tgtEl>
+                                        <p:attrNameLst>
+                                          <p:attrName>style.visibility</p:attrName>
+                                        </p:attrNameLst>
+                                      </p:cBhvr>
+                                      <p:to>
+                                        <p:strVal val="visible"/>
+                                      </p:to>
+                                    </p:set>
+                                    <p:animEffect transition="in" filter="fade">
+                                      <p:cBhvr>
+                                        <p:cTn id="31" dur="500"/>
+                                        <p:tgtEl>
+                                          <p:spTgt spid="92"/>
+                                        </p:tgtEl>
+                                      </p:cBhvr>
+                                    </p:animEffect>
+                                  </p:childTnLst>
+                                </p:cTn>
+                              </p:par>
+                            </p:childTnLst>
+                          </p:cTn>
+                        </p:par>
+                      </p:childTnLst>
+                    </p:cTn>
+                  </p:par>
+                  <p:par>
+                    <p:cTn id="32" fill="hold">
+                      <p:stCondLst>
+                        <p:cond delay="indefinite"/>
+                      </p:stCondLst>
+                      <p:childTnLst>
+                        <p:par>
+                          <p:cTn id="33" fill="hold">
+                            <p:stCondLst>
+                              <p:cond delay="0"/>
+                            </p:stCondLst>
+                            <p:childTnLst>
+                              <p:par>
+                                <p:cTn id="34" presetID="14" presetClass="entr" presetSubtype="10" fill="hold" nodeType="clickEffect">
+                                  <p:stCondLst>
+                                    <p:cond delay="0"/>
+                                  </p:stCondLst>
+                                  <p:childTnLst>
+                                    <p:set>
+                                      <p:cBhvr>
+                                        <p:cTn id="35" dur="1" fill="hold">
+                                          <p:stCondLst>
+                                            <p:cond delay="0"/>
+                                          </p:stCondLst>
+                                        </p:cTn>
+                                        <p:tgtEl>
+                                          <p:spTgt spid="93"/>
+                                        </p:tgtEl>
+                                        <p:attrNameLst>
+                                          <p:attrName>style.visibility</p:attrName>
+                                        </p:attrNameLst>
+                                      </p:cBhvr>
+                                      <p:to>
+                                        <p:strVal val="visible"/>
+                                      </p:to>
+                                    </p:set>
+                                    <p:animEffect transition="in" filter="randombar(horizontal)">
+                                      <p:cBhvr>
+                                        <p:cTn id="36" dur="500"/>
+                                        <p:tgtEl>
+                                          <p:spTgt spid="93"/>
+                                        </p:tgtEl>
+                                      </p:cBhvr>
+                                    </p:animEffect>
+                                  </p:childTnLst>
+                                </p:cTn>
+                              </p:par>
+                            </p:childTnLst>
+                          </p:cTn>
+                        </p:par>
+                      </p:childTnLst>
+                    </p:cTn>
+                  </p:par>
+                  <p:par>
+                    <p:cTn id="37" fill="hold">
+                      <p:stCondLst>
+                        <p:cond delay="indefinite"/>
+                      </p:stCondLst>
+                      <p:childTnLst>
+                        <p:par>
+                          <p:cTn id="38" fill="hold">
+                            <p:stCondLst>
+                              <p:cond delay="0"/>
+                            </p:stCondLst>
+                            <p:childTnLst>
+                              <p:par>
+                                <p:cTn id="39" presetID="53" presetClass="exit" presetSubtype="32" fill="hold" nodeType="clickEffect">
+                                  <p:stCondLst>
+                                    <p:cond delay="0"/>
+                                  </p:stCondLst>
+                                  <p:childTnLst>
+                                    <p:anim calcmode="lin" valueType="num">
+                                      <p:cBhvr>
+                                        <p:cTn id="40" dur="500"/>
+                                        <p:tgtEl>
+                                          <p:spTgt spid="92"/>
+                                        </p:tgtEl>
+                                        <p:attrNameLst>
+                                          <p:attrName>ppt_w</p:attrName>
+                                        </p:attrNameLst>
+                                      </p:cBhvr>
+                                      <p:tavLst>
+                                        <p:tav tm="0">
+                                          <p:val>
+                                            <p:strVal val="ppt_w"/>
+                                          </p:val>
+                                        </p:tav>
+                                        <p:tav tm="100000">
+                                          <p:val>
+                                            <p:fltVal val="0"/>
+                                          </p:val>
+                                        </p:tav>
+                                      </p:tavLst>
+                                    </p:anim>
+                                    <p:anim calcmode="lin" valueType="num">
+                                      <p:cBhvr>
+                                        <p:cTn id="41" dur="500"/>
+                                        <p:tgtEl>
+                                          <p:spTgt spid="92"/>
+                                        </p:tgtEl>
+                                        <p:attrNameLst>
+                                          <p:attrName>ppt_h</p:attrName>
+                                        </p:attrNameLst>
+                                      </p:cBhvr>
+                                      <p:tavLst>
+                                        <p:tav tm="0">
+                                          <p:val>
+                                            <p:strVal val="ppt_h"/>
+                                          </p:val>
+                                        </p:tav>
+                                        <p:tav tm="100000">
+                                          <p:val>
+                                            <p:fltVal val="0"/>
+                                          </p:val>
+                                        </p:tav>
+                                      </p:tavLst>
+                                    </p:anim>
+                                    <p:animEffect transition="out" filter="fade">
+                                      <p:cBhvr>
+                                        <p:cTn id="42" dur="500"/>
+                                        <p:tgtEl>
+                                          <p:spTgt spid="92"/>
+                                        </p:tgtEl>
+                                      </p:cBhvr>
+                                    </p:animEffect>
+                                    <p:set>
+                                      <p:cBhvr>
+                                        <p:cTn id="43" dur="1" fill="hold">
+                                          <p:stCondLst>
+                                            <p:cond delay="499"/>
+                                          </p:stCondLst>
+                                        </p:cTn>
+                                        <p:tgtEl>
+                                          <p:spTgt spid="92"/>
+                                        </p:tgtEl>
+                                        <p:attrNameLst>
+                                          <p:attrName>style.visibility</p:attrName>
+                                        </p:attrNameLst>
+                                      </p:cBhvr>
+                                      <p:to>
+                                        <p:strVal val="hidden"/>
+                                      </p:to>
+                                    </p:set>
+                                  </p:childTnLst>
+                                </p:cTn>
+                              </p:par>
+                            </p:childTnLst>
+                          </p:cTn>
+                        </p:par>
+                        <p:par>
+                          <p:cTn id="44" fill="hold">
+                            <p:stCondLst>
+                              <p:cond delay="500"/>
+                            </p:stCondLst>
+                            <p:childTnLst>
+                              <p:par>
+                                <p:cTn id="45" presetID="42" presetClass="path" presetSubtype="0" accel="50000" decel="50000" fill="hold" nodeType="afterEffect">
+                                  <p:stCondLst>
+                                    <p:cond delay="0"/>
+                                  </p:stCondLst>
+                                  <p:childTnLst>
+                                    <p:animMotion origin="layout" path="M -3.54167E-6 3.7037E-7 L 0.0086 -0.03727 " pathEditMode="relative" rAng="0" ptsTypes="AA">
+                                      <p:cBhvr>
+                                        <p:cTn id="46" dur="2000" fill="hold"/>
+                                        <p:tgtEl>
+                                          <p:spTgt spid="90"/>
+                                        </p:tgtEl>
+                                        <p:attrNameLst>
+                                          <p:attrName>ppt_x</p:attrName>
+                                          <p:attrName>ppt_y</p:attrName>
+                                        </p:attrNameLst>
+                                      </p:cBhvr>
+                                      <p:rCtr x="430" y="-1875"/>
+                                    </p:animMotion>
+                                  </p:childTnLst>
+                                </p:cTn>
+                              </p:par>
+                            </p:childTnLst>
+                          </p:cTn>
+                        </p:par>
+                      </p:childTnLst>
+                    </p:cTn>
+                  </p:par>
+                  <p:par>
+                    <p:cTn id="47" fill="hold">
+                      <p:stCondLst>
+                        <p:cond delay="indefinite"/>
+                      </p:stCondLst>
+                      <p:childTnLst>
+                        <p:par>
+                          <p:cTn id="48" fill="hold">
+                            <p:stCondLst>
+                              <p:cond delay="0"/>
+                            </p:stCondLst>
+                            <p:childTnLst>
+                              <p:par>
+                                <p:cTn id="49" presetID="1" presetClass="entr" presetSubtype="0" fill="hold" nodeType="clickEffect">
+                                  <p:stCondLst>
+                                    <p:cond delay="0"/>
+                                  </p:stCondLst>
+                                  <p:childTnLst>
+                                    <p:set>
+                                      <p:cBhvr>
+                                        <p:cTn id="50" dur="1" fill="hold">
+                                          <p:stCondLst>
+                                            <p:cond delay="0"/>
+                                          </p:stCondLst>
+                                        </p:cTn>
+                                        <p:tgtEl>
+                                          <p:spTgt spid="95"/>
+                                        </p:tgtEl>
+                                        <p:attrNameLst>
+                                          <p:attrName>style.visibility</p:attrName>
+                                        </p:attrNameLst>
+                                      </p:cBhvr>
+                                      <p:to>
+                                        <p:strVal val="visible"/>
+                                      </p:to>
+                                    </p:set>
+                                  </p:childTnLst>
+                                </p:cTn>
+                              </p:par>
+                            </p:childTnLst>
+                          </p:cTn>
+                        </p:par>
+                      </p:childTnLst>
+                    </p:cTn>
+                  </p:par>
+                  <p:par>
+                    <p:cTn id="51" fill="hold">
+                      <p:stCondLst>
+                        <p:cond delay="indefinite"/>
+                      </p:stCondLst>
+                      <p:childTnLst>
+                        <p:par>
+                          <p:cTn id="52" fill="hold">
+                            <p:stCondLst>
+                              <p:cond delay="0"/>
+                            </p:stCondLst>
+                            <p:childTnLst>
+                              <p:par>
+                                <p:cTn id="53" presetID="0" presetClass="path" presetSubtype="0" accel="50000" decel="50000" fill="hold" nodeType="clickEffect">
+                                  <p:stCondLst>
+                                    <p:cond delay="0"/>
+                                  </p:stCondLst>
+                                  <p:childTnLst>
+                                    <p:animMotion origin="layout" path="M -4.58333E-6 2.22222E-6 L -4.58333E-6 0.00046 C 0.00196 -0.00185 0.00378 -0.00394 0.00586 -0.00533 C 0.00586 -0.00509 0.01237 -0.00787 0.01381 -0.0081 C 0.01459 -0.00857 0.01563 -0.0088 0.01628 -0.00949 C 0.01941 -0.01111 0.01941 -0.01158 0.02253 -0.0125 C 0.02735 -0.01412 0.02748 -0.01389 0.03399 -0.01459 L 0.04076 -0.01667 C 0.04219 -0.01667 0.04323 -0.01736 0.04428 -0.01759 L 0.0487 -0.01875 L 0.19219 -0.01759 C 0.19388 -0.01759 0.19558 -0.01667 0.19727 -0.01667 C 0.20066 -0.01574 0.20378 -0.01574 0.20704 -0.01551 L 0.30508 -0.01667 C 0.31029 -0.01667 0.31459 -0.01875 0.3198 -0.01968 C 0.32592 -0.02084 0.33217 -0.02084 0.33829 -0.02269 C 0.34258 -0.02384 0.3392 -0.02315 0.34349 -0.0257 C 0.34428 -0.02616 0.34532 -0.02639 0.3461 -0.02685 C 0.34792 -0.02801 0.34961 -0.02894 0.35131 -0.03009 C 0.35209 -0.03033 0.353 -0.03056 0.35404 -0.03079 C 0.35534 -0.03125 0.35625 -0.03195 0.35756 -0.03287 C 0.35925 -0.03357 0.36094 -0.03403 0.36263 -0.03496 C 0.36472 -0.03611 0.3668 -0.03773 0.36888 -0.03889 C 0.37006 -0.03982 0.37123 -0.04051 0.37227 -0.04097 C 0.38138 -0.04722 0.37618 -0.04537 0.38282 -0.04722 C 0.38412 -0.04815 0.38581 -0.04908 0.38724 -0.05023 C 0.38959 -0.05232 0.39154 -0.05486 0.39428 -0.05648 C 0.39532 -0.05718 0.39649 -0.05787 0.39779 -0.05857 C 0.40521 -0.06366 0.40027 -0.06134 0.4056 -0.06366 C 0.40625 -0.06435 0.4073 -0.06574 0.40821 -0.06667 C 0.40925 -0.06783 0.41068 -0.06783 0.41172 -0.06875 C 0.41693 -0.07408 0.40977 -0.07037 0.41602 -0.07269 C 0.41654 -0.07408 0.41706 -0.075 0.41784 -0.07593 C 0.42292 -0.08195 0.41954 -0.07639 0.42396 -0.08125 C 0.42579 -0.08287 0.42917 -0.08704 0.42917 -0.08681 C 0.43073 -0.09259 0.42904 -0.0882 0.43269 -0.09306 C 0.43334 -0.09398 0.43386 -0.09537 0.43451 -0.0963 C 0.43607 -0.09861 0.43972 -0.10232 0.43972 -0.10209 C 0.4405 -0.10509 0.44063 -0.10672 0.44245 -0.10834 C 0.44297 -0.10926 0.44415 -0.10996 0.4448 -0.11042 C 0.44714 -0.11482 0.44597 -0.11273 0.4487 -0.11528 " pathEditMode="relative" rAng="0" ptsTypes="AAAAAAAAAAAAAAAAAAAAAAAAAAAAAAAAAAAAAAAAA">
+                                      <p:cBhvr>
+                                        <p:cTn id="54" dur="2000" fill="hold"/>
+                                        <p:tgtEl>
+                                          <p:spTgt spid="95"/>
+                                        </p:tgtEl>
+                                        <p:attrNameLst>
+                                          <p:attrName>ppt_x</p:attrName>
+                                          <p:attrName>ppt_y</p:attrName>
+                                        </p:attrNameLst>
+                                      </p:cBhvr>
+                                      <p:rCtr x="22435" y="-5741"/>
+                                    </p:animMotion>
+                                  </p:childTnLst>
+                                </p:cTn>
+                              </p:par>
+                              <p:par>
+                                <p:cTn id="55" presetID="1" presetClass="entr" presetSubtype="0" fill="hold" nodeType="withEffect">
+                                  <p:stCondLst>
+                                    <p:cond delay="0"/>
+                                  </p:stCondLst>
+                                  <p:childTnLst>
+                                    <p:set>
+                                      <p:cBhvr>
+                                        <p:cTn id="56" dur="1" fill="hold">
+                                          <p:stCondLst>
+                                            <p:cond delay="0"/>
+                                          </p:stCondLst>
+                                        </p:cTn>
+                                        <p:tgtEl>
+                                          <p:spTgt spid="100"/>
+                                        </p:tgtEl>
+                                        <p:attrNameLst>
+                                          <p:attrName>style.visibility</p:attrName>
+                                        </p:attrNameLst>
+                                      </p:cBhvr>
+                                      <p:to>
+                                        <p:strVal val="visible"/>
+                                      </p:to>
+                                    </p:set>
+                                  </p:childTnLst>
+                                </p:cTn>
+                              </p:par>
+                            </p:childTnLst>
+                          </p:cTn>
+                        </p:par>
+                      </p:childTnLst>
+                    </p:cTn>
+                  </p:par>
+                  <p:par>
+                    <p:cTn id="57" fill="hold">
+                      <p:stCondLst>
+                        <p:cond delay="indefinite"/>
+                      </p:stCondLst>
+                      <p:childTnLst>
+                        <p:par>
+                          <p:cTn id="58" fill="hold">
+                            <p:stCondLst>
+                              <p:cond delay="0"/>
+                            </p:stCondLst>
+                            <p:childTnLst>
+                              <p:par>
+                                <p:cTn id="59" presetID="26" presetClass="emph" presetSubtype="0" fill="hold" nodeType="clickEffect">
+                                  <p:stCondLst>
+                                    <p:cond delay="0"/>
+                                  </p:stCondLst>
+                                  <p:childTnLst>
+                                    <p:animEffect transition="out" filter="fade">
+                                      <p:cBhvr>
+                                        <p:cTn id="60" dur="500" tmFilter="0, 0; .2, .5; .8, .5; 1, 0"/>
+                                        <p:tgtEl>
+                                          <p:spTgt spid="25"/>
+                                        </p:tgtEl>
+                                      </p:cBhvr>
+                                    </p:animEffect>
+                                    <p:animScale>
+                                      <p:cBhvr>
+                                        <p:cTn id="61" dur="250" autoRev="1" fill="hold"/>
+                                        <p:tgtEl>
+                                          <p:spTgt spid="25"/>
+                                        </p:tgtEl>
+                                      </p:cBhvr>
+                                      <p:by x="105000" y="105000"/>
+                                    </p:animScale>
+                                  </p:childTnLst>
+                                </p:cTn>
+                              </p:par>
+                            </p:childTnLst>
+                          </p:cTn>
+                        </p:par>
+                      </p:childTnLst>
+                    </p:cTn>
+                  </p:par>
+                  <p:par>
+                    <p:cTn id="62" fill="hold">
+                      <p:stCondLst>
+                        <p:cond delay="indefinite"/>
+                      </p:stCondLst>
+                      <p:childTnLst>
+                        <p:par>
+                          <p:cTn id="63" fill="hold">
+                            <p:stCondLst>
+                              <p:cond delay="0"/>
+                            </p:stCondLst>
+                            <p:childTnLst>
+                              <p:par>
+                                <p:cTn id="64" presetID="0" presetClass="path" presetSubtype="0" accel="50000" decel="50000" fill="hold" nodeType="clickEffect">
+                                  <p:stCondLst>
+                                    <p:cond delay="0"/>
+                                  </p:stCondLst>
+                                  <p:childTnLst>
+                                    <p:animMotion origin="layout" path="M -0.0017 0.00185 L -0.0017 0.00185 C -0.00352 0.00532 -0.00508 0.00903 -0.0069 0.01227 C -0.00886 0.01597 -0.01055 0.01551 -0.01289 0.01829 C -0.01836 0.02546 -0.0125 0.0213 -0.01797 0.02454 C -0.02448 0.0331 -0.01823 0.02546 -0.02474 0.03194 C -0.02565 0.03287 -0.02643 0.03426 -0.02735 0.03495 C -0.02891 0.03634 -0.03099 0.03634 -0.03242 0.03819 C -0.03334 0.03912 -0.03412 0.04005 -0.03503 0.0412 C -0.0362 0.04259 -0.03724 0.04444 -0.03841 0.0456 C -0.04245 0.05023 -0.04063 0.04745 -0.0444 0.05023 C -0.04558 0.05116 -0.04675 0.05208 -0.04779 0.05324 C -0.05508 0.06088 -0.05026 0.0581 -0.05625 0.06088 C -0.05716 0.06181 -0.05808 0.06273 -0.05886 0.06389 C -0.06003 0.06528 -0.06107 0.06713 -0.06224 0.06829 C -0.06302 0.06921 -0.06393 0.06944 -0.06485 0.06991 C -0.06563 0.07083 -0.06654 0.07176 -0.06732 0.07292 C -0.06836 0.07431 -0.06888 0.07639 -0.06992 0.07755 C -0.07097 0.07847 -0.07227 0.07847 -0.07331 0.07894 C -0.07448 0.08056 -0.07552 0.08218 -0.0767 0.08357 C -0.07956 0.08657 -0.08138 0.08704 -0.08438 0.08958 C -0.08672 0.09144 -0.08893 0.09375 -0.09128 0.0956 L -0.09466 0.09861 L -0.10482 0.10787 C -0.10599 0.1088 -0.10729 0.10949 -0.10834 0.11088 C -0.10938 0.11227 -0.11042 0.11412 -0.11172 0.11528 C -0.1138 0.11713 -0.11771 0.11875 -0.12018 0.11991 C -0.12136 0.12083 -0.1224 0.12222 -0.12357 0.12292 C -0.12474 0.12361 -0.12604 0.12361 -0.12709 0.12454 C -0.13685 0.1331 -0.12761 0.12894 -0.13646 0.13194 C -0.13724 0.1331 -0.13802 0.13426 -0.13893 0.13495 C -0.1461 0.14051 -0.13867 0.13194 -0.14584 0.13958 C -0.15313 0.14745 -0.14831 0.14421 -0.15339 0.14722 C -0.15755 0.15463 -0.15417 0.14954 -0.15938 0.15486 C -0.16615 0.16157 -0.15742 0.15347 -0.16459 0.16227 C -0.1655 0.16366 -0.1668 0.16412 -0.16797 0.16528 C -0.16966 0.16713 -0.17136 0.16921 -0.17305 0.17153 C -0.17422 0.17292 -0.17539 0.17431 -0.17643 0.17593 C -0.17839 0.17894 -0.1806 0.18449 -0.18334 0.18657 C -0.18438 0.1875 -0.18555 0.1875 -0.18672 0.18819 C -0.18828 0.19097 -0.18998 0.19329 -0.19089 0.19722 C -0.19167 0.2 -0.19206 0.20324 -0.19271 0.20625 L -0.19349 0.21088 C -0.19297 0.21806 -0.19375 0.22245 -0.19089 0.22755 C -0.19024 0.2287 -0.1892 0.2294 -0.18841 0.23056 L -0.15938 0.22894 C -0.1569 0.2287 -0.1543 0.22755 -0.1517 0.22755 C -0.14011 0.22755 -0.12839 0.22847 -0.1168 0.22894 C -0.11732 0.23056 -0.11784 0.23218 -0.11849 0.23357 C -0.12084 0.23773 -0.12214 0.23657 -0.12526 0.23819 C -0.1306 0.24051 -0.12565 0.24051 -0.13464 0.2412 C -0.14922 0.2419 -0.16367 0.24213 -0.17813 0.24259 C -0.18334 0.24491 -0.18047 0.24352 -0.18672 0.24722 L -0.1892 0.24861 L -0.1918 0.25023 C -0.19154 0.25162 -0.19167 0.2537 -0.19089 0.25486 C -0.18972 0.25648 -0.18802 0.25671 -0.18672 0.25787 C -0.17943 0.26343 -0.1875 0.25857 -0.17904 0.26227 C -0.17513 0.26412 -0.1767 0.26505 -0.17136 0.26528 C -0.15456 0.2662 -0.13776 0.26644 -0.1211 0.2669 C -0.11966 0.27454 -0.1194 0.27338 -0.1211 0.28495 C -0.12136 0.28681 -0.12201 0.28843 -0.12279 0.28958 C -0.12331 0.29028 -0.12852 0.29259 -0.12878 0.29259 C -0.13959 0.29213 -0.15039 0.29213 -0.16107 0.2912 C -0.16224 0.29097 -0.16341 0.28982 -0.16459 0.28958 C -0.16758 0.28889 -0.17084 0.28866 -0.17396 0.28819 C -0.18151 0.28866 -0.18972 0.28519 -0.19688 0.28958 C -0.20157 0.29236 -0.19466 0.30486 -0.19349 0.30625 C -0.19271 0.30718 -0.1918 0.30718 -0.19089 0.30787 C -0.1862 0.31088 -0.18021 0.3162 -0.17565 0.3169 C -0.16263 0.31875 -0.14948 0.31782 -0.13646 0.31829 L -0.12956 0.31991 C -0.12787 0.32037 -0.12617 0.32153 -0.12448 0.32153 C -0.12084 0.32153 -0.11706 0.32037 -0.11341 0.31991 C -0.11198 0.31829 -0.11068 0.31667 -0.10912 0.31528 C -0.10834 0.31458 -0.10742 0.31458 -0.10664 0.31389 C -0.10065 0.30857 -0.10768 0.3125 -0.10065 0.30926 C -0.09922 0.30787 -0.09779 0.30602 -0.09636 0.30486 C -0.09558 0.30394 -0.09466 0.30394 -0.09375 0.30324 C -0.09258 0.30232 -0.09154 0.30116 -0.09037 0.30023 C -0.08959 0.29954 -0.08867 0.29931 -0.08789 0.29861 C -0.08464 0.29583 -0.08347 0.29329 -0.08021 0.2912 C -0.07904 0.29028 -0.07787 0.29028 -0.0767 0.28958 C -0.07526 0.28866 -0.07396 0.2875 -0.07253 0.28657 C -0.07084 0.28542 -0.06901 0.28472 -0.06732 0.28357 C -0.0668 0.2831 -0.06185 0.2794 -0.06055 0.27894 C -0.04284 0.27269 -0.06407 0.28148 -0.05039 0.27593 C -0.04922 0.27546 -0.04805 0.275 -0.04688 0.27454 C -0.0461 0.27407 -0.04532 0.27315 -0.0444 0.27292 C -0.04102 0.27245 -0.0375 0.27292 -0.03412 0.27292 " pathEditMode="relative" ptsTypes="AAAAAAAAAAAAAAAAAAAAAAAAAAAAAAAAAAAAAAAAAAAAAAAAAAAAAAAAAAAAAAAAAAAAAAAAAAAAAAAAAAAAAAAAAA">
+                                      <p:cBhvr>
+                                        <p:cTn id="65" dur="2000" fill="hold"/>
+                                        <p:tgtEl>
+                                          <p:spTgt spid="25"/>
+                                        </p:tgtEl>
+                                        <p:attrNameLst>
+                                          <p:attrName>ppt_x</p:attrName>
+                                          <p:attrName>ppt_y</p:attrName>
+                                        </p:attrNameLst>
+                                      </p:cBhvr>
+                                    </p:animMotion>
+                                  </p:childTnLst>
+                                </p:cTn>
+                              </p:par>
+                            </p:childTnLst>
+                          </p:cTn>
+                        </p:par>
+                      </p:childTnLst>
+                    </p:cTn>
+                  </p:par>
+                  <p:par>
+                    <p:cTn id="66" fill="hold">
+                      <p:stCondLst>
+                        <p:cond delay="indefinite"/>
+                      </p:stCondLst>
+                      <p:childTnLst>
+                        <p:par>
+                          <p:cTn id="67" fill="hold">
+                            <p:stCondLst>
+                              <p:cond delay="0"/>
+                            </p:stCondLst>
+                            <p:childTnLst>
+                              <p:par>
+                                <p:cTn id="68" presetID="0" presetClass="path" presetSubtype="0" accel="50000" decel="50000" fill="hold" nodeType="clickEffect">
+                                  <p:stCondLst>
+                                    <p:cond delay="0"/>
+                                  </p:stCondLst>
+                                  <p:childTnLst>
+                                    <p:animMotion origin="layout" path="M -0.03412 0.27292 L -0.03412 0.27338 C -0.03438 0.26019 -0.03203 0.22963 -0.03698 0.21574 C -0.03763 0.21343 -0.03894 0.2125 -0.03972 0.21019 C -0.04466 0.1963 -0.03998 0.20232 -0.04545 0.19745 C -0.04883 0.18287 -0.04519 0.19444 -0.05 0.18727 C -0.05196 0.18403 -0.05339 0.1787 -0.05573 0.17662 C -0.06081 0.17199 -0.06263 0.16944 -0.06875 0.1662 C -0.07005 0.16551 -0.07175 0.16482 -0.07331 0.16389 C -0.0819 0.15764 -0.06667 0.16505 -0.08255 0.15903 C -0.09232 0.15972 -0.1017 0.15926 -0.11146 0.16134 C -0.11354 0.16157 -0.11693 0.1662 -0.11693 0.16667 C -0.11797 0.16829 -0.11901 0.16944 -0.11992 0.17153 C -0.12201 0.17662 -0.12539 0.18727 -0.12539 0.18773 C -0.12748 0.2088 -0.125 0.18727 -0.12826 0.20509 C -0.12865 0.20764 -0.12865 0.21065 -0.12917 0.21296 C -0.12969 0.21574 -0.13047 0.21829 -0.13099 0.22107 C -0.13138 0.22338 -0.13151 0.22616 -0.13203 0.22847 C -0.13229 0.23032 -0.13255 0.23194 -0.13269 0.23357 " pathEditMode="relative" rAng="0" ptsTypes="AAAAAAAAAAAAAAAAAAA">
+                                      <p:cBhvr>
+                                        <p:cTn id="69" dur="2000" fill="hold"/>
+                                        <p:tgtEl>
+                                          <p:spTgt spid="25"/>
+                                        </p:tgtEl>
+                                        <p:attrNameLst>
+                                          <p:attrName>ppt_x</p:attrName>
+                                          <p:attrName>ppt_y</p:attrName>
+                                        </p:attrNameLst>
+                                      </p:cBhvr>
+                                      <p:rCtr x="-4922" y="-5671"/>
+                                    </p:animMotion>
+                                  </p:childTnLst>
+                                </p:cTn>
+                              </p:par>
+                            </p:childTnLst>
+                          </p:cTn>
+                        </p:par>
+                      </p:childTnLst>
+                    </p:cTn>
+                  </p:par>
+                  <p:par>
+                    <p:cTn id="70" fill="hold">
+                      <p:stCondLst>
+                        <p:cond delay="indefinite"/>
+                      </p:stCondLst>
+                      <p:childTnLst>
+                        <p:par>
+                          <p:cTn id="71" fill="hold">
+                            <p:stCondLst>
+                              <p:cond delay="0"/>
+                            </p:stCondLst>
+                            <p:childTnLst>
+                              <p:par>
+                                <p:cTn id="72" presetID="1" presetClass="entr" presetSubtype="0" fill="hold" nodeType="clickEffect">
+                                  <p:stCondLst>
+                                    <p:cond delay="0"/>
+                                  </p:stCondLst>
+                                  <p:childTnLst>
+                                    <p:set>
+                                      <p:cBhvr>
+                                        <p:cTn id="73" dur="1" fill="hold">
+                                          <p:stCondLst>
+                                            <p:cond delay="0"/>
+                                          </p:stCondLst>
+                                        </p:cTn>
+                                        <p:tgtEl>
+                                          <p:spTgt spid="103"/>
+                                        </p:tgtEl>
+                                        <p:attrNameLst>
+                                          <p:attrName>style.visibility</p:attrName>
+                                        </p:attrNameLst>
+                                      </p:cBhvr>
+                                      <p:to>
+                                        <p:strVal val="visible"/>
+                                      </p:to>
+                                    </p:set>
+                                  </p:childTnLst>
+                                </p:cTn>
+                              </p:par>
+                            </p:childTnLst>
+                          </p:cTn>
+                        </p:par>
+                      </p:childTnLst>
+                    </p:cTn>
+                  </p:par>
+                  <p:par>
+                    <p:cTn id="74" fill="hold">
+                      <p:stCondLst>
+                        <p:cond delay="indefinite"/>
+                      </p:stCondLst>
+                      <p:childTnLst>
+                        <p:par>
+                          <p:cTn id="75" fill="hold">
+                            <p:stCondLst>
+                              <p:cond delay="0"/>
+                            </p:stCondLst>
+                            <p:childTnLst>
+                              <p:par>
+                                <p:cTn id="76" presetID="10" presetClass="entr" presetSubtype="0" fill="hold" nodeType="clickEffect">
+                                  <p:stCondLst>
+                                    <p:cond delay="0"/>
+                                  </p:stCondLst>
+                                  <p:childTnLst>
+                                    <p:set>
+                                      <p:cBhvr>
+                                        <p:cTn id="77" dur="1" fill="hold">
+                                          <p:stCondLst>
+                                            <p:cond delay="0"/>
+                                          </p:stCondLst>
+                                        </p:cTn>
+                                        <p:tgtEl>
+                                          <p:spTgt spid="106"/>
+                                        </p:tgtEl>
+                                        <p:attrNameLst>
+                                          <p:attrName>style.visibility</p:attrName>
+                                        </p:attrNameLst>
+                                      </p:cBhvr>
+                                      <p:to>
+                                        <p:strVal val="visible"/>
+                                      </p:to>
+                                    </p:set>
+                                    <p:animEffect transition="in" filter="fade">
+                                      <p:cBhvr>
+                                        <p:cTn id="78" dur="500"/>
+                                        <p:tgtEl>
+                                          <p:spTgt spid="106"/>
+                                        </p:tgtEl>
+                                      </p:cBhvr>
+                                    </p:animEffect>
+                                  </p:childTnLst>
+                                </p:cTn>
+                              </p:par>
+                            </p:childTnLst>
+                          </p:cTn>
+                        </p:par>
+                      </p:childTnLst>
+                    </p:cTn>
+                  </p:par>
+                  <p:par>
+                    <p:cTn id="79" fill="hold">
+                      <p:stCondLst>
+                        <p:cond delay="indefinite"/>
+                      </p:stCondLst>
+                      <p:childTnLst>
+                        <p:par>
+                          <p:cTn id="80" fill="hold">
+                            <p:stCondLst>
+                              <p:cond delay="0"/>
+                            </p:stCondLst>
+                            <p:childTnLst>
+                              <p:par>
+                                <p:cTn id="81" presetID="1" presetClass="exit" presetSubtype="0" fill="hold" nodeType="clickEffect">
+                                  <p:stCondLst>
+                                    <p:cond delay="0"/>
+                                  </p:stCondLst>
+                                  <p:childTnLst>
+                                    <p:set>
+                                      <p:cBhvr>
+                                        <p:cTn id="82" dur="1" fill="hold">
+                                          <p:stCondLst>
+                                            <p:cond delay="0"/>
+                                          </p:stCondLst>
+                                        </p:cTn>
+                                        <p:tgtEl>
+                                          <p:spTgt spid="103"/>
+                                        </p:tgtEl>
+                                        <p:attrNameLst>
+                                          <p:attrName>style.visibility</p:attrName>
+                                        </p:attrNameLst>
+                                      </p:cBhvr>
+                                      <p:to>
+                                        <p:strVal val="hidden"/>
+                                      </p:to>
+                                    </p:set>
+                                  </p:childTnLst>
+                                </p:cTn>
+                              </p:par>
+                            </p:childTnLst>
+                          </p:cTn>
+                        </p:par>
+                      </p:childTnLst>
+                    </p:cTn>
+                  </p:par>
+                  <p:par>
+                    <p:cTn id="83" fill="hold">
+                      <p:stCondLst>
+                        <p:cond delay="indefinite"/>
+                      </p:stCondLst>
+                      <p:childTnLst>
+                        <p:par>
+                          <p:cTn id="84" fill="hold">
+                            <p:stCondLst>
+                              <p:cond delay="0"/>
+                            </p:stCondLst>
+                            <p:childTnLst>
+                              <p:par>
+                                <p:cTn id="85" presetID="1" presetClass="exit" presetSubtype="0" fill="hold" nodeType="clickEffect">
+                                  <p:stCondLst>
+                                    <p:cond delay="0"/>
+                                  </p:stCondLst>
+                                  <p:childTnLst>
+                                    <p:set>
+                                      <p:cBhvr>
+                                        <p:cTn id="86" dur="1" fill="hold">
+                                          <p:stCondLst>
+                                            <p:cond delay="0"/>
+                                          </p:stCondLst>
+                                        </p:cTn>
+                                        <p:tgtEl>
+                                          <p:spTgt spid="93"/>
+                                        </p:tgtEl>
+                                        <p:attrNameLst>
+                                          <p:attrName>style.visibility</p:attrName>
+                                        </p:attrNameLst>
+                                      </p:cBhvr>
+                                      <p:to>
+                                        <p:strVal val="hidden"/>
+                                      </p:to>
+                                    </p:set>
+                                  </p:childTnLst>
+                                </p:cTn>
+                              </p:par>
+                            </p:childTnLst>
+                          </p:cTn>
+                        </p:par>
+                      </p:childTnLst>
+                    </p:cTn>
+                  </p:par>
+                  <p:par>
+                    <p:cTn id="87" fill="hold">
+                      <p:stCondLst>
+                        <p:cond delay="indefinite"/>
+                      </p:stCondLst>
+                      <p:childTnLst>
+                        <p:par>
+                          <p:cTn id="88" fill="hold">
+                            <p:stCondLst>
+                              <p:cond delay="0"/>
+                            </p:stCondLst>
+                            <p:childTnLst>
+                              <p:par>
+                                <p:cTn id="89" presetID="1" presetClass="entr" presetSubtype="0" fill="hold" nodeType="clickEffect">
+                                  <p:stCondLst>
+                                    <p:cond delay="0"/>
+                                  </p:stCondLst>
+                                  <p:childTnLst>
+                                    <p:set>
+                                      <p:cBhvr>
+                                        <p:cTn id="90" dur="1" fill="hold">
+                                          <p:stCondLst>
+                                            <p:cond delay="0"/>
+                                          </p:stCondLst>
+                                        </p:cTn>
+                                        <p:tgtEl>
+                                          <p:spTgt spid="109"/>
+                                        </p:tgtEl>
+                                        <p:attrNameLst>
+                                          <p:attrName>style.visibility</p:attrName>
+                                        </p:attrNameLst>
+                                      </p:cBhvr>
+                                      <p:to>
+                                        <p:strVal val="visible"/>
+                                      </p:to>
+                                    </p:set>
+                                  </p:childTnLst>
+                                </p:cTn>
+                              </p:par>
+                            </p:childTnLst>
+                          </p:cTn>
+                        </p:par>
+                      </p:childTnLst>
+                    </p:cTn>
+                  </p:par>
+                  <p:par>
+                    <p:cTn id="91" fill="hold">
+                      <p:stCondLst>
+                        <p:cond delay="indefinite"/>
+                      </p:stCondLst>
+                      <p:childTnLst>
+                        <p:par>
+                          <p:cTn id="92" fill="hold">
+                            <p:stCondLst>
+                              <p:cond delay="0"/>
+                            </p:stCondLst>
+                            <p:childTnLst>
+                              <p:par>
+                                <p:cTn id="93" presetID="1" presetClass="exit" presetSubtype="0" fill="hold" nodeType="clickEffect">
+                                  <p:stCondLst>
+                                    <p:cond delay="0"/>
+                                  </p:stCondLst>
+                                  <p:childTnLst>
+                                    <p:set>
+                                      <p:cBhvr>
+                                        <p:cTn id="94" dur="1" fill="hold">
+                                          <p:stCondLst>
+                                            <p:cond delay="0"/>
+                                          </p:stCondLst>
+                                        </p:cTn>
+                                        <p:tgtEl>
+                                          <p:spTgt spid="106"/>
+                                        </p:tgtEl>
+                                        <p:attrNameLst>
+                                          <p:attrName>style.visibility</p:attrName>
+                                        </p:attrNameLst>
+                                      </p:cBhvr>
+                                      <p:to>
+                                        <p:strVal val="hidden"/>
+                                      </p:to>
+                                    </p:set>
+                                  </p:childTnLst>
+                                </p:cTn>
+                              </p:par>
+                            </p:childTnLst>
+                          </p:cTn>
+                        </p:par>
+                      </p:childTnLst>
+                    </p:cTn>
+                  </p:par>
+                  <p:par>
+                    <p:cTn id="95" fill="hold">
+                      <p:stCondLst>
+                        <p:cond delay="indefinite"/>
+                      </p:stCondLst>
+                      <p:childTnLst>
+                        <p:par>
+                          <p:cTn id="96" fill="hold">
+                            <p:stCondLst>
+                              <p:cond delay="0"/>
+                            </p:stCondLst>
+                            <p:childTnLst>
+                              <p:par>
+                                <p:cTn id="97" presetID="1" presetClass="exit" presetSubtype="0" fill="hold" nodeType="clickEffect">
+                                  <p:stCondLst>
+                                    <p:cond delay="0"/>
+                                  </p:stCondLst>
+                                  <p:childTnLst>
+                                    <p:set>
+                                      <p:cBhvr>
+                                        <p:cTn id="98" dur="1" fill="hold">
+                                          <p:stCondLst>
+                                            <p:cond delay="0"/>
+                                          </p:stCondLst>
+                                        </p:cTn>
+                                        <p:tgtEl>
+                                          <p:spTgt spid="13"/>
+                                        </p:tgtEl>
+                                        <p:attrNameLst>
+                                          <p:attrName>style.visibility</p:attrName>
+                                        </p:attrNameLst>
+                                      </p:cBhvr>
+                                      <p:to>
+                                        <p:strVal val="hidden"/>
+                                      </p:to>
+                                    </p:set>
+                                  </p:childTnLst>
+                                </p:cTn>
+                              </p:par>
+                            </p:childTnLst>
+                          </p:cTn>
+                        </p:par>
+                      </p:childTnLst>
+                    </p:cTn>
+                  </p:par>
+                  <p:par>
+                    <p:cTn id="99" fill="hold">
+                      <p:stCondLst>
+                        <p:cond delay="indefinite"/>
+                      </p:stCondLst>
+                      <p:childTnLst>
+                        <p:par>
+                          <p:cTn id="100" fill="hold">
+                            <p:stCondLst>
+                              <p:cond delay="0"/>
+                            </p:stCondLst>
+                            <p:childTnLst>
+                              <p:par>
+                                <p:cTn id="101" presetID="42" presetClass="path" presetSubtype="0" accel="50000" decel="50000" fill="hold" nodeType="clickEffect">
+                                  <p:stCondLst>
+                                    <p:cond delay="0"/>
+                                  </p:stCondLst>
+                                  <p:childTnLst>
+                                    <p:animMotion origin="layout" path="M -3.125E-6 -3.7037E-7 L -0.06159 0.00255 " pathEditMode="relative" rAng="0" ptsTypes="AA">
+                                      <p:cBhvr>
+                                        <p:cTn id="102" dur="500" fill="hold"/>
+                                        <p:tgtEl>
+                                          <p:spTgt spid="21"/>
+                                        </p:tgtEl>
+                                        <p:attrNameLst>
+                                          <p:attrName>ppt_x</p:attrName>
+                                          <p:attrName>ppt_y</p:attrName>
+                                        </p:attrNameLst>
+                                      </p:cBhvr>
+                                      <p:rCtr x="-3086" y="116"/>
+                                    </p:animMotion>
+                                  </p:childTnLst>
+                                </p:cTn>
+                              </p:par>
+                            </p:childTnLst>
+                          </p:cTn>
+                        </p:par>
+                        <p:par>
+                          <p:cTn id="103" fill="hold">
+                            <p:stCondLst>
+                              <p:cond delay="500"/>
+                            </p:stCondLst>
+                            <p:childTnLst>
+                              <p:par>
+                                <p:cTn id="104" presetID="42" presetClass="path" presetSubtype="0" accel="50000" decel="50000" fill="hold" nodeType="afterEffect">
+                                  <p:stCondLst>
+                                    <p:cond delay="0"/>
+                                  </p:stCondLst>
+                                  <p:childTnLst>
+                                    <p:animMotion origin="layout" path="M -1.04167E-6 -4.81481E-6 L -0.06745 -0.00069 " pathEditMode="relative" rAng="0" ptsTypes="AA">
+                                      <p:cBhvr>
+                                        <p:cTn id="105" dur="500" fill="hold"/>
+                                        <p:tgtEl>
+                                          <p:spTgt spid="32"/>
+                                        </p:tgtEl>
+                                        <p:attrNameLst>
+                                          <p:attrName>ppt_x</p:attrName>
+                                          <p:attrName>ppt_y</p:attrName>
+                                        </p:attrNameLst>
+                                      </p:cBhvr>
+                                      <p:rCtr x="-3398" y="93"/>
+                                    </p:animMotion>
+                                  </p:childTnLst>
+                                </p:cTn>
+                              </p:par>
+                            </p:childTnLst>
+                          </p:cTn>
+                        </p:par>
+                        <p:par>
+                          <p:cTn id="106" fill="hold">
+                            <p:stCondLst>
+                              <p:cond delay="1000"/>
+                            </p:stCondLst>
+                            <p:childTnLst>
+                              <p:par>
+                                <p:cTn id="107" presetID="42" presetClass="path" presetSubtype="0" accel="50000" decel="50000" fill="hold" nodeType="afterEffect">
+                                  <p:stCondLst>
+                                    <p:cond delay="0"/>
+                                  </p:stCondLst>
+                                  <p:childTnLst>
+                                    <p:animMotion origin="layout" path="M 2.70833E-6 -3.7037E-7 L -0.17266 0.0007 " pathEditMode="relative" rAng="0" ptsTypes="AA">
+                                      <p:cBhvr>
+                                        <p:cTn id="108" dur="500" fill="hold"/>
+                                        <p:tgtEl>
+                                          <p:spTgt spid="25"/>
+                                        </p:tgtEl>
+                                        <p:attrNameLst>
+                                          <p:attrName>ppt_x</p:attrName>
+                                          <p:attrName>ppt_y</p:attrName>
+                                        </p:attrNameLst>
+                                      </p:cBhvr>
+                                      <p:rCtr x="-8698" y="69"/>
+                                    </p:animMotion>
+                                  </p:childTnLst>
+                                </p:cTn>
+                              </p:par>
+                            </p:childTnLst>
+                          </p:cTn>
+                        </p:par>
+                      </p:childTnLst>
+                    </p:cTn>
+                  </p:par>
+                  <p:par>
+                    <p:cTn id="109" fill="hold">
+                      <p:stCondLst>
+                        <p:cond delay="indefinite"/>
+                      </p:stCondLst>
+                      <p:childTnLst>
+                        <p:par>
+                          <p:cTn id="110" fill="hold">
+                            <p:stCondLst>
+                              <p:cond delay="0"/>
+                            </p:stCondLst>
+                            <p:childTnLst>
+                              <p:par>
+                                <p:cTn id="111" presetID="1" presetClass="entr" presetSubtype="0" fill="hold" nodeType="clickEffect">
+                                  <p:stCondLst>
+                                    <p:cond delay="0"/>
+                                  </p:stCondLst>
+                                  <p:childTnLst>
+                                    <p:set>
+                                      <p:cBhvr>
+                                        <p:cTn id="112" dur="1" fill="hold">
+                                          <p:stCondLst>
+                                            <p:cond delay="0"/>
+                                          </p:stCondLst>
+                                        </p:cTn>
+                                        <p:tgtEl>
+                                          <p:spTgt spid="110"/>
+                                        </p:tgtEl>
+                                        <p:attrNameLst>
+                                          <p:attrName>style.visibility</p:attrName>
+                                        </p:attrNameLst>
+                                      </p:cBhvr>
+                                      <p:to>
+                                        <p:strVal val="visible"/>
+                                      </p:to>
+                                    </p:set>
+                                  </p:childTnLst>
+                                </p:cTn>
+                              </p:par>
+                            </p:childTnLst>
+                          </p:cTn>
+                        </p:par>
+                        <p:par>
+                          <p:cTn id="113" fill="hold">
+                            <p:stCondLst>
+                              <p:cond delay="0"/>
+                            </p:stCondLst>
+                            <p:childTnLst>
+                              <p:par>
+                                <p:cTn id="114" presetID="0" presetClass="path" presetSubtype="0" accel="50000" decel="50000" fill="hold" nodeType="afterEffect">
+                                  <p:stCondLst>
+                                    <p:cond delay="0"/>
+                                  </p:stCondLst>
+                                  <p:childTnLst>
+                                    <p:animMotion origin="layout" path="M 1.04167E-6 4.07407E-6 L 1.04167E-6 0.00023 C 0.00586 0.00138 0.01198 0.00138 0.01784 0.00439 C 0.03177 0.01157 0.04492 0.02245 0.05872 0.03009 C 0.07878 0.04166 0.09909 0.05138 0.11927 0.06203 C 0.12005 0.0625 0.12096 0.06319 0.12174 0.06365 C 0.23177 0.1 0.18594 0.0868 0.30508 0.11064 L 0.44388 0.1074 C 0.4457 0.1074 0.44739 0.10671 0.44909 0.10601 L 0.55039 0.05439 C 0.56888 0.01759 0.59023 -0.01528 0.60586 -0.05625 C 0.61614 -0.08334 0.62279 -0.11528 0.62708 -0.14723 C 0.62969 -0.16574 0.62682 -0.18565 0.6263 -0.20463 C 0.62617 -0.20949 0.62474 -0.20973 0.6237 -0.21389 C 0.62305 -0.21667 0.62266 -0.21991 0.622 -0.22292 C 0.62148 -0.22547 0.62083 -0.22801 0.62031 -0.23056 C 0.61966 -0.23357 0.61966 -0.23704 0.61862 -0.23959 C 0.60976 -0.26343 0.62318 -0.22662 0.61601 -0.24862 C 0.61536 -0.25093 0.61432 -0.25278 0.61354 -0.25487 C 0.61328 -0.25625 0.61302 -0.25787 0.61263 -0.25926 C 0.61211 -0.26135 0.61133 -0.2632 0.61094 -0.26528 C 0.61055 -0.26783 0.61081 -0.27061 0.61016 -0.27292 C 0.60924 -0.27593 0.60768 -0.27778 0.60664 -0.28056 C 0.60221 -0.2926 0.60807 -0.28125 0.60247 -0.29121 C 0.60208 -0.2926 0.60182 -0.29422 0.60156 -0.29561 C 0.6013 -0.29769 0.6013 -0.29977 0.60078 -0.30186 C 0.59779 -0.31204 0.5944 -0.32199 0.59141 -0.33195 C 0.59075 -0.33403 0.59036 -0.33635 0.58958 -0.3382 C 0.5862 -0.34676 0.58828 -0.33912 0.5845 -0.34561 C 0.58411 -0.34653 0.58398 -0.34769 0.58372 -0.34862 " pathEditMode="relative" rAng="0" ptsTypes="AAAAAAAAAAAAAAAAAAAAAAAAAAAAAA">
+                                      <p:cBhvr>
+                                        <p:cTn id="115" dur="2000" fill="hold"/>
+                                        <p:tgtEl>
+                                          <p:spTgt spid="110"/>
+                                        </p:tgtEl>
+                                        <p:attrNameLst>
+                                          <p:attrName>ppt_x</p:attrName>
+                                          <p:attrName>ppt_y</p:attrName>
+                                        </p:attrNameLst>
+                                      </p:cBhvr>
+                                      <p:rCtr x="31406" y="-11898"/>
+                                    </p:animMotion>
+                                  </p:childTnLst>
+                                </p:cTn>
+                              </p:par>
+                            </p:childTnLst>
+                          </p:cTn>
+                        </p:par>
+                      </p:childTnLst>
+                    </p:cTn>
+                  </p:par>
+                </p:childTnLst>
+              </p:cTn>
+              <p:prevCondLst>
+                <p:cond evt="onPrev" delay="0">
+                  <p:tgtEl>
+                    <p:sldTgt/>
+                  </p:tgtEl>
+                </p:cond>
+              </p:prevCondLst>
+              <p:nextCondLst>
+                <p:cond evt="onNext" delay="0">
+                  <p:tgtEl>
+                    <p:sldTgt/>
+                  </p:tgtEl>
+                </p:cond>
+              </p:nextCondLst>
+            </p:seq>
+          </p:childTnLst>
+        </p:cTn>
+      </p:par>
+    </p:tnLst>
+    <p:bldLst>
+      <p:bldP spid="9" grpId="0"/>
+      <p:bldP spid="27" grpId="0" animBg="1"/>
+      <p:bldP spid="28" grpId="0" animBg="1"/>
+      <p:bldP spid="29" grpId="0" animBg="1"/>
+      <p:bldP spid="30" grpId="0" animBg="1"/>
+    </p:bldLst>
+  </p:timing>
+</p:sld>
+</file>
+
+<file path=ppt/slides/slide7.xml><?xml version="1.0" encoding="utf-8"?>
+<p:sld xmlns:a="http://schemas.openxmlformats.org/drawingml/2006/main" xmlns:r="http://schemas.openxmlformats.org/officeDocument/2006/relationships" xmlns:p="http://schemas.openxmlformats.org/presentationml/2006/main">
+  <p:cSld>
+    <p:spTree>
+      <p:nvGrpSpPr>
+        <p:cNvPr id="1" name=""/>
+        <p:cNvGrpSpPr/>
+        <p:nvPr/>
+      </p:nvGrpSpPr>
+      <p:grpSpPr>
+        <a:xfrm>
+          <a:off x="0" y="0"/>
+          <a:ext cx="0" cy="0"/>
+          <a:chOff x="0" y="0"/>
+          <a:chExt cx="0" cy="0"/>
+        </a:xfrm>
+      </p:grpSpPr>
       <p:sp>
         <p:nvSpPr>
           <p:cNvPr id="2" name="Titel 1">
@@ -5861,7 +8677,7 @@
 </p:sld>
 </file>
 
-<file path=ppt/slides/slide7.xml><?xml version="1.0" encoding="utf-8"?>
+<file path=ppt/slides/slide8.xml><?xml version="1.0" encoding="utf-8"?>
 <p:sld xmlns:a="http://schemas.openxmlformats.org/drawingml/2006/main" xmlns:r="http://schemas.openxmlformats.org/officeDocument/2006/relationships" xmlns:p="http://schemas.openxmlformats.org/presentationml/2006/main" showMasterSp="0">
   <p:cSld>
     <p:bg>
@@ -6070,7 +8886,7 @@
 </p:sld>
 </file>
 
-<file path=ppt/slides/slide8.xml><?xml version="1.0" encoding="utf-8"?>
+<file path=ppt/slides/slide9.xml><?xml version="1.0" encoding="utf-8"?>
 <p:sld xmlns:a="http://schemas.openxmlformats.org/drawingml/2006/main" xmlns:r="http://schemas.openxmlformats.org/officeDocument/2006/relationships" xmlns:p="http://schemas.openxmlformats.org/presentationml/2006/main">
   <p:cSld>
     <p:spTree>
@@ -6166,215 +8982,6 @@
   <p:clrMapOvr>
     <a:masterClrMapping/>
   </p:clrMapOvr>
-</p:sld>
-</file>
-
-<file path=ppt/slides/slide9.xml><?xml version="1.0" encoding="utf-8"?>
-<p:sld xmlns:a="http://schemas.openxmlformats.org/drawingml/2006/main" xmlns:r="http://schemas.openxmlformats.org/officeDocument/2006/relationships" xmlns:p="http://schemas.openxmlformats.org/presentationml/2006/main" showMasterSp="0">
-  <p:cSld>
-    <p:bg>
-      <p:bgPr>
-        <a:solidFill>
-          <a:schemeClr val="tx1"/>
-        </a:solidFill>
-        <a:effectLst/>
-      </p:bgPr>
-    </p:bg>
-    <p:spTree>
-      <p:nvGrpSpPr>
-        <p:cNvPr id="1" name=""/>
-        <p:cNvGrpSpPr/>
-        <p:nvPr/>
-      </p:nvGrpSpPr>
-      <p:grpSpPr>
-        <a:xfrm>
-          <a:off x="0" y="0"/>
-          <a:ext cx="0" cy="0"/>
-          <a:chOff x="0" y="0"/>
-          <a:chExt cx="0" cy="0"/>
-        </a:xfrm>
-      </p:grpSpPr>
-      <p:pic>
-        <p:nvPicPr>
-          <p:cNvPr id="8" name="video_b.mp4">
-            <a:hlinkClick r:id="" action="ppaction://media"/>
-            <a:extLst>
-              <a:ext uri="{FF2B5EF4-FFF2-40B4-BE49-F238E27FC236}">
-                <a16:creationId xmlns:a16="http://schemas.microsoft.com/office/drawing/2014/main" id="{A4B0CC85-E00C-7D4C-889E-BE19A1C84B7A}"/>
-              </a:ext>
-            </a:extLst>
-          </p:cNvPr>
-          <p:cNvPicPr>
-            <a:picLocks noGrp="1" noChangeAspect="1"/>
-          </p:cNvPicPr>
-          <p:nvPr>
-            <p:ph idx="1"/>
-            <a:videoFile r:link="rId2"/>
-            <p:extLst>
-              <p:ext uri="{DAA4B4D4-6D71-4841-9C94-3DE7FCFB9230}">
-                <p14:media xmlns:p14="http://schemas.microsoft.com/office/powerpoint/2010/main" r:embed="rId1"/>
-              </p:ext>
-            </p:extLst>
-          </p:nvPr>
-        </p:nvPicPr>
-        <p:blipFill>
-          <a:blip r:embed="rId4"/>
-          <a:stretch>
-            <a:fillRect/>
-          </a:stretch>
-        </p:blipFill>
-        <p:spPr>
-          <a:xfrm>
-            <a:off x="2381250" y="504825"/>
-            <a:ext cx="7948613" cy="5961063"/>
-          </a:xfrm>
-        </p:spPr>
-      </p:pic>
-    </p:spTree>
-    <p:extLst>
-      <p:ext uri="{BB962C8B-B14F-4D97-AF65-F5344CB8AC3E}">
-        <p14:creationId xmlns:p14="http://schemas.microsoft.com/office/powerpoint/2010/main" val="2553568828"/>
-      </p:ext>
-    </p:extLst>
-  </p:cSld>
-  <p:clrMapOvr>
-    <a:masterClrMapping/>
-  </p:clrMapOvr>
-  <p:timing>
-    <p:tnLst>
-      <p:par>
-        <p:cTn id="1" dur="indefinite" restart="never" nodeType="tmRoot">
-          <p:childTnLst>
-            <p:seq concurrent="1" nextAc="seek">
-              <p:cTn id="2" dur="indefinite" nodeType="mainSeq">
-                <p:childTnLst>
-                  <p:par>
-                    <p:cTn id="3" fill="hold">
-                      <p:stCondLst>
-                        <p:cond delay="indefinite"/>
-                      </p:stCondLst>
-                      <p:childTnLst>
-                        <p:par>
-                          <p:cTn id="4" fill="hold">
-                            <p:stCondLst>
-                              <p:cond delay="0"/>
-                            </p:stCondLst>
-                            <p:childTnLst>
-                              <p:par>
-                                <p:cTn id="5" presetID="1" presetClass="mediacall" presetSubtype="0" fill="hold" nodeType="clickEffect">
-                                  <p:stCondLst>
-                                    <p:cond delay="0"/>
-                                  </p:stCondLst>
-                                  <p:childTnLst>
-                                    <p:cmd type="call" cmd="playFrom(0.0)">
-                                      <p:cBhvr>
-                                        <p:cTn id="6" dur="19800" fill="hold"/>
-                                        <p:tgtEl>
-                                          <p:spTgt spid="8"/>
-                                        </p:tgtEl>
-                                      </p:cBhvr>
-                                    </p:cmd>
-                                  </p:childTnLst>
-                                </p:cTn>
-                              </p:par>
-                            </p:childTnLst>
-                          </p:cTn>
-                        </p:par>
-                      </p:childTnLst>
-                    </p:cTn>
-                  </p:par>
-                </p:childTnLst>
-              </p:cTn>
-              <p:prevCondLst>
-                <p:cond evt="onPrev" delay="0">
-                  <p:tgtEl>
-                    <p:sldTgt/>
-                  </p:tgtEl>
-                </p:cond>
-              </p:prevCondLst>
-              <p:nextCondLst>
-                <p:cond evt="onNext" delay="0">
-                  <p:tgtEl>
-                    <p:sldTgt/>
-                  </p:tgtEl>
-                </p:cond>
-              </p:nextCondLst>
-            </p:seq>
-            <p:video>
-              <p:cMediaNode vol="0">
-                <p:cTn id="7" repeatCount="indefinite" fill="hold" display="0">
-                  <p:stCondLst>
-                    <p:cond delay="indefinite"/>
-                  </p:stCondLst>
-                </p:cTn>
-                <p:tgtEl>
-                  <p:spTgt spid="8"/>
-                </p:tgtEl>
-              </p:cMediaNode>
-            </p:video>
-            <p:seq concurrent="1" nextAc="seek">
-              <p:cTn id="8" restart="whenNotActive" fill="hold" evtFilter="cancelBubble" nodeType="interactiveSeq">
-                <p:stCondLst>
-                  <p:cond evt="onClick" delay="0">
-                    <p:tgtEl>
-                      <p:spTgt spid="8"/>
-                    </p:tgtEl>
-                  </p:cond>
-                </p:stCondLst>
-                <p:endSync evt="end" delay="0">
-                  <p:rtn val="all"/>
-                </p:endSync>
-                <p:childTnLst>
-                  <p:par>
-                    <p:cTn id="9" fill="hold">
-                      <p:stCondLst>
-                        <p:cond delay="0"/>
-                      </p:stCondLst>
-                      <p:childTnLst>
-                        <p:par>
-                          <p:cTn id="10" fill="hold">
-                            <p:stCondLst>
-                              <p:cond delay="0"/>
-                            </p:stCondLst>
-                            <p:childTnLst>
-                              <p:par>
-                                <p:cTn id="11" presetID="2" presetClass="mediacall" presetSubtype="0" fill="hold" nodeType="clickEffect">
-                                  <p:stCondLst>
-                                    <p:cond delay="0"/>
-                                  </p:stCondLst>
-                                  <p:childTnLst>
-                                    <p:cmd type="call" cmd="togglePause">
-                                      <p:cBhvr>
-                                        <p:cTn id="12" dur="1" fill="hold"/>
-                                        <p:tgtEl>
-                                          <p:spTgt spid="8"/>
-                                        </p:tgtEl>
-                                      </p:cBhvr>
-                                    </p:cmd>
-                                  </p:childTnLst>
-                                </p:cTn>
-                              </p:par>
-                            </p:childTnLst>
-                          </p:cTn>
-                        </p:par>
-                      </p:childTnLst>
-                    </p:cTn>
-                  </p:par>
-                </p:childTnLst>
-              </p:cTn>
-              <p:nextCondLst>
-                <p:cond evt="onClick" delay="0">
-                  <p:tgtEl>
-                    <p:spTgt spid="8"/>
-                  </p:tgtEl>
-                </p:cond>
-              </p:nextCondLst>
-            </p:seq>
-          </p:childTnLst>
-        </p:cTn>
-      </p:par>
-    </p:tnLst>
-  </p:timing>
 </p:sld>
 </file>
 

</xml_diff>

<commit_message>
changed minor things on the slides (e.g. time it takes)
</commit_message>
<xml_diff>
--- a/isip_presentation.pptx
+++ b/isip_presentation.pptx
@@ -206,7 +206,7 @@
           <a:p>
             <a:fld id="{7D31DDB2-3D33-4349-ACAB-04EB8925B64A}" type="datetimeFigureOut">
               <a:rPr lang="en-GB" smtClean="0"/>
-              <a:t>22/05/2018</a:t>
+              <a:t>29/05/2018</a:t>
             </a:fld>
             <a:endParaRPr lang="en-GB"/>
           </a:p>
@@ -365,7 +365,7 @@
           <a:p>
             <a:fld id="{10AAEC32-5D25-9343-A64A-6E65754FBAB3}" type="slidenum">
               <a:rPr lang="en-GB" smtClean="0"/>
-              <a:t>‹#›</a:t>
+              <a:t>‹Nr.›</a:t>
             </a:fld>
             <a:endParaRPr lang="en-GB"/>
           </a:p>
@@ -518,182 +518,6 @@
           <a:bodyPr/>
           <a:lstStyle/>
           <a:p>
-            <a:pPr marL="0" marR="0" lvl="0" indent="0" algn="l" defTabSz="914400" rtl="0" eaLnBrk="1" fontAlgn="auto" latinLnBrk="0" hangingPunct="1">
-              <a:lnSpc>
-                <a:spcPct val="100000"/>
-              </a:lnSpc>
-              <a:spcBef>
-                <a:spcPts val="0"/>
-              </a:spcBef>
-              <a:spcAft>
-                <a:spcPts val="0"/>
-              </a:spcAft>
-              <a:buClrTx/>
-              <a:buSzTx/>
-              <a:buFontTx/>
-              <a:buNone/>
-              <a:tabLst/>
-              <a:defRPr/>
-            </a:pPr>
-            <a:r>
-              <a:rPr lang="de-DE" dirty="0" err="1"/>
-              <a:t>Which</a:t>
-            </a:r>
-            <a:r>
-              <a:rPr lang="de-DE" dirty="0"/>
-              <a:t> </a:t>
-            </a:r>
-            <a:r>
-              <a:rPr lang="de-DE" dirty="0" err="1"/>
-              <a:t>training</a:t>
-            </a:r>
-            <a:r>
-              <a:rPr lang="de-DE" dirty="0"/>
-              <a:t> </a:t>
-            </a:r>
-            <a:r>
-              <a:rPr lang="de-DE" dirty="0" err="1"/>
-              <a:t>images</a:t>
-            </a:r>
-            <a:r>
-              <a:rPr lang="de-DE" dirty="0"/>
-              <a:t> </a:t>
-            </a:r>
-            <a:r>
-              <a:rPr lang="de-DE" dirty="0" err="1"/>
-              <a:t>to</a:t>
-            </a:r>
-            <a:r>
-              <a:rPr lang="de-DE" dirty="0"/>
-              <a:t> </a:t>
-            </a:r>
-            <a:r>
-              <a:rPr lang="de-DE" dirty="0" err="1"/>
-              <a:t>use</a:t>
-            </a:r>
-            <a:r>
-              <a:rPr lang="de-DE" dirty="0"/>
-              <a:t>?  -&gt; </a:t>
-            </a:r>
-            <a:r>
-              <a:rPr lang="de-DE" dirty="0" err="1"/>
-              <a:t>tool</a:t>
-            </a:r>
-            <a:r>
-              <a:rPr lang="de-DE" dirty="0"/>
-              <a:t> </a:t>
-            </a:r>
-            <a:r>
-              <a:rPr lang="de-DE" dirty="0" err="1"/>
-              <a:t>moves</a:t>
-            </a:r>
-            <a:r>
-              <a:rPr lang="de-DE" dirty="0"/>
-              <a:t> </a:t>
-            </a:r>
-            <a:r>
-              <a:rPr lang="de-DE" dirty="0" err="1"/>
-              <a:t>and</a:t>
-            </a:r>
-            <a:r>
-              <a:rPr lang="de-DE" dirty="0"/>
-              <a:t> </a:t>
-            </a:r>
-            <a:r>
-              <a:rPr lang="de-DE" dirty="0" err="1"/>
-              <a:t>rotates</a:t>
-            </a:r>
-            <a:r>
-              <a:rPr lang="de-DE" dirty="0"/>
-              <a:t> -&gt; </a:t>
-            </a:r>
-            <a:r>
-              <a:rPr lang="de-DE" dirty="0" err="1"/>
-              <a:t>difficult</a:t>
-            </a:r>
-            <a:r>
-              <a:rPr lang="de-DE" dirty="0"/>
-              <a:t> </a:t>
-            </a:r>
-            <a:r>
-              <a:rPr lang="de-DE" dirty="0" err="1"/>
-              <a:t>to</a:t>
-            </a:r>
-            <a:r>
-              <a:rPr lang="de-DE" dirty="0"/>
-              <a:t> </a:t>
-            </a:r>
-            <a:r>
-              <a:rPr lang="de-DE" dirty="0" err="1"/>
-              <a:t>have</a:t>
-            </a:r>
-            <a:r>
-              <a:rPr lang="de-DE" dirty="0"/>
-              <a:t> </a:t>
-            </a:r>
-            <a:r>
-              <a:rPr lang="de-DE" dirty="0" err="1"/>
-              <a:t>that</a:t>
-            </a:r>
-            <a:r>
-              <a:rPr lang="de-DE" dirty="0"/>
-              <a:t> </a:t>
-            </a:r>
-            <a:r>
-              <a:rPr lang="de-DE" dirty="0" err="1"/>
-              <a:t>many</a:t>
-            </a:r>
-            <a:r>
-              <a:rPr lang="de-DE" dirty="0"/>
-              <a:t> </a:t>
-            </a:r>
-            <a:r>
-              <a:rPr lang="de-DE" dirty="0" err="1"/>
-              <a:t>training</a:t>
-            </a:r>
-            <a:r>
-              <a:rPr lang="de-DE" dirty="0"/>
-              <a:t> </a:t>
-            </a:r>
-            <a:r>
-              <a:rPr lang="de-DE" dirty="0" err="1"/>
-              <a:t>images</a:t>
-            </a:r>
-            <a:r>
-              <a:rPr lang="de-DE" dirty="0"/>
-              <a:t> </a:t>
-            </a:r>
-            <a:r>
-              <a:rPr lang="de-DE" dirty="0" err="1"/>
-              <a:t>which</a:t>
-            </a:r>
-            <a:r>
-              <a:rPr lang="de-DE" dirty="0"/>
-              <a:t> </a:t>
-            </a:r>
-            <a:r>
-              <a:rPr lang="de-DE" dirty="0" err="1"/>
-              <a:t>cover</a:t>
-            </a:r>
-            <a:r>
-              <a:rPr lang="de-DE" dirty="0"/>
-              <a:t> all </a:t>
-            </a:r>
-            <a:r>
-              <a:rPr lang="de-DE" dirty="0" err="1"/>
-              <a:t>possible</a:t>
-            </a:r>
-            <a:r>
-              <a:rPr lang="de-DE" dirty="0"/>
-              <a:t> </a:t>
-            </a:r>
-            <a:r>
-              <a:rPr lang="de-DE" dirty="0" err="1"/>
-              <a:t>positions</a:t>
-            </a:r>
-            <a:endParaRPr lang="de-DE" dirty="0"/>
-          </a:p>
-          <a:p>
             <a:endParaRPr lang="en-GB" dirty="0"/>
           </a:p>
         </p:txBody>
@@ -1170,16 +994,7 @@
           <a:p>
             <a:r>
               <a:rPr lang="en-GB" dirty="0"/>
-              <a:t>Draw algorithm on the board or add little animation</a:t>
-            </a:r>
-          </a:p>
-          <a:p>
-            <a:endParaRPr lang="en-GB" dirty="0"/>
-          </a:p>
-          <a:p>
-            <a:r>
-              <a:rPr lang="en-GB" dirty="0"/>
-              <a:t>Extremely smart, because it accounts for little changes in instrument orientation / illumination / reflectance etc. instead of fixed training images</a:t>
+              <a:t>Extremely smart (!!!), because it accounts for little changes in instrument orientation / illumination / reflectance etc. instead of fixed training images</a:t>
             </a:r>
           </a:p>
         </p:txBody>
@@ -1434,7 +1249,17 @@
           <a:p>
             <a:r>
               <a:rPr lang="en-GB" dirty="0"/>
-              <a:t>Grayscale -&gt; less noisy</a:t>
+              <a:t>Grayscale </a:t>
+            </a:r>
+            <a:r>
+              <a:rPr lang="en-GB" dirty="0">
+                <a:sym typeface="Wingdings" pitchFamily="2" charset="2"/>
+              </a:rPr>
+              <a:t></a:t>
+            </a:r>
+            <a:r>
+              <a:rPr lang="en-GB" dirty="0"/>
+              <a:t> less noisy</a:t>
             </a:r>
           </a:p>
         </p:txBody>
@@ -1521,13 +1346,73 @@
           <a:p>
             <a:r>
               <a:rPr lang="en-GB" dirty="0"/>
-              <a:t>Qualities: perfect for A, nearly perfect for B. Very generic, will most probably also work for other image sets. No training images required, uses the information contained in the images itself.</a:t>
-            </a:r>
-          </a:p>
-          <a:p>
+              <a:t>Qualities: </a:t>
+            </a:r>
+          </a:p>
+          <a:p>
+            <a:pPr marL="171450" indent="-171450">
+              <a:buFontTx/>
+              <a:buChar char="-"/>
+            </a:pPr>
             <a:r>
               <a:rPr lang="en-GB" dirty="0"/>
-              <a:t>Limitations: First image needs to have a known starting position.</a:t>
+              <a:t>Performs very good for both A and B</a:t>
+            </a:r>
+          </a:p>
+          <a:p>
+            <a:pPr marL="171450" indent="-171450">
+              <a:buFontTx/>
+              <a:buChar char="-"/>
+            </a:pPr>
+            <a:r>
+              <a:rPr lang="en-GB" dirty="0"/>
+              <a:t>generic, will most probably also work for other image sets</a:t>
+            </a:r>
+          </a:p>
+          <a:p>
+            <a:pPr marL="171450" indent="-171450">
+              <a:buFontTx/>
+              <a:buChar char="-"/>
+            </a:pPr>
+            <a:r>
+              <a:rPr lang="en-GB" dirty="0"/>
+              <a:t>No training images required, uses the information contained in the images itself</a:t>
+            </a:r>
+          </a:p>
+          <a:p>
+            <a:pPr marL="171450" indent="-171450">
+              <a:buFontTx/>
+              <a:buChar char="-"/>
+            </a:pPr>
+            <a:r>
+              <a:rPr lang="en-GB" dirty="0"/>
+              <a:t>Really fast (4s per set)</a:t>
+            </a:r>
+          </a:p>
+          <a:p>
+            <a:r>
+              <a:rPr lang="en-GB" dirty="0"/>
+              <a:t>Limitations:</a:t>
+            </a:r>
+          </a:p>
+          <a:p>
+            <a:pPr marL="171450" indent="-171450">
+              <a:buFontTx/>
+              <a:buChar char="-"/>
+            </a:pPr>
+            <a:r>
+              <a:rPr lang="en-GB" dirty="0"/>
+              <a:t>First image needs to have a known starting position</a:t>
+            </a:r>
+          </a:p>
+          <a:p>
+            <a:pPr marL="171450" indent="-171450">
+              <a:buFontTx/>
+              <a:buChar char="-"/>
+            </a:pPr>
+            <a:r>
+              <a:rPr lang="en-GB" dirty="0"/>
+              <a:t>if there is a huge change in the first few frames, it might be difficult without any training images.</a:t>
             </a:r>
           </a:p>
         </p:txBody>
@@ -1559,6 +1444,90 @@
     <p:extLst>
       <p:ext uri="{BB962C8B-B14F-4D97-AF65-F5344CB8AC3E}">
         <p14:creationId xmlns:p14="http://schemas.microsoft.com/office/powerpoint/2010/main" val="1308461536"/>
+      </p:ext>
+    </p:extLst>
+  </p:cSld>
+  <p:clrMapOvr>
+    <a:masterClrMapping/>
+  </p:clrMapOvr>
+</p:notes>
+</file>
+
+<file path=ppt/notesSlides/notesSlide8.xml><?xml version="1.0" encoding="utf-8"?>
+<p:notes xmlns:a="http://schemas.openxmlformats.org/drawingml/2006/main" xmlns:r="http://schemas.openxmlformats.org/officeDocument/2006/relationships" xmlns:p="http://schemas.openxmlformats.org/presentationml/2006/main">
+  <p:cSld>
+    <p:spTree>
+      <p:nvGrpSpPr>
+        <p:cNvPr id="1" name=""/>
+        <p:cNvGrpSpPr/>
+        <p:nvPr/>
+      </p:nvGrpSpPr>
+      <p:grpSpPr>
+        <a:xfrm>
+          <a:off x="0" y="0"/>
+          <a:ext cx="0" cy="0"/>
+          <a:chOff x="0" y="0"/>
+          <a:chExt cx="0" cy="0"/>
+        </a:xfrm>
+      </p:grpSpPr>
+      <p:sp>
+        <p:nvSpPr>
+          <p:cNvPr id="2" name="Folienbildplatzhalter 1"/>
+          <p:cNvSpPr>
+            <a:spLocks noGrp="1" noRot="1" noChangeAspect="1"/>
+          </p:cNvSpPr>
+          <p:nvPr>
+            <p:ph type="sldImg"/>
+          </p:nvPr>
+        </p:nvSpPr>
+        <p:spPr/>
+      </p:sp>
+      <p:sp>
+        <p:nvSpPr>
+          <p:cNvPr id="3" name="Notizenplatzhalter 2"/>
+          <p:cNvSpPr>
+            <a:spLocks noGrp="1"/>
+          </p:cNvSpPr>
+          <p:nvPr>
+            <p:ph type="body" idx="1"/>
+          </p:nvPr>
+        </p:nvSpPr>
+        <p:spPr/>
+        <p:txBody>
+          <a:bodyPr/>
+          <a:lstStyle/>
+          <a:p>
+            <a:endParaRPr lang="en-GB" dirty="0"/>
+          </a:p>
+        </p:txBody>
+      </p:sp>
+      <p:sp>
+        <p:nvSpPr>
+          <p:cNvPr id="4" name="Foliennummernplatzhalter 3"/>
+          <p:cNvSpPr>
+            <a:spLocks noGrp="1"/>
+          </p:cNvSpPr>
+          <p:nvPr>
+            <p:ph type="sldNum" sz="quarter" idx="10"/>
+          </p:nvPr>
+        </p:nvSpPr>
+        <p:spPr/>
+        <p:txBody>
+          <a:bodyPr/>
+          <a:lstStyle/>
+          <a:p>
+            <a:fld id="{10AAEC32-5D25-9343-A64A-6E65754FBAB3}" type="slidenum">
+              <a:rPr lang="en-GB" smtClean="0"/>
+              <a:t>9</a:t>
+            </a:fld>
+            <a:endParaRPr lang="en-GB"/>
+          </a:p>
+        </p:txBody>
+      </p:sp>
+    </p:spTree>
+    <p:extLst>
+      <p:ext uri="{BB962C8B-B14F-4D97-AF65-F5344CB8AC3E}">
+        <p14:creationId xmlns:p14="http://schemas.microsoft.com/office/powerpoint/2010/main" val="890348633"/>
       </p:ext>
     </p:extLst>
   </p:cSld>
@@ -1737,7 +1706,7 @@
           <a:p>
             <a:fld id="{6918DB91-F5E1-CB4E-825E-9A43DB17E472}" type="datetimeFigureOut">
               <a:rPr lang="de-DE" smtClean="0"/>
-              <a:t>22.05.2018</a:t>
+              <a:t>29.05.18</a:t>
             </a:fld>
             <a:endParaRPr lang="de-DE"/>
           </a:p>
@@ -1805,7 +1774,7 @@
           <a:p>
             <a:fld id="{A1380F8A-C61F-CB4D-A0B4-6F2BAC38ABA8}" type="slidenum">
               <a:rPr lang="de-DE" smtClean="0"/>
-              <a:t>‹#›</a:t>
+              <a:t>‹Nr.›</a:t>
             </a:fld>
             <a:endParaRPr lang="de-DE"/>
           </a:p>
@@ -2067,7 +2036,7 @@
           <a:p>
             <a:fld id="{6918DB91-F5E1-CB4E-825E-9A43DB17E472}" type="datetimeFigureOut">
               <a:rPr lang="de-DE" smtClean="0"/>
-              <a:t>22.05.2018</a:t>
+              <a:t>29.05.18</a:t>
             </a:fld>
             <a:endParaRPr lang="de-DE"/>
           </a:p>
@@ -2109,7 +2078,7 @@
           <a:p>
             <a:fld id="{A1380F8A-C61F-CB4D-A0B4-6F2BAC38ABA8}" type="slidenum">
               <a:rPr lang="de-DE" smtClean="0"/>
-              <a:t>‹#›</a:t>
+              <a:t>‹Nr.›</a:t>
             </a:fld>
             <a:endParaRPr lang="de-DE"/>
           </a:p>
@@ -2247,7 +2216,7 @@
           <a:p>
             <a:fld id="{6918DB91-F5E1-CB4E-825E-9A43DB17E472}" type="datetimeFigureOut">
               <a:rPr lang="de-DE" smtClean="0"/>
-              <a:t>22.05.2018</a:t>
+              <a:t>29.05.18</a:t>
             </a:fld>
             <a:endParaRPr lang="de-DE"/>
           </a:p>
@@ -2289,7 +2258,7 @@
           <a:p>
             <a:fld id="{A1380F8A-C61F-CB4D-A0B4-6F2BAC38ABA8}" type="slidenum">
               <a:rPr lang="de-DE" smtClean="0"/>
-              <a:t>‹#›</a:t>
+              <a:t>‹Nr.›</a:t>
             </a:fld>
             <a:endParaRPr lang="de-DE"/>
           </a:p>
@@ -2417,7 +2386,7 @@
           <a:p>
             <a:fld id="{6918DB91-F5E1-CB4E-825E-9A43DB17E472}" type="datetimeFigureOut">
               <a:rPr lang="de-DE" smtClean="0"/>
-              <a:t>22.05.2018</a:t>
+              <a:t>29.05.18</a:t>
             </a:fld>
             <a:endParaRPr lang="de-DE"/>
           </a:p>
@@ -2459,7 +2428,7 @@
           <a:p>
             <a:fld id="{A1380F8A-C61F-CB4D-A0B4-6F2BAC38ABA8}" type="slidenum">
               <a:rPr lang="de-DE" smtClean="0"/>
-              <a:t>‹#›</a:t>
+              <a:t>‹Nr.›</a:t>
             </a:fld>
             <a:endParaRPr lang="de-DE"/>
           </a:p>
@@ -2694,7 +2663,7 @@
           <a:p>
             <a:fld id="{6918DB91-F5E1-CB4E-825E-9A43DB17E472}" type="datetimeFigureOut">
               <a:rPr lang="de-DE" smtClean="0"/>
-              <a:t>22.05.2018</a:t>
+              <a:t>29.05.18</a:t>
             </a:fld>
             <a:endParaRPr lang="de-DE"/>
           </a:p>
@@ -2762,7 +2731,7 @@
           <a:p>
             <a:fld id="{A1380F8A-C61F-CB4D-A0B4-6F2BAC38ABA8}" type="slidenum">
               <a:rPr lang="de-DE" smtClean="0"/>
-              <a:t>‹#›</a:t>
+              <a:t>‹Nr.›</a:t>
             </a:fld>
             <a:endParaRPr lang="de-DE"/>
           </a:p>
@@ -3088,7 +3057,7 @@
           <a:p>
             <a:fld id="{6918DB91-F5E1-CB4E-825E-9A43DB17E472}" type="datetimeFigureOut">
               <a:rPr lang="de-DE" smtClean="0"/>
-              <a:t>22.05.2018</a:t>
+              <a:t>29.05.18</a:t>
             </a:fld>
             <a:endParaRPr lang="de-DE"/>
           </a:p>
@@ -3130,7 +3099,7 @@
           <a:p>
             <a:fld id="{A1380F8A-C61F-CB4D-A0B4-6F2BAC38ABA8}" type="slidenum">
               <a:rPr lang="de-DE" smtClean="0"/>
-              <a:t>‹#›</a:t>
+              <a:t>‹Nr.›</a:t>
             </a:fld>
             <a:endParaRPr lang="de-DE"/>
           </a:p>
@@ -3565,7 +3534,7 @@
           <a:p>
             <a:fld id="{6918DB91-F5E1-CB4E-825E-9A43DB17E472}" type="datetimeFigureOut">
               <a:rPr lang="de-DE" smtClean="0"/>
-              <a:t>22.05.2018</a:t>
+              <a:t>29.05.18</a:t>
             </a:fld>
             <a:endParaRPr lang="de-DE"/>
           </a:p>
@@ -3607,7 +3576,7 @@
           <a:p>
             <a:fld id="{A1380F8A-C61F-CB4D-A0B4-6F2BAC38ABA8}" type="slidenum">
               <a:rPr lang="de-DE" smtClean="0"/>
-              <a:t>‹#›</a:t>
+              <a:t>‹Nr.›</a:t>
             </a:fld>
             <a:endParaRPr lang="de-DE"/>
           </a:p>
@@ -3683,7 +3652,7 @@
           <a:p>
             <a:fld id="{6918DB91-F5E1-CB4E-825E-9A43DB17E472}" type="datetimeFigureOut">
               <a:rPr lang="de-DE" smtClean="0"/>
-              <a:t>22.05.2018</a:t>
+              <a:t>29.05.18</a:t>
             </a:fld>
             <a:endParaRPr lang="de-DE"/>
           </a:p>
@@ -3725,7 +3694,7 @@
           <a:p>
             <a:fld id="{A1380F8A-C61F-CB4D-A0B4-6F2BAC38ABA8}" type="slidenum">
               <a:rPr lang="de-DE" smtClean="0"/>
-              <a:t>‹#›</a:t>
+              <a:t>‹Nr.›</a:t>
             </a:fld>
             <a:endParaRPr lang="de-DE"/>
           </a:p>
@@ -3778,7 +3747,7 @@
           <a:p>
             <a:fld id="{6918DB91-F5E1-CB4E-825E-9A43DB17E472}" type="datetimeFigureOut">
               <a:rPr lang="de-DE" smtClean="0"/>
-              <a:t>22.05.2018</a:t>
+              <a:t>29.05.18</a:t>
             </a:fld>
             <a:endParaRPr lang="de-DE"/>
           </a:p>
@@ -3820,7 +3789,7 @@
           <a:p>
             <a:fld id="{A1380F8A-C61F-CB4D-A0B4-6F2BAC38ABA8}" type="slidenum">
               <a:rPr lang="de-DE" smtClean="0"/>
-              <a:t>‹#›</a:t>
+              <a:t>‹Nr.›</a:t>
             </a:fld>
             <a:endParaRPr lang="de-DE"/>
           </a:p>
@@ -4124,7 +4093,7 @@
           <a:p>
             <a:fld id="{6918DB91-F5E1-CB4E-825E-9A43DB17E472}" type="datetimeFigureOut">
               <a:rPr lang="de-DE" smtClean="0"/>
-              <a:t>22.05.2018</a:t>
+              <a:t>29.05.18</a:t>
             </a:fld>
             <a:endParaRPr lang="de-DE"/>
           </a:p>
@@ -4192,7 +4161,7 @@
           <a:p>
             <a:fld id="{A1380F8A-C61F-CB4D-A0B4-6F2BAC38ABA8}" type="slidenum">
               <a:rPr lang="de-DE" smtClean="0"/>
-              <a:t>‹#›</a:t>
+              <a:t>‹Nr.›</a:t>
             </a:fld>
             <a:endParaRPr lang="de-DE"/>
           </a:p>
@@ -4512,7 +4481,7 @@
           <a:p>
             <a:fld id="{6918DB91-F5E1-CB4E-825E-9A43DB17E472}" type="datetimeFigureOut">
               <a:rPr lang="de-DE" smtClean="0"/>
-              <a:t>22.05.2018</a:t>
+              <a:t>29.05.18</a:t>
             </a:fld>
             <a:endParaRPr lang="de-DE"/>
           </a:p>
@@ -4580,7 +4549,7 @@
           <a:p>
             <a:fld id="{A1380F8A-C61F-CB4D-A0B4-6F2BAC38ABA8}" type="slidenum">
               <a:rPr lang="de-DE" smtClean="0"/>
-              <a:t>‹#›</a:t>
+              <a:t>‹Nr.›</a:t>
             </a:fld>
             <a:endParaRPr lang="de-DE"/>
           </a:p>
@@ -4790,7 +4759,7 @@
           <a:p>
             <a:fld id="{6918DB91-F5E1-CB4E-825E-9A43DB17E472}" type="datetimeFigureOut">
               <a:rPr lang="de-DE" smtClean="0"/>
-              <a:t>22.05.2018</a:t>
+              <a:t>29.05.18</a:t>
             </a:fld>
             <a:endParaRPr lang="de-DE"/>
           </a:p>
@@ -4864,7 +4833,7 @@
           <a:p>
             <a:fld id="{A1380F8A-C61F-CB4D-A0B4-6F2BAC38ABA8}" type="slidenum">
               <a:rPr lang="de-DE" smtClean="0"/>
-              <a:t>‹#›</a:t>
+              <a:t>‹Nr.›</a:t>
             </a:fld>
             <a:endParaRPr lang="de-DE"/>
           </a:p>
@@ -8646,7 +8615,7 @@
           <a:p>
             <a:r>
               <a:rPr lang="en-GB" dirty="0"/>
-              <a:t>Grayscale images</a:t>
+              <a:t>Use grayscale images</a:t>
             </a:r>
           </a:p>
           <a:p>
@@ -8954,7 +8923,7 @@
           <a:p>
             <a:r>
               <a:rPr lang="en-GB" dirty="0"/>
-              <a:t>Very generic method, high accuracy</a:t>
+              <a:t>Very generic method, high accuracy, fast</a:t>
             </a:r>
           </a:p>
           <a:p>

</xml_diff>